<commit_message>
Analysis of color and its influence on price
- documentation extended
</commit_message>
<xml_diff>
--- a/Präsentation_Vorlage.pptx
+++ b/Präsentation_Vorlage.pptx
@@ -17,13 +17,14 @@
     <p:sldId id="259" r:id="rId11"/>
     <p:sldId id="260" r:id="rId12"/>
     <p:sldId id="269" r:id="rId13"/>
-    <p:sldId id="262" r:id="rId14"/>
-    <p:sldId id="263" r:id="rId15"/>
-    <p:sldId id="264" r:id="rId16"/>
-    <p:sldId id="265" r:id="rId17"/>
-    <p:sldId id="266" r:id="rId18"/>
-    <p:sldId id="267" r:id="rId19"/>
-    <p:sldId id="268" r:id="rId20"/>
+    <p:sldId id="270" r:id="rId14"/>
+    <p:sldId id="262" r:id="rId15"/>
+    <p:sldId id="263" r:id="rId16"/>
+    <p:sldId id="264" r:id="rId17"/>
+    <p:sldId id="265" r:id="rId18"/>
+    <p:sldId id="266" r:id="rId19"/>
+    <p:sldId id="267" r:id="rId20"/>
+    <p:sldId id="268" r:id="rId21"/>
   </p:sldIdLst>
   <p:sldSz cx="12192000" cy="6858000"/>
   <p:notesSz cx="7559675" cy="10691813"/>
@@ -15944,7 +15945,7 @@
       </p:grpSpPr>
       <p:sp>
         <p:nvSpPr>
-          <p:cNvPr id="258" name="TextBox 3"/>
+          <p:cNvPr id="255" name="TextBox 3"/>
           <p:cNvSpPr/>
           <p:nvPr/>
         </p:nvSpPr>
@@ -15995,7 +15996,7 @@
                 <a:latin typeface="CMU Serif"/>
                 <a:ea typeface="CMU Serif"/>
               </a:rPr>
-              <a:t>4. Maschinelles </a:t>
+              <a:t>3. Maschinelles </a:t>
             </a:r>
             <a:endParaRPr lang="de-DE" sz="5500" b="0" strike="noStrike" spc="-1">
               <a:solidFill>
@@ -16021,7 +16022,7 @@
                 <a:latin typeface="CMU Serif"/>
                 <a:ea typeface="CMU Serif"/>
               </a:rPr>
-              <a:t>Lernverfahren 3</a:t>
+              <a:t>Lernverfahren 2</a:t>
             </a:r>
             <a:endParaRPr lang="de-DE" sz="5500" b="0" strike="noStrike" spc="-1">
               <a:solidFill>
@@ -16034,7 +16035,7 @@
       </p:sp>
       <p:sp>
         <p:nvSpPr>
-          <p:cNvPr id="259" name="Freeform: Shape 152"/>
+          <p:cNvPr id="256" name="Freeform: Shape 152"/>
           <p:cNvSpPr/>
           <p:nvPr/>
         </p:nvSpPr>
@@ -16350,7 +16351,7 @@
       </p:sp>
       <p:sp>
         <p:nvSpPr>
-          <p:cNvPr id="260" name="Rechteck 1"/>
+          <p:cNvPr id="257" name="Rechteck 1"/>
           <p:cNvSpPr/>
           <p:nvPr/>
         </p:nvSpPr>
@@ -16413,6 +16414,493 @@
 </file>
 
 <file path=ppt/slides/slide11.xml><?xml version="1.0" encoding="utf-8"?>
+<p:sld xmlns:a="http://schemas.openxmlformats.org/drawingml/2006/main" xmlns:r="http://schemas.openxmlformats.org/officeDocument/2006/relationships" xmlns:p="http://schemas.openxmlformats.org/presentationml/2006/main">
+  <p:cSld>
+    <p:spTree>
+      <p:nvGrpSpPr>
+        <p:cNvPr id="1" name=""/>
+        <p:cNvGrpSpPr/>
+        <p:nvPr/>
+      </p:nvGrpSpPr>
+      <p:grpSpPr>
+        <a:xfrm>
+          <a:off x="0" y="0"/>
+          <a:ext cx="0" cy="0"/>
+          <a:chOff x="0" y="0"/>
+          <a:chExt cx="0" cy="0"/>
+        </a:xfrm>
+      </p:grpSpPr>
+      <p:sp>
+        <p:nvSpPr>
+          <p:cNvPr id="258" name="TextBox 3"/>
+          <p:cNvSpPr/>
+          <p:nvPr/>
+        </p:nvSpPr>
+        <p:spPr>
+          <a:xfrm>
+            <a:off x="5686920" y="2660040"/>
+            <a:ext cx="6328080" cy="1537200"/>
+          </a:xfrm>
+          <a:prstGeom prst="rect">
+            <a:avLst/>
+          </a:prstGeom>
+          <a:noFill/>
+          <a:ln w="0">
+            <a:noFill/>
+          </a:ln>
+        </p:spPr>
+        <p:style>
+          <a:lnRef idx="0">
+            <a:scrgbClr r="0" g="0" b="0"/>
+          </a:lnRef>
+          <a:fillRef idx="0">
+            <a:scrgbClr r="0" g="0" b="0"/>
+          </a:fillRef>
+          <a:effectRef idx="0">
+            <a:scrgbClr r="0" g="0" b="0"/>
+          </a:effectRef>
+          <a:fontRef idx="minor"/>
+        </p:style>
+        <p:txBody>
+          <a:bodyPr lIns="90000" tIns="45000" rIns="90000" bIns="45000" anchor="ctr">
+            <a:spAutoFit/>
+          </a:bodyPr>
+          <a:lstStyle/>
+          <a:p>
+            <a:pPr algn="ctr">
+              <a:lnSpc>
+                <a:spcPts val="5400"/>
+              </a:lnSpc>
+              <a:spcAft>
+                <a:spcPts val="601"/>
+              </a:spcAft>
+            </a:pPr>
+            <a:r>
+              <a:rPr lang="de-DE" sz="5500" b="1" strike="noStrike" spc="-1">
+                <a:solidFill>
+                  <a:srgbClr val="002060"/>
+                </a:solidFill>
+                <a:latin typeface="CMU Serif"/>
+                <a:ea typeface="CMU Serif"/>
+              </a:rPr>
+              <a:t>4. Maschinelles </a:t>
+            </a:r>
+            <a:endParaRPr lang="de-DE" sz="5500" b="0" strike="noStrike" spc="-1">
+              <a:solidFill>
+                <a:srgbClr val="000000"/>
+              </a:solidFill>
+              <a:latin typeface="Arial"/>
+            </a:endParaRPr>
+          </a:p>
+          <a:p>
+            <a:pPr algn="ctr">
+              <a:lnSpc>
+                <a:spcPts val="5400"/>
+              </a:lnSpc>
+              <a:spcAft>
+                <a:spcPts val="601"/>
+              </a:spcAft>
+            </a:pPr>
+            <a:r>
+              <a:rPr lang="de-DE" sz="5500" b="1" strike="noStrike" spc="-1">
+                <a:solidFill>
+                  <a:srgbClr val="002060"/>
+                </a:solidFill>
+                <a:latin typeface="CMU Serif"/>
+                <a:ea typeface="CMU Serif"/>
+              </a:rPr>
+              <a:t>Lernverfahren 3</a:t>
+            </a:r>
+            <a:endParaRPr lang="de-DE" sz="5500" b="0" strike="noStrike" spc="-1">
+              <a:solidFill>
+                <a:srgbClr val="000000"/>
+              </a:solidFill>
+              <a:latin typeface="Arial"/>
+            </a:endParaRPr>
+          </a:p>
+        </p:txBody>
+      </p:sp>
+      <p:sp>
+        <p:nvSpPr>
+          <p:cNvPr id="259" name="Freeform: Shape 152"/>
+          <p:cNvSpPr/>
+          <p:nvPr/>
+        </p:nvSpPr>
+        <p:spPr>
+          <a:xfrm>
+            <a:off x="673920" y="1688040"/>
+            <a:ext cx="5086440" cy="3128400"/>
+          </a:xfrm>
+          <a:custGeom>
+            <a:avLst/>
+            <a:gdLst>
+              <a:gd name="textAreaLeft" fmla="*/ 0 w 5086440"/>
+              <a:gd name="textAreaRight" fmla="*/ 5086800 w 5086440"/>
+              <a:gd name="textAreaTop" fmla="*/ 0 h 3128400"/>
+              <a:gd name="textAreaBottom" fmla="*/ 3128760 h 3128400"/>
+            </a:gdLst>
+            <a:ahLst/>
+            <a:cxnLst/>
+            <a:rect l="textAreaLeft" t="textAreaTop" r="textAreaRight" b="textAreaBottom"/>
+            <a:pathLst>
+              <a:path w="5086770" h="3128874">
+                <a:moveTo>
+                  <a:pt x="5086770" y="1174706"/>
+                </a:moveTo>
+                <a:lnTo>
+                  <a:pt x="5086770" y="1184663"/>
+                </a:lnTo>
+                <a:lnTo>
+                  <a:pt x="5079830" y="1185820"/>
+                </a:lnTo>
+                <a:cubicBezTo>
+                  <a:pt x="5079829" y="1184277"/>
+                  <a:pt x="5078289" y="1184277"/>
+                  <a:pt x="5078289" y="1182737"/>
+                </a:cubicBezTo>
+                <a:lnTo>
+                  <a:pt x="5078289" y="1179654"/>
+                </a:lnTo>
+                <a:close/>
+                <a:moveTo>
+                  <a:pt x="1690658" y="810655"/>
+                </a:moveTo>
+                <a:lnTo>
+                  <a:pt x="1349061" y="1934928"/>
+                </a:lnTo>
+                <a:lnTo>
+                  <a:pt x="2035854" y="1934928"/>
+                </a:lnTo>
+                <a:close/>
+                <a:moveTo>
+                  <a:pt x="3765314" y="0"/>
+                </a:moveTo>
+                <a:lnTo>
+                  <a:pt x="4465138" y="0"/>
+                </a:lnTo>
+                <a:lnTo>
+                  <a:pt x="4675955" y="0"/>
+                </a:lnTo>
+                <a:lnTo>
+                  <a:pt x="4659036" y="34412"/>
+                </a:lnTo>
+                <a:cubicBezTo>
+                  <a:pt x="4655952" y="37496"/>
+                  <a:pt x="4652870" y="40578"/>
+                  <a:pt x="4651327" y="45203"/>
+                </a:cubicBezTo>
+                <a:cubicBezTo>
+                  <a:pt x="4649787" y="48285"/>
+                  <a:pt x="4649788" y="49827"/>
+                  <a:pt x="4648245" y="51368"/>
+                </a:cubicBezTo>
+                <a:cubicBezTo>
+                  <a:pt x="4632831" y="72947"/>
+                  <a:pt x="4528018" y="224002"/>
+                  <a:pt x="4483319" y="361184"/>
+                </a:cubicBezTo>
+                <a:cubicBezTo>
+                  <a:pt x="4481777" y="365808"/>
+                  <a:pt x="4480236" y="368891"/>
+                  <a:pt x="4480236" y="373515"/>
+                </a:cubicBezTo>
+                <a:cubicBezTo>
+                  <a:pt x="4478694" y="381223"/>
+                  <a:pt x="4475612" y="390471"/>
+                  <a:pt x="4474071" y="398176"/>
+                </a:cubicBezTo>
+                <a:cubicBezTo>
+                  <a:pt x="4466362" y="432087"/>
+                  <a:pt x="4458657" y="465997"/>
+                  <a:pt x="4450950" y="498367"/>
+                </a:cubicBezTo>
+                <a:cubicBezTo>
+                  <a:pt x="4444783" y="506073"/>
+                  <a:pt x="4440160" y="516863"/>
+                  <a:pt x="4440161" y="527652"/>
+                </a:cubicBezTo>
+                <a:cubicBezTo>
+                  <a:pt x="4440160" y="532277"/>
+                  <a:pt x="4440160" y="535360"/>
+                  <a:pt x="4441700" y="539983"/>
+                </a:cubicBezTo>
+                <a:cubicBezTo>
+                  <a:pt x="4440161" y="547691"/>
+                  <a:pt x="4438618" y="555397"/>
+                  <a:pt x="4437078" y="561562"/>
+                </a:cubicBezTo>
+                <a:cubicBezTo>
+                  <a:pt x="4435535" y="566187"/>
+                  <a:pt x="4433995" y="570810"/>
+                  <a:pt x="4433995" y="576976"/>
+                </a:cubicBezTo>
+                <a:cubicBezTo>
+                  <a:pt x="4433995" y="576976"/>
+                  <a:pt x="4433994" y="578519"/>
+                  <a:pt x="4433994" y="578519"/>
+                </a:cubicBezTo>
+                <a:cubicBezTo>
+                  <a:pt x="4417039" y="674083"/>
+                  <a:pt x="4407790" y="755776"/>
+                  <a:pt x="4413956" y="797393"/>
+                </a:cubicBezTo>
+                <a:cubicBezTo>
+                  <a:pt x="4421664" y="846717"/>
+                  <a:pt x="4440160" y="929951"/>
+                  <a:pt x="4438619" y="996230"/>
+                </a:cubicBezTo>
+                <a:cubicBezTo>
+                  <a:pt x="4435535" y="1002395"/>
+                  <a:pt x="4433995" y="1008560"/>
+                  <a:pt x="4433995" y="1016268"/>
+                </a:cubicBezTo>
+                <a:cubicBezTo>
+                  <a:pt x="4433995" y="1019351"/>
+                  <a:pt x="4435536" y="1022434"/>
+                  <a:pt x="4435536" y="1025517"/>
+                </a:cubicBezTo>
+                <a:cubicBezTo>
+                  <a:pt x="4435536" y="1025517"/>
+                  <a:pt x="4435535" y="1027057"/>
+                  <a:pt x="4437078" y="1027057"/>
+                </a:cubicBezTo>
+                <a:cubicBezTo>
+                  <a:pt x="4435536" y="1034764"/>
+                  <a:pt x="4433994" y="1042471"/>
+                  <a:pt x="4432452" y="1048636"/>
+                </a:cubicBezTo>
+                <a:lnTo>
+                  <a:pt x="4413956" y="1085630"/>
+                </a:lnTo>
+                <a:cubicBezTo>
+                  <a:pt x="4369257" y="1164240"/>
+                  <a:pt x="4258278" y="1339957"/>
+                  <a:pt x="4196623" y="1389280"/>
+                </a:cubicBezTo>
+                <a:cubicBezTo>
+                  <a:pt x="4128802" y="1441687"/>
+                  <a:pt x="4062523" y="1538793"/>
+                  <a:pt x="4085645" y="1597365"/>
+                </a:cubicBezTo>
+                <a:cubicBezTo>
+                  <a:pt x="4119555" y="1660562"/>
+                  <a:pt x="4181210" y="1688307"/>
+                  <a:pt x="4216661" y="1697556"/>
+                </a:cubicBezTo>
+                <a:cubicBezTo>
+                  <a:pt x="4252112" y="1706804"/>
+                  <a:pt x="4275233" y="1779247"/>
+                  <a:pt x="4250571" y="1811617"/>
+                </a:cubicBezTo>
+                <a:cubicBezTo>
+                  <a:pt x="4225909" y="1843985"/>
+                  <a:pt x="4187375" y="1853233"/>
+                  <a:pt x="4173502" y="1888685"/>
+                </a:cubicBezTo>
+                <a:cubicBezTo>
+                  <a:pt x="4159630" y="1924137"/>
+                  <a:pt x="4153465" y="1998123"/>
+                  <a:pt x="4213578" y="2022784"/>
+                </a:cubicBezTo>
+                <a:cubicBezTo>
+                  <a:pt x="4259818" y="2041281"/>
+                  <a:pt x="4349219" y="2081356"/>
+                  <a:pt x="4347678" y="2090605"/>
+                </a:cubicBezTo>
+                <a:cubicBezTo>
+                  <a:pt x="4346136" y="2099853"/>
+                  <a:pt x="4250570" y="2107561"/>
+                  <a:pt x="4233616" y="2138388"/>
+                </a:cubicBezTo>
+                <a:cubicBezTo>
+                  <a:pt x="4216660" y="2169216"/>
+                  <a:pt x="4204330" y="2220080"/>
+                  <a:pt x="4227451" y="2258616"/>
+                </a:cubicBezTo>
+                <a:cubicBezTo>
+                  <a:pt x="4250571" y="2297149"/>
+                  <a:pt x="4332264" y="2292526"/>
+                  <a:pt x="4350761" y="2320270"/>
+                </a:cubicBezTo>
+                <a:cubicBezTo>
+                  <a:pt x="4381588" y="2371135"/>
+                  <a:pt x="4358466" y="2378843"/>
+                  <a:pt x="4333805" y="2462077"/>
+                </a:cubicBezTo>
+                <a:cubicBezTo>
+                  <a:pt x="4306060" y="2551476"/>
+                  <a:pt x="4302977" y="2650125"/>
+                  <a:pt x="4467905" y="2719486"/>
+                </a:cubicBezTo>
+                <a:cubicBezTo>
+                  <a:pt x="4562314" y="2758983"/>
+                  <a:pt x="4694054" y="2758743"/>
+                  <a:pt x="4800655" y="2748491"/>
+                </a:cubicBezTo>
+                <a:lnTo>
+                  <a:pt x="4838191" y="2744074"/>
+                </a:lnTo>
+                <a:lnTo>
+                  <a:pt x="4863823" y="2765476"/>
+                </a:lnTo>
+                <a:cubicBezTo>
+                  <a:pt x="4895578" y="2799449"/>
+                  <a:pt x="4917344" y="2847230"/>
+                  <a:pt x="4934321" y="2911083"/>
+                </a:cubicBezTo>
+                <a:cubicBezTo>
+                  <a:pt x="4945640" y="2953651"/>
+                  <a:pt x="4957371" y="3013267"/>
+                  <a:pt x="4964162" y="3074402"/>
+                </a:cubicBezTo>
+                <a:lnTo>
+                  <a:pt x="4967647" y="3128874"/>
+                </a:lnTo>
+                <a:lnTo>
+                  <a:pt x="4465138" y="3128874"/>
+                </a:lnTo>
+                <a:lnTo>
+                  <a:pt x="4465138" y="3127460"/>
+                </a:lnTo>
+                <a:lnTo>
+                  <a:pt x="3765314" y="3127460"/>
+                </a:lnTo>
+                <a:close/>
+                <a:moveTo>
+                  <a:pt x="1175459" y="0"/>
+                </a:moveTo>
+                <a:lnTo>
+                  <a:pt x="2229594" y="0"/>
+                </a:lnTo>
+                <a:lnTo>
+                  <a:pt x="3404781" y="3127460"/>
+                </a:lnTo>
+                <a:lnTo>
+                  <a:pt x="2392789" y="3127460"/>
+                </a:lnTo>
+                <a:lnTo>
+                  <a:pt x="2236317" y="2611186"/>
+                </a:lnTo>
+                <a:lnTo>
+                  <a:pt x="1139165" y="2611186"/>
+                </a:lnTo>
+                <a:lnTo>
+                  <a:pt x="986721" y="3127460"/>
+                </a:lnTo>
+                <a:lnTo>
+                  <a:pt x="0" y="3127460"/>
+                </a:lnTo>
+                <a:close/>
+              </a:path>
+            </a:pathLst>
+          </a:custGeom>
+          <a:solidFill>
+            <a:srgbClr val="002060"/>
+          </a:solidFill>
+          <a:ln>
+            <a:noFill/>
+          </a:ln>
+        </p:spPr>
+        <p:style>
+          <a:lnRef idx="2">
+            <a:schemeClr val="accent1">
+              <a:shade val="50000"/>
+            </a:schemeClr>
+          </a:lnRef>
+          <a:fillRef idx="1">
+            <a:schemeClr val="accent1"/>
+          </a:fillRef>
+          <a:effectRef idx="0">
+            <a:schemeClr val="accent1"/>
+          </a:effectRef>
+          <a:fontRef idx="minor"/>
+        </p:style>
+        <p:txBody>
+          <a:bodyPr lIns="90000" tIns="45000" rIns="90000" bIns="45000" anchor="ctr">
+            <a:noAutofit/>
+          </a:bodyPr>
+          <a:lstStyle/>
+          <a:p>
+            <a:pPr algn="ctr">
+              <a:lnSpc>
+                <a:spcPct val="100000"/>
+              </a:lnSpc>
+            </a:pPr>
+            <a:endParaRPr lang="en-US" sz="1800" b="0" strike="noStrike" spc="-1">
+              <a:solidFill>
+                <a:schemeClr val="lt1"/>
+              </a:solidFill>
+              <a:latin typeface="CMU Serif"/>
+              <a:ea typeface="Arial Unicode MS"/>
+            </a:endParaRPr>
+          </a:p>
+        </p:txBody>
+      </p:sp>
+      <p:sp>
+        <p:nvSpPr>
+          <p:cNvPr id="260" name="Rechteck 1"/>
+          <p:cNvSpPr/>
+          <p:nvPr/>
+        </p:nvSpPr>
+        <p:spPr>
+          <a:xfrm>
+            <a:off x="-39240" y="6496920"/>
+            <a:ext cx="12270600" cy="424800"/>
+          </a:xfrm>
+          <a:prstGeom prst="rect">
+            <a:avLst/>
+          </a:prstGeom>
+          <a:solidFill>
+            <a:srgbClr val="AA313F"/>
+          </a:solidFill>
+          <a:ln>
+            <a:noFill/>
+          </a:ln>
+        </p:spPr>
+        <p:style>
+          <a:lnRef idx="2">
+            <a:schemeClr val="accent1">
+              <a:shade val="50000"/>
+            </a:schemeClr>
+          </a:lnRef>
+          <a:fillRef idx="1">
+            <a:schemeClr val="accent1"/>
+          </a:fillRef>
+          <a:effectRef idx="0">
+            <a:schemeClr val="accent1"/>
+          </a:effectRef>
+          <a:fontRef idx="minor"/>
+        </p:style>
+        <p:txBody>
+          <a:bodyPr lIns="90000" tIns="45000" rIns="90000" bIns="45000" anchor="ctr">
+            <a:noAutofit/>
+          </a:bodyPr>
+          <a:lstStyle/>
+          <a:p>
+            <a:pPr algn="ctr">
+              <a:lnSpc>
+                <a:spcPct val="100000"/>
+              </a:lnSpc>
+            </a:pPr>
+            <a:endParaRPr lang="de-DE" sz="1800" b="0" strike="noStrike" spc="-1">
+              <a:solidFill>
+                <a:schemeClr val="lt1"/>
+              </a:solidFill>
+              <a:latin typeface="CMU Serif"/>
+              <a:ea typeface="Arial Unicode MS"/>
+            </a:endParaRPr>
+          </a:p>
+        </p:txBody>
+      </p:sp>
+    </p:spTree>
+  </p:cSld>
+  <p:clrMapOvr>
+    <a:masterClrMapping/>
+  </p:clrMapOvr>
+</p:sld>
+</file>
+
+<file path=ppt/slides/slide12.xml><?xml version="1.0" encoding="utf-8"?>
 <p:sld xmlns:a="http://schemas.openxmlformats.org/drawingml/2006/main" xmlns:r="http://schemas.openxmlformats.org/officeDocument/2006/relationships" xmlns:p="http://schemas.openxmlformats.org/presentationml/2006/main" show="0">
   <p:cSld>
     <p:spTree>
@@ -17361,158 +17849,6 @@
 </p:sld>
 </file>
 
-<file path=ppt/slides/slide12.xml><?xml version="1.0" encoding="utf-8"?>
-<p:sld xmlns:a="http://schemas.openxmlformats.org/drawingml/2006/main" xmlns:r="http://schemas.openxmlformats.org/officeDocument/2006/relationships" xmlns:p="http://schemas.openxmlformats.org/presentationml/2006/main">
-  <p:cSld>
-    <p:spTree>
-      <p:nvGrpSpPr>
-        <p:cNvPr id="1" name=""/>
-        <p:cNvGrpSpPr/>
-        <p:nvPr/>
-      </p:nvGrpSpPr>
-      <p:grpSpPr>
-        <a:xfrm>
-          <a:off x="0" y="0"/>
-          <a:ext cx="0" cy="0"/>
-          <a:chOff x="0" y="0"/>
-          <a:chExt cx="0" cy="0"/>
-        </a:xfrm>
-      </p:grpSpPr>
-      <p:sp>
-        <p:nvSpPr>
-          <p:cNvPr id="268" name="PlaceHolder 1"/>
-          <p:cNvSpPr>
-            <a:spLocks noGrp="1"/>
-          </p:cNvSpPr>
-          <p:nvPr>
-            <p:ph/>
-          </p:nvPr>
-        </p:nvSpPr>
-        <p:spPr>
-          <a:xfrm>
-            <a:off x="690840" y="349200"/>
-            <a:ext cx="3407400" cy="792360"/>
-          </a:xfrm>
-          <a:prstGeom prst="rect">
-            <a:avLst/>
-          </a:prstGeom>
-          <a:noFill/>
-          <a:ln w="0">
-            <a:noFill/>
-          </a:ln>
-        </p:spPr>
-        <p:txBody>
-          <a:bodyPr lIns="90000" tIns="45000" rIns="90000" bIns="45000" anchor="ctr">
-            <a:noAutofit/>
-          </a:bodyPr>
-          <a:lstStyle/>
-          <a:p>
-            <a:pPr indent="0" algn="ctr">
-              <a:lnSpc>
-                <a:spcPct val="100000"/>
-              </a:lnSpc>
-              <a:spcBef>
-                <a:spcPts val="1001"/>
-              </a:spcBef>
-              <a:buNone/>
-              <a:tabLst>
-                <a:tab pos="0" algn="l"/>
-              </a:tabLst>
-            </a:pPr>
-            <a:r>
-              <a:rPr lang="de-DE" sz="5400" b="1" strike="noStrike" spc="-1">
-                <a:solidFill>
-                  <a:srgbClr val="002060"/>
-                </a:solidFill>
-                <a:latin typeface="Bahnschrift SemiLight"/>
-                <a:ea typeface="Arial Unicode MS"/>
-              </a:rPr>
-              <a:t>Content</a:t>
-            </a:r>
-            <a:endParaRPr lang="en-US" sz="5400" b="0" strike="noStrike" spc="-1">
-              <a:solidFill>
-                <a:srgbClr val="000000"/>
-              </a:solidFill>
-              <a:latin typeface="CMU Serif"/>
-            </a:endParaRPr>
-          </a:p>
-        </p:txBody>
-      </p:sp>
-      <p:sp>
-        <p:nvSpPr>
-          <p:cNvPr id="269" name="Textplatzhalter 1"/>
-          <p:cNvSpPr/>
-          <p:nvPr/>
-        </p:nvSpPr>
-        <p:spPr>
-          <a:xfrm>
-            <a:off x="5390640" y="349200"/>
-            <a:ext cx="3407400" cy="792360"/>
-          </a:xfrm>
-          <a:prstGeom prst="rect">
-            <a:avLst/>
-          </a:prstGeom>
-          <a:noFill/>
-          <a:ln w="0">
-            <a:noFill/>
-          </a:ln>
-        </p:spPr>
-        <p:style>
-          <a:lnRef idx="0">
-            <a:scrgbClr r="0" g="0" b="0"/>
-          </a:lnRef>
-          <a:fillRef idx="0">
-            <a:scrgbClr r="0" g="0" b="0"/>
-          </a:fillRef>
-          <a:effectRef idx="0">
-            <a:scrgbClr r="0" g="0" b="0"/>
-          </a:effectRef>
-          <a:fontRef idx="minor"/>
-        </p:style>
-        <p:txBody>
-          <a:bodyPr lIns="90000" tIns="45000" rIns="90000" bIns="45000" anchor="ctr">
-            <a:noAutofit/>
-          </a:bodyPr>
-          <a:lstStyle/>
-          <a:p>
-            <a:pPr algn="ctr">
-              <a:lnSpc>
-                <a:spcPct val="100000"/>
-              </a:lnSpc>
-              <a:spcBef>
-                <a:spcPts val="1001"/>
-              </a:spcBef>
-              <a:tabLst>
-                <a:tab pos="0" algn="l"/>
-              </a:tabLst>
-            </a:pPr>
-            <a:r>
-              <a:rPr lang="de-DE" sz="5400" b="1" strike="noStrike" spc="-1">
-                <a:solidFill>
-                  <a:srgbClr val="002060"/>
-                </a:solidFill>
-                <a:latin typeface="CMU Serif"/>
-                <a:ea typeface="CMU Serif"/>
-              </a:rPr>
-              <a:t>Content</a:t>
-            </a:r>
-            <a:endParaRPr lang="de-DE" sz="5400" b="0" strike="noStrike" spc="-1">
-              <a:solidFill>
-                <a:srgbClr val="000000"/>
-              </a:solidFill>
-              <a:latin typeface="Arial"/>
-            </a:endParaRPr>
-          </a:p>
-        </p:txBody>
-      </p:sp>
-    </p:spTree>
-  </p:cSld>
-  <p:clrMapOvr>
-    <a:masterClrMapping/>
-  </p:clrMapOvr>
-</p:sld>
-</file>
-
 <file path=ppt/slides/slide13.xml><?xml version="1.0" encoding="utf-8"?>
 <p:sld xmlns:a="http://schemas.openxmlformats.org/drawingml/2006/main" xmlns:r="http://schemas.openxmlformats.org/officeDocument/2006/relationships" xmlns:p="http://schemas.openxmlformats.org/presentationml/2006/main">
   <p:cSld>
@@ -17532,6 +17868,158 @@
       </p:grpSpPr>
       <p:sp>
         <p:nvSpPr>
+          <p:cNvPr id="268" name="PlaceHolder 1"/>
+          <p:cNvSpPr>
+            <a:spLocks noGrp="1"/>
+          </p:cNvSpPr>
+          <p:nvPr>
+            <p:ph/>
+          </p:nvPr>
+        </p:nvSpPr>
+        <p:spPr>
+          <a:xfrm>
+            <a:off x="690840" y="349200"/>
+            <a:ext cx="3407400" cy="792360"/>
+          </a:xfrm>
+          <a:prstGeom prst="rect">
+            <a:avLst/>
+          </a:prstGeom>
+          <a:noFill/>
+          <a:ln w="0">
+            <a:noFill/>
+          </a:ln>
+        </p:spPr>
+        <p:txBody>
+          <a:bodyPr lIns="90000" tIns="45000" rIns="90000" bIns="45000" anchor="ctr">
+            <a:noAutofit/>
+          </a:bodyPr>
+          <a:lstStyle/>
+          <a:p>
+            <a:pPr indent="0" algn="ctr">
+              <a:lnSpc>
+                <a:spcPct val="100000"/>
+              </a:lnSpc>
+              <a:spcBef>
+                <a:spcPts val="1001"/>
+              </a:spcBef>
+              <a:buNone/>
+              <a:tabLst>
+                <a:tab pos="0" algn="l"/>
+              </a:tabLst>
+            </a:pPr>
+            <a:r>
+              <a:rPr lang="de-DE" sz="5400" b="1" strike="noStrike" spc="-1">
+                <a:solidFill>
+                  <a:srgbClr val="002060"/>
+                </a:solidFill>
+                <a:latin typeface="Bahnschrift SemiLight"/>
+                <a:ea typeface="Arial Unicode MS"/>
+              </a:rPr>
+              <a:t>Content</a:t>
+            </a:r>
+            <a:endParaRPr lang="en-US" sz="5400" b="0" strike="noStrike" spc="-1">
+              <a:solidFill>
+                <a:srgbClr val="000000"/>
+              </a:solidFill>
+              <a:latin typeface="CMU Serif"/>
+            </a:endParaRPr>
+          </a:p>
+        </p:txBody>
+      </p:sp>
+      <p:sp>
+        <p:nvSpPr>
+          <p:cNvPr id="269" name="Textplatzhalter 1"/>
+          <p:cNvSpPr/>
+          <p:nvPr/>
+        </p:nvSpPr>
+        <p:spPr>
+          <a:xfrm>
+            <a:off x="5390640" y="349200"/>
+            <a:ext cx="3407400" cy="792360"/>
+          </a:xfrm>
+          <a:prstGeom prst="rect">
+            <a:avLst/>
+          </a:prstGeom>
+          <a:noFill/>
+          <a:ln w="0">
+            <a:noFill/>
+          </a:ln>
+        </p:spPr>
+        <p:style>
+          <a:lnRef idx="0">
+            <a:scrgbClr r="0" g="0" b="0"/>
+          </a:lnRef>
+          <a:fillRef idx="0">
+            <a:scrgbClr r="0" g="0" b="0"/>
+          </a:fillRef>
+          <a:effectRef idx="0">
+            <a:scrgbClr r="0" g="0" b="0"/>
+          </a:effectRef>
+          <a:fontRef idx="minor"/>
+        </p:style>
+        <p:txBody>
+          <a:bodyPr lIns="90000" tIns="45000" rIns="90000" bIns="45000" anchor="ctr">
+            <a:noAutofit/>
+          </a:bodyPr>
+          <a:lstStyle/>
+          <a:p>
+            <a:pPr algn="ctr">
+              <a:lnSpc>
+                <a:spcPct val="100000"/>
+              </a:lnSpc>
+              <a:spcBef>
+                <a:spcPts val="1001"/>
+              </a:spcBef>
+              <a:tabLst>
+                <a:tab pos="0" algn="l"/>
+              </a:tabLst>
+            </a:pPr>
+            <a:r>
+              <a:rPr lang="de-DE" sz="5400" b="1" strike="noStrike" spc="-1">
+                <a:solidFill>
+                  <a:srgbClr val="002060"/>
+                </a:solidFill>
+                <a:latin typeface="CMU Serif"/>
+                <a:ea typeface="CMU Serif"/>
+              </a:rPr>
+              <a:t>Content</a:t>
+            </a:r>
+            <a:endParaRPr lang="de-DE" sz="5400" b="0" strike="noStrike" spc="-1">
+              <a:solidFill>
+                <a:srgbClr val="000000"/>
+              </a:solidFill>
+              <a:latin typeface="Arial"/>
+            </a:endParaRPr>
+          </a:p>
+        </p:txBody>
+      </p:sp>
+    </p:spTree>
+  </p:cSld>
+  <p:clrMapOvr>
+    <a:masterClrMapping/>
+  </p:clrMapOvr>
+</p:sld>
+</file>
+
+<file path=ppt/slides/slide14.xml><?xml version="1.0" encoding="utf-8"?>
+<p:sld xmlns:a="http://schemas.openxmlformats.org/drawingml/2006/main" xmlns:r="http://schemas.openxmlformats.org/officeDocument/2006/relationships" xmlns:p="http://schemas.openxmlformats.org/presentationml/2006/main">
+  <p:cSld>
+    <p:spTree>
+      <p:nvGrpSpPr>
+        <p:cNvPr id="1" name=""/>
+        <p:cNvGrpSpPr/>
+        <p:nvPr/>
+      </p:nvGrpSpPr>
+      <p:grpSpPr>
+        <a:xfrm>
+          <a:off x="0" y="0"/>
+          <a:ext cx="0" cy="0"/>
+          <a:chOff x="0" y="0"/>
+          <a:chExt cx="0" cy="0"/>
+        </a:xfrm>
+      </p:grpSpPr>
+      <p:sp>
+        <p:nvSpPr>
           <p:cNvPr id="270" name="PlaceHolder 1"/>
           <p:cNvSpPr>
             <a:spLocks noGrp="1"/>
@@ -17555,7 +18043,7 @@
         </p:spPr>
         <p:txBody>
           <a:bodyPr lIns="90000" tIns="45000" rIns="90000" bIns="45000" anchor="ctr">
-            <a:normAutofit fontScale="79000" lnSpcReduction="10000"/>
+            <a:normAutofit fontScale="86500" lnSpcReduction="20000"/>
           </a:bodyPr>
           <a:lstStyle/>
           <a:p>
@@ -17598,7 +18086,7 @@
 </p:sld>
 </file>
 
-<file path=ppt/slides/slide14.xml><?xml version="1.0" encoding="utf-8"?>
+<file path=ppt/slides/slide15.xml><?xml version="1.0" encoding="utf-8"?>
 <p:sld xmlns:a="http://schemas.openxmlformats.org/drawingml/2006/main" xmlns:r="http://schemas.openxmlformats.org/officeDocument/2006/relationships" xmlns:p="http://schemas.openxmlformats.org/presentationml/2006/main">
   <p:cSld>
     <p:spTree>
@@ -20968,7 +21456,7 @@
         </p:spPr>
         <p:txBody>
           <a:bodyPr lIns="90000" tIns="45000" rIns="90000" bIns="45000" anchor="ctr">
-            <a:normAutofit fontScale="74000" lnSpcReduction="10000"/>
+            <a:normAutofit fontScale="81500" lnSpcReduction="20000"/>
           </a:bodyPr>
           <a:lstStyle/>
           <a:p>
@@ -21461,7 +21949,7 @@
         </p:spPr>
         <p:txBody>
           <a:bodyPr lIns="90000" tIns="45000" rIns="90000" bIns="45000" anchor="ctr">
-            <a:normAutofit fontScale="74000" lnSpcReduction="10000"/>
+            <a:normAutofit fontScale="81500" lnSpcReduction="20000"/>
           </a:bodyPr>
           <a:lstStyle/>
           <a:p>
@@ -22233,6 +22721,192 @@
 </file>
 
 <file path=ppt/slides/slide8.xml><?xml version="1.0" encoding="utf-8"?>
+<p:sld xmlns:a="http://schemas.openxmlformats.org/drawingml/2006/main" xmlns:r="http://schemas.openxmlformats.org/officeDocument/2006/relationships" xmlns:p="http://schemas.openxmlformats.org/presentationml/2006/main">
+  <p:cSld>
+    <p:spTree>
+      <p:nvGrpSpPr>
+        <p:cNvPr id="1" name=""/>
+        <p:cNvGrpSpPr/>
+        <p:nvPr/>
+      </p:nvGrpSpPr>
+      <p:grpSpPr>
+        <a:xfrm>
+          <a:off x="0" y="0"/>
+          <a:ext cx="0" cy="0"/>
+          <a:chOff x="0" y="0"/>
+          <a:chExt cx="0" cy="0"/>
+        </a:xfrm>
+      </p:grpSpPr>
+      <p:sp>
+        <p:nvSpPr>
+          <p:cNvPr id="246" name="PlaceHolder 1"/>
+          <p:cNvSpPr>
+            <a:spLocks noGrp="1"/>
+          </p:cNvSpPr>
+          <p:nvPr>
+            <p:ph/>
+          </p:nvPr>
+        </p:nvSpPr>
+        <p:spPr>
+          <a:xfrm>
+            <a:off x="2063160" y="443506"/>
+            <a:ext cx="8065800" cy="645840"/>
+          </a:xfrm>
+          <a:prstGeom prst="rect">
+            <a:avLst/>
+          </a:prstGeom>
+          <a:noFill/>
+          <a:ln w="0">
+            <a:noFill/>
+          </a:ln>
+        </p:spPr>
+        <p:txBody>
+          <a:bodyPr lIns="90000" tIns="45000" rIns="90000" bIns="45000" anchor="ctr">
+            <a:noAutofit/>
+          </a:bodyPr>
+          <a:lstStyle/>
+          <a:p>
+            <a:pPr indent="0">
+              <a:lnSpc>
+                <a:spcPct val="90000"/>
+              </a:lnSpc>
+              <a:spcBef>
+                <a:spcPts val="1001"/>
+              </a:spcBef>
+              <a:buNone/>
+              <a:tabLst>
+                <a:tab pos="0" algn="l"/>
+              </a:tabLst>
+            </a:pPr>
+            <a:r>
+              <a:rPr lang="de-DE" sz="4000" b="1" strike="noStrike" spc="-1" dirty="0">
+                <a:solidFill>
+                  <a:srgbClr val="FFFFFF"/>
+                </a:solidFill>
+                <a:latin typeface="CMU Serif"/>
+                <a:ea typeface="CMU Serif"/>
+              </a:rPr>
+              <a:t>Bereinigung der Daten 4</a:t>
+            </a:r>
+            <a:endParaRPr lang="en-US" sz="4000" b="0" strike="noStrike" spc="-1" dirty="0">
+              <a:solidFill>
+                <a:srgbClr val="000000"/>
+              </a:solidFill>
+              <a:latin typeface="CMU Serif"/>
+            </a:endParaRPr>
+          </a:p>
+        </p:txBody>
+      </p:sp>
+      <p:sp>
+        <p:nvSpPr>
+          <p:cNvPr id="247" name="Textfeld 2"/>
+          <p:cNvSpPr/>
+          <p:nvPr/>
+        </p:nvSpPr>
+        <p:spPr>
+          <a:xfrm>
+            <a:off x="585360" y="1507548"/>
+            <a:ext cx="9953640" cy="367878"/>
+          </a:xfrm>
+          <a:prstGeom prst="rect">
+            <a:avLst/>
+          </a:prstGeom>
+          <a:noFill/>
+          <a:ln w="0">
+            <a:noFill/>
+          </a:ln>
+        </p:spPr>
+        <p:style>
+          <a:lnRef idx="0">
+            <a:scrgbClr r="0" g="0" b="0"/>
+          </a:lnRef>
+          <a:fillRef idx="0">
+            <a:scrgbClr r="0" g="0" b="0"/>
+          </a:fillRef>
+          <a:effectRef idx="0">
+            <a:scrgbClr r="0" g="0" b="0"/>
+          </a:effectRef>
+          <a:fontRef idx="minor"/>
+        </p:style>
+        <p:txBody>
+          <a:bodyPr lIns="90000" tIns="45000" rIns="90000" bIns="45000" anchor="t">
+            <a:spAutoFit/>
+          </a:bodyPr>
+          <a:lstStyle/>
+          <a:p>
+            <a:pPr>
+              <a:lnSpc>
+                <a:spcPct val="100000"/>
+              </a:lnSpc>
+            </a:pPr>
+            <a:r>
+              <a:rPr lang="de-DE" sz="1800" b="1" strike="noStrike" spc="-1" dirty="0">
+                <a:solidFill>
+                  <a:srgbClr val="000000"/>
+                </a:solidFill>
+                <a:latin typeface="Bahnschrift SemiLight"/>
+                <a:ea typeface="Arial Unicode MS"/>
+              </a:rPr>
+              <a:t>Zusammenfassung von „Color“</a:t>
+            </a:r>
+            <a:endParaRPr lang="de-DE" sz="1800" b="0" strike="noStrike" spc="-1" dirty="0">
+              <a:solidFill>
+                <a:srgbClr val="000000"/>
+              </a:solidFill>
+              <a:latin typeface="Arial"/>
+            </a:endParaRPr>
+          </a:p>
+        </p:txBody>
+      </p:sp>
+      <p:pic>
+        <p:nvPicPr>
+          <p:cNvPr id="6" name="Grafik 5">
+            <a:extLst>
+              <a:ext uri="{FF2B5EF4-FFF2-40B4-BE49-F238E27FC236}">
+                <a16:creationId xmlns:a16="http://schemas.microsoft.com/office/drawing/2014/main" id="{46476479-F540-4A3C-8DFC-D0523E96C2F0}"/>
+              </a:ext>
+            </a:extLst>
+          </p:cNvPr>
+          <p:cNvPicPr>
+            <a:picLocks noChangeAspect="1"/>
+          </p:cNvPicPr>
+          <p:nvPr/>
+        </p:nvPicPr>
+        <p:blipFill rotWithShape="1">
+          <a:blip r:embed="rId2">
+            <a:extLst>
+              <a:ext uri="{28A0092B-C50C-407E-A947-70E740481C1C}">
+                <a14:useLocalDpi xmlns:a14="http://schemas.microsoft.com/office/drawing/2010/main" val="0"/>
+              </a:ext>
+            </a:extLst>
+          </a:blip>
+          <a:srcRect t="2444" b="2102"/>
+          <a:stretch/>
+        </p:blipFill>
+        <p:spPr>
+          <a:xfrm>
+            <a:off x="1375358" y="1875426"/>
+            <a:ext cx="8373644" cy="4792135"/>
+          </a:xfrm>
+          <a:prstGeom prst="rect">
+            <a:avLst/>
+          </a:prstGeom>
+        </p:spPr>
+      </p:pic>
+    </p:spTree>
+    <p:extLst>
+      <p:ext uri="{BB962C8B-B14F-4D97-AF65-F5344CB8AC3E}">
+        <p14:creationId xmlns:p14="http://schemas.microsoft.com/office/powerpoint/2010/main" val="28657778"/>
+      </p:ext>
+    </p:extLst>
+  </p:cSld>
+  <p:clrMapOvr>
+    <a:masterClrMapping/>
+  </p:clrMapOvr>
+</p:sld>
+</file>
+
+<file path=ppt/slides/slide9.xml><?xml version="1.0" encoding="utf-8"?>
 <p:sld xmlns:a="http://schemas.openxmlformats.org/drawingml/2006/main" xmlns:r="http://schemas.openxmlformats.org/officeDocument/2006/relationships" xmlns:p="http://schemas.openxmlformats.org/presentationml/2006/main">
   <p:cSld>
     <p:spTree>
@@ -22658,493 +23332,6 @@
       <p:sp>
         <p:nvSpPr>
           <p:cNvPr id="254" name="Rechteck 1"/>
-          <p:cNvSpPr/>
-          <p:nvPr/>
-        </p:nvSpPr>
-        <p:spPr>
-          <a:xfrm>
-            <a:off x="-39240" y="6496920"/>
-            <a:ext cx="12270600" cy="424800"/>
-          </a:xfrm>
-          <a:prstGeom prst="rect">
-            <a:avLst/>
-          </a:prstGeom>
-          <a:solidFill>
-            <a:srgbClr val="AA313F"/>
-          </a:solidFill>
-          <a:ln>
-            <a:noFill/>
-          </a:ln>
-        </p:spPr>
-        <p:style>
-          <a:lnRef idx="2">
-            <a:schemeClr val="accent1">
-              <a:shade val="50000"/>
-            </a:schemeClr>
-          </a:lnRef>
-          <a:fillRef idx="1">
-            <a:schemeClr val="accent1"/>
-          </a:fillRef>
-          <a:effectRef idx="0">
-            <a:schemeClr val="accent1"/>
-          </a:effectRef>
-          <a:fontRef idx="minor"/>
-        </p:style>
-        <p:txBody>
-          <a:bodyPr lIns="90000" tIns="45000" rIns="90000" bIns="45000" anchor="ctr">
-            <a:noAutofit/>
-          </a:bodyPr>
-          <a:lstStyle/>
-          <a:p>
-            <a:pPr algn="ctr">
-              <a:lnSpc>
-                <a:spcPct val="100000"/>
-              </a:lnSpc>
-            </a:pPr>
-            <a:endParaRPr lang="de-DE" sz="1800" b="0" strike="noStrike" spc="-1">
-              <a:solidFill>
-                <a:schemeClr val="lt1"/>
-              </a:solidFill>
-              <a:latin typeface="CMU Serif"/>
-              <a:ea typeface="Arial Unicode MS"/>
-            </a:endParaRPr>
-          </a:p>
-        </p:txBody>
-      </p:sp>
-    </p:spTree>
-  </p:cSld>
-  <p:clrMapOvr>
-    <a:masterClrMapping/>
-  </p:clrMapOvr>
-</p:sld>
-</file>
-
-<file path=ppt/slides/slide9.xml><?xml version="1.0" encoding="utf-8"?>
-<p:sld xmlns:a="http://schemas.openxmlformats.org/drawingml/2006/main" xmlns:r="http://schemas.openxmlformats.org/officeDocument/2006/relationships" xmlns:p="http://schemas.openxmlformats.org/presentationml/2006/main">
-  <p:cSld>
-    <p:spTree>
-      <p:nvGrpSpPr>
-        <p:cNvPr id="1" name=""/>
-        <p:cNvGrpSpPr/>
-        <p:nvPr/>
-      </p:nvGrpSpPr>
-      <p:grpSpPr>
-        <a:xfrm>
-          <a:off x="0" y="0"/>
-          <a:ext cx="0" cy="0"/>
-          <a:chOff x="0" y="0"/>
-          <a:chExt cx="0" cy="0"/>
-        </a:xfrm>
-      </p:grpSpPr>
-      <p:sp>
-        <p:nvSpPr>
-          <p:cNvPr id="255" name="TextBox 3"/>
-          <p:cNvSpPr/>
-          <p:nvPr/>
-        </p:nvSpPr>
-        <p:spPr>
-          <a:xfrm>
-            <a:off x="5686920" y="2660040"/>
-            <a:ext cx="6328080" cy="1537200"/>
-          </a:xfrm>
-          <a:prstGeom prst="rect">
-            <a:avLst/>
-          </a:prstGeom>
-          <a:noFill/>
-          <a:ln w="0">
-            <a:noFill/>
-          </a:ln>
-        </p:spPr>
-        <p:style>
-          <a:lnRef idx="0">
-            <a:scrgbClr r="0" g="0" b="0"/>
-          </a:lnRef>
-          <a:fillRef idx="0">
-            <a:scrgbClr r="0" g="0" b="0"/>
-          </a:fillRef>
-          <a:effectRef idx="0">
-            <a:scrgbClr r="0" g="0" b="0"/>
-          </a:effectRef>
-          <a:fontRef idx="minor"/>
-        </p:style>
-        <p:txBody>
-          <a:bodyPr lIns="90000" tIns="45000" rIns="90000" bIns="45000" anchor="ctr">
-            <a:spAutoFit/>
-          </a:bodyPr>
-          <a:lstStyle/>
-          <a:p>
-            <a:pPr algn="ctr">
-              <a:lnSpc>
-                <a:spcPts val="5400"/>
-              </a:lnSpc>
-              <a:spcAft>
-                <a:spcPts val="601"/>
-              </a:spcAft>
-            </a:pPr>
-            <a:r>
-              <a:rPr lang="de-DE" sz="5500" b="1" strike="noStrike" spc="-1">
-                <a:solidFill>
-                  <a:srgbClr val="002060"/>
-                </a:solidFill>
-                <a:latin typeface="CMU Serif"/>
-                <a:ea typeface="CMU Serif"/>
-              </a:rPr>
-              <a:t>3. Maschinelles </a:t>
-            </a:r>
-            <a:endParaRPr lang="de-DE" sz="5500" b="0" strike="noStrike" spc="-1">
-              <a:solidFill>
-                <a:srgbClr val="000000"/>
-              </a:solidFill>
-              <a:latin typeface="Arial"/>
-            </a:endParaRPr>
-          </a:p>
-          <a:p>
-            <a:pPr algn="ctr">
-              <a:lnSpc>
-                <a:spcPts val="5400"/>
-              </a:lnSpc>
-              <a:spcAft>
-                <a:spcPts val="601"/>
-              </a:spcAft>
-            </a:pPr>
-            <a:r>
-              <a:rPr lang="de-DE" sz="5500" b="1" strike="noStrike" spc="-1">
-                <a:solidFill>
-                  <a:srgbClr val="002060"/>
-                </a:solidFill>
-                <a:latin typeface="CMU Serif"/>
-                <a:ea typeface="CMU Serif"/>
-              </a:rPr>
-              <a:t>Lernverfahren 2</a:t>
-            </a:r>
-            <a:endParaRPr lang="de-DE" sz="5500" b="0" strike="noStrike" spc="-1">
-              <a:solidFill>
-                <a:srgbClr val="000000"/>
-              </a:solidFill>
-              <a:latin typeface="Arial"/>
-            </a:endParaRPr>
-          </a:p>
-        </p:txBody>
-      </p:sp>
-      <p:sp>
-        <p:nvSpPr>
-          <p:cNvPr id="256" name="Freeform: Shape 152"/>
-          <p:cNvSpPr/>
-          <p:nvPr/>
-        </p:nvSpPr>
-        <p:spPr>
-          <a:xfrm>
-            <a:off x="673920" y="1688040"/>
-            <a:ext cx="5086440" cy="3128400"/>
-          </a:xfrm>
-          <a:custGeom>
-            <a:avLst/>
-            <a:gdLst>
-              <a:gd name="textAreaLeft" fmla="*/ 0 w 5086440"/>
-              <a:gd name="textAreaRight" fmla="*/ 5086800 w 5086440"/>
-              <a:gd name="textAreaTop" fmla="*/ 0 h 3128400"/>
-              <a:gd name="textAreaBottom" fmla="*/ 3128760 h 3128400"/>
-            </a:gdLst>
-            <a:ahLst/>
-            <a:cxnLst/>
-            <a:rect l="textAreaLeft" t="textAreaTop" r="textAreaRight" b="textAreaBottom"/>
-            <a:pathLst>
-              <a:path w="5086770" h="3128874">
-                <a:moveTo>
-                  <a:pt x="5086770" y="1174706"/>
-                </a:moveTo>
-                <a:lnTo>
-                  <a:pt x="5086770" y="1184663"/>
-                </a:lnTo>
-                <a:lnTo>
-                  <a:pt x="5079830" y="1185820"/>
-                </a:lnTo>
-                <a:cubicBezTo>
-                  <a:pt x="5079829" y="1184277"/>
-                  <a:pt x="5078289" y="1184277"/>
-                  <a:pt x="5078289" y="1182737"/>
-                </a:cubicBezTo>
-                <a:lnTo>
-                  <a:pt x="5078289" y="1179654"/>
-                </a:lnTo>
-                <a:close/>
-                <a:moveTo>
-                  <a:pt x="1690658" y="810655"/>
-                </a:moveTo>
-                <a:lnTo>
-                  <a:pt x="1349061" y="1934928"/>
-                </a:lnTo>
-                <a:lnTo>
-                  <a:pt x="2035854" y="1934928"/>
-                </a:lnTo>
-                <a:close/>
-                <a:moveTo>
-                  <a:pt x="3765314" y="0"/>
-                </a:moveTo>
-                <a:lnTo>
-                  <a:pt x="4465138" y="0"/>
-                </a:lnTo>
-                <a:lnTo>
-                  <a:pt x="4675955" y="0"/>
-                </a:lnTo>
-                <a:lnTo>
-                  <a:pt x="4659036" y="34412"/>
-                </a:lnTo>
-                <a:cubicBezTo>
-                  <a:pt x="4655952" y="37496"/>
-                  <a:pt x="4652870" y="40578"/>
-                  <a:pt x="4651327" y="45203"/>
-                </a:cubicBezTo>
-                <a:cubicBezTo>
-                  <a:pt x="4649787" y="48285"/>
-                  <a:pt x="4649788" y="49827"/>
-                  <a:pt x="4648245" y="51368"/>
-                </a:cubicBezTo>
-                <a:cubicBezTo>
-                  <a:pt x="4632831" y="72947"/>
-                  <a:pt x="4528018" y="224002"/>
-                  <a:pt x="4483319" y="361184"/>
-                </a:cubicBezTo>
-                <a:cubicBezTo>
-                  <a:pt x="4481777" y="365808"/>
-                  <a:pt x="4480236" y="368891"/>
-                  <a:pt x="4480236" y="373515"/>
-                </a:cubicBezTo>
-                <a:cubicBezTo>
-                  <a:pt x="4478694" y="381223"/>
-                  <a:pt x="4475612" y="390471"/>
-                  <a:pt x="4474071" y="398176"/>
-                </a:cubicBezTo>
-                <a:cubicBezTo>
-                  <a:pt x="4466362" y="432087"/>
-                  <a:pt x="4458657" y="465997"/>
-                  <a:pt x="4450950" y="498367"/>
-                </a:cubicBezTo>
-                <a:cubicBezTo>
-                  <a:pt x="4444783" y="506073"/>
-                  <a:pt x="4440160" y="516863"/>
-                  <a:pt x="4440161" y="527652"/>
-                </a:cubicBezTo>
-                <a:cubicBezTo>
-                  <a:pt x="4440160" y="532277"/>
-                  <a:pt x="4440160" y="535360"/>
-                  <a:pt x="4441700" y="539983"/>
-                </a:cubicBezTo>
-                <a:cubicBezTo>
-                  <a:pt x="4440161" y="547691"/>
-                  <a:pt x="4438618" y="555397"/>
-                  <a:pt x="4437078" y="561562"/>
-                </a:cubicBezTo>
-                <a:cubicBezTo>
-                  <a:pt x="4435535" y="566187"/>
-                  <a:pt x="4433995" y="570810"/>
-                  <a:pt x="4433995" y="576976"/>
-                </a:cubicBezTo>
-                <a:cubicBezTo>
-                  <a:pt x="4433995" y="576976"/>
-                  <a:pt x="4433994" y="578519"/>
-                  <a:pt x="4433994" y="578519"/>
-                </a:cubicBezTo>
-                <a:cubicBezTo>
-                  <a:pt x="4417039" y="674083"/>
-                  <a:pt x="4407790" y="755776"/>
-                  <a:pt x="4413956" y="797393"/>
-                </a:cubicBezTo>
-                <a:cubicBezTo>
-                  <a:pt x="4421664" y="846717"/>
-                  <a:pt x="4440160" y="929951"/>
-                  <a:pt x="4438619" y="996230"/>
-                </a:cubicBezTo>
-                <a:cubicBezTo>
-                  <a:pt x="4435535" y="1002395"/>
-                  <a:pt x="4433995" y="1008560"/>
-                  <a:pt x="4433995" y="1016268"/>
-                </a:cubicBezTo>
-                <a:cubicBezTo>
-                  <a:pt x="4433995" y="1019351"/>
-                  <a:pt x="4435536" y="1022434"/>
-                  <a:pt x="4435536" y="1025517"/>
-                </a:cubicBezTo>
-                <a:cubicBezTo>
-                  <a:pt x="4435536" y="1025517"/>
-                  <a:pt x="4435535" y="1027057"/>
-                  <a:pt x="4437078" y="1027057"/>
-                </a:cubicBezTo>
-                <a:cubicBezTo>
-                  <a:pt x="4435536" y="1034764"/>
-                  <a:pt x="4433994" y="1042471"/>
-                  <a:pt x="4432452" y="1048636"/>
-                </a:cubicBezTo>
-                <a:lnTo>
-                  <a:pt x="4413956" y="1085630"/>
-                </a:lnTo>
-                <a:cubicBezTo>
-                  <a:pt x="4369257" y="1164240"/>
-                  <a:pt x="4258278" y="1339957"/>
-                  <a:pt x="4196623" y="1389280"/>
-                </a:cubicBezTo>
-                <a:cubicBezTo>
-                  <a:pt x="4128802" y="1441687"/>
-                  <a:pt x="4062523" y="1538793"/>
-                  <a:pt x="4085645" y="1597365"/>
-                </a:cubicBezTo>
-                <a:cubicBezTo>
-                  <a:pt x="4119555" y="1660562"/>
-                  <a:pt x="4181210" y="1688307"/>
-                  <a:pt x="4216661" y="1697556"/>
-                </a:cubicBezTo>
-                <a:cubicBezTo>
-                  <a:pt x="4252112" y="1706804"/>
-                  <a:pt x="4275233" y="1779247"/>
-                  <a:pt x="4250571" y="1811617"/>
-                </a:cubicBezTo>
-                <a:cubicBezTo>
-                  <a:pt x="4225909" y="1843985"/>
-                  <a:pt x="4187375" y="1853233"/>
-                  <a:pt x="4173502" y="1888685"/>
-                </a:cubicBezTo>
-                <a:cubicBezTo>
-                  <a:pt x="4159630" y="1924137"/>
-                  <a:pt x="4153465" y="1998123"/>
-                  <a:pt x="4213578" y="2022784"/>
-                </a:cubicBezTo>
-                <a:cubicBezTo>
-                  <a:pt x="4259818" y="2041281"/>
-                  <a:pt x="4349219" y="2081356"/>
-                  <a:pt x="4347678" y="2090605"/>
-                </a:cubicBezTo>
-                <a:cubicBezTo>
-                  <a:pt x="4346136" y="2099853"/>
-                  <a:pt x="4250570" y="2107561"/>
-                  <a:pt x="4233616" y="2138388"/>
-                </a:cubicBezTo>
-                <a:cubicBezTo>
-                  <a:pt x="4216660" y="2169216"/>
-                  <a:pt x="4204330" y="2220080"/>
-                  <a:pt x="4227451" y="2258616"/>
-                </a:cubicBezTo>
-                <a:cubicBezTo>
-                  <a:pt x="4250571" y="2297149"/>
-                  <a:pt x="4332264" y="2292526"/>
-                  <a:pt x="4350761" y="2320270"/>
-                </a:cubicBezTo>
-                <a:cubicBezTo>
-                  <a:pt x="4381588" y="2371135"/>
-                  <a:pt x="4358466" y="2378843"/>
-                  <a:pt x="4333805" y="2462077"/>
-                </a:cubicBezTo>
-                <a:cubicBezTo>
-                  <a:pt x="4306060" y="2551476"/>
-                  <a:pt x="4302977" y="2650125"/>
-                  <a:pt x="4467905" y="2719486"/>
-                </a:cubicBezTo>
-                <a:cubicBezTo>
-                  <a:pt x="4562314" y="2758983"/>
-                  <a:pt x="4694054" y="2758743"/>
-                  <a:pt x="4800655" y="2748491"/>
-                </a:cubicBezTo>
-                <a:lnTo>
-                  <a:pt x="4838191" y="2744074"/>
-                </a:lnTo>
-                <a:lnTo>
-                  <a:pt x="4863823" y="2765476"/>
-                </a:lnTo>
-                <a:cubicBezTo>
-                  <a:pt x="4895578" y="2799449"/>
-                  <a:pt x="4917344" y="2847230"/>
-                  <a:pt x="4934321" y="2911083"/>
-                </a:cubicBezTo>
-                <a:cubicBezTo>
-                  <a:pt x="4945640" y="2953651"/>
-                  <a:pt x="4957371" y="3013267"/>
-                  <a:pt x="4964162" y="3074402"/>
-                </a:cubicBezTo>
-                <a:lnTo>
-                  <a:pt x="4967647" y="3128874"/>
-                </a:lnTo>
-                <a:lnTo>
-                  <a:pt x="4465138" y="3128874"/>
-                </a:lnTo>
-                <a:lnTo>
-                  <a:pt x="4465138" y="3127460"/>
-                </a:lnTo>
-                <a:lnTo>
-                  <a:pt x="3765314" y="3127460"/>
-                </a:lnTo>
-                <a:close/>
-                <a:moveTo>
-                  <a:pt x="1175459" y="0"/>
-                </a:moveTo>
-                <a:lnTo>
-                  <a:pt x="2229594" y="0"/>
-                </a:lnTo>
-                <a:lnTo>
-                  <a:pt x="3404781" y="3127460"/>
-                </a:lnTo>
-                <a:lnTo>
-                  <a:pt x="2392789" y="3127460"/>
-                </a:lnTo>
-                <a:lnTo>
-                  <a:pt x="2236317" y="2611186"/>
-                </a:lnTo>
-                <a:lnTo>
-                  <a:pt x="1139165" y="2611186"/>
-                </a:lnTo>
-                <a:lnTo>
-                  <a:pt x="986721" y="3127460"/>
-                </a:lnTo>
-                <a:lnTo>
-                  <a:pt x="0" y="3127460"/>
-                </a:lnTo>
-                <a:close/>
-              </a:path>
-            </a:pathLst>
-          </a:custGeom>
-          <a:solidFill>
-            <a:srgbClr val="002060"/>
-          </a:solidFill>
-          <a:ln>
-            <a:noFill/>
-          </a:ln>
-        </p:spPr>
-        <p:style>
-          <a:lnRef idx="2">
-            <a:schemeClr val="accent1">
-              <a:shade val="50000"/>
-            </a:schemeClr>
-          </a:lnRef>
-          <a:fillRef idx="1">
-            <a:schemeClr val="accent1"/>
-          </a:fillRef>
-          <a:effectRef idx="0">
-            <a:schemeClr val="accent1"/>
-          </a:effectRef>
-          <a:fontRef idx="minor"/>
-        </p:style>
-        <p:txBody>
-          <a:bodyPr lIns="90000" tIns="45000" rIns="90000" bIns="45000" anchor="ctr">
-            <a:noAutofit/>
-          </a:bodyPr>
-          <a:lstStyle/>
-          <a:p>
-            <a:pPr algn="ctr">
-              <a:lnSpc>
-                <a:spcPct val="100000"/>
-              </a:lnSpc>
-            </a:pPr>
-            <a:endParaRPr lang="en-US" sz="1800" b="0" strike="noStrike" spc="-1">
-              <a:solidFill>
-                <a:schemeClr val="lt1"/>
-              </a:solidFill>
-              <a:latin typeface="CMU Serif"/>
-              <a:ea typeface="Arial Unicode MS"/>
-            </a:endParaRPr>
-          </a:p>
-        </p:txBody>
-      </p:sp>
-      <p:sp>
-        <p:nvSpPr>
-          <p:cNvPr id="257" name="Rechteck 1"/>
           <p:cNvSpPr/>
           <p:nvPr/>
         </p:nvSpPr>

</xml_diff>

<commit_message>
ppt erweitert um entscheidungsbaum
</commit_message>
<xml_diff>
--- a/Präsentation_Vorlage.pptx
+++ b/Präsentation_Vorlage.pptx
@@ -11032,7 +11032,7 @@
         <p:spPr>
           <a:xfrm>
             <a:off x="323640" y="6357240"/>
-            <a:ext cx="11867400" cy="338400"/>
+            <a:ext cx="11867040" cy="338040"/>
           </a:xfrm>
           <a:prstGeom prst="rect">
             <a:avLst/>
@@ -11087,15 +11087,15 @@
         <p:spPr>
           <a:xfrm>
             <a:off x="323640" y="6349320"/>
-            <a:ext cx="564120" cy="346680"/>
+            <a:ext cx="563760" cy="346320"/>
           </a:xfrm>
           <a:custGeom>
             <a:avLst/>
             <a:gdLst>
-              <a:gd name="textAreaLeft" fmla="*/ 0 w 564120"/>
-              <a:gd name="textAreaRight" fmla="*/ 565200 w 564120"/>
-              <a:gd name="textAreaTop" fmla="*/ 0 h 346680"/>
-              <a:gd name="textAreaBottom" fmla="*/ 347760 h 346680"/>
+              <a:gd name="textAreaLeft" fmla="*/ 0 w 563760"/>
+              <a:gd name="textAreaRight" fmla="*/ 565200 w 563760"/>
+              <a:gd name="textAreaTop" fmla="*/ 0 h 346320"/>
+              <a:gd name="textAreaBottom" fmla="*/ 347760 h 346320"/>
             </a:gdLst>
             <a:ahLst/>
             <a:rect l="textAreaLeft" t="textAreaTop" r="textAreaRight" b="textAreaBottom"/>
@@ -11487,16 +11487,7 @@
                 </a:solidFill>
                 <a:latin typeface="Arial"/>
               </a:rPr>
-              <a:t>Format des Gliederungstextes durch </a:t>
-            </a:r>
-            <a:r>
-              <a:rPr b="0" lang="de-DE" sz="3200" spc="-1" strike="noStrike">
-                <a:solidFill>
-                  <a:srgbClr val="000000"/>
-                </a:solidFill>
-                <a:latin typeface="Arial"/>
-              </a:rPr>
-              <a:t>Klicken bearbeiten</a:t>
+              <a:t>Format des Gliederungstextes durch Klicken bearbeiten</a:t>
             </a:r>
             <a:endParaRPr b="0" lang="de-DE" sz="3200" spc="-1" strike="noStrike">
               <a:solidFill>
@@ -11728,15 +11719,15 @@
         <p:spPr>
           <a:xfrm>
             <a:off x="0" y="161280"/>
-            <a:ext cx="11190240" cy="1024920"/>
+            <a:ext cx="11189880" cy="1024560"/>
           </a:xfrm>
           <a:custGeom>
             <a:avLst/>
             <a:gdLst>
-              <a:gd name="textAreaLeft" fmla="*/ 0 w 11190240"/>
-              <a:gd name="textAreaRight" fmla="*/ 11191320 w 11190240"/>
-              <a:gd name="textAreaTop" fmla="*/ 0 h 1024920"/>
-              <a:gd name="textAreaBottom" fmla="*/ 1026000 h 1024920"/>
+              <a:gd name="textAreaLeft" fmla="*/ 0 w 11189880"/>
+              <a:gd name="textAreaRight" fmla="*/ 11191320 w 11189880"/>
+              <a:gd name="textAreaTop" fmla="*/ 0 h 1024560"/>
+              <a:gd name="textAreaBottom" fmla="*/ 1026000 h 1024560"/>
             </a:gdLst>
             <a:ahLst/>
             <a:rect l="textAreaLeft" t="textAreaTop" r="textAreaRight" b="textAreaBottom"/>
@@ -11815,15 +11806,15 @@
         <p:spPr>
           <a:xfrm>
             <a:off x="0" y="161280"/>
-            <a:ext cx="1667160" cy="1024920"/>
+            <a:ext cx="1666800" cy="1024560"/>
           </a:xfrm>
           <a:custGeom>
             <a:avLst/>
             <a:gdLst>
-              <a:gd name="textAreaLeft" fmla="*/ 0 w 1667160"/>
-              <a:gd name="textAreaRight" fmla="*/ 1668240 w 1667160"/>
-              <a:gd name="textAreaTop" fmla="*/ 0 h 1024920"/>
-              <a:gd name="textAreaBottom" fmla="*/ 1026000 h 1024920"/>
+              <a:gd name="textAreaLeft" fmla="*/ 0 w 1666800"/>
+              <a:gd name="textAreaRight" fmla="*/ 1668240 w 1666800"/>
+              <a:gd name="textAreaTop" fmla="*/ 0 h 1024560"/>
+              <a:gd name="textAreaBottom" fmla="*/ 1026000 h 1024560"/>
             </a:gdLst>
             <a:ahLst/>
             <a:rect l="textAreaLeft" t="textAreaTop" r="textAreaRight" b="textAreaBottom"/>
@@ -12129,15 +12120,15 @@
         <p:spPr>
           <a:xfrm>
             <a:off x="11288880" y="161280"/>
-            <a:ext cx="901800" cy="1024920"/>
+            <a:ext cx="901440" cy="1024560"/>
           </a:xfrm>
           <a:custGeom>
             <a:avLst/>
             <a:gdLst>
-              <a:gd name="textAreaLeft" fmla="*/ 0 w 901800"/>
-              <a:gd name="textAreaRight" fmla="*/ 902880 w 901800"/>
-              <a:gd name="textAreaTop" fmla="*/ 0 h 1024920"/>
-              <a:gd name="textAreaBottom" fmla="*/ 1026000 h 1024920"/>
+              <a:gd name="textAreaLeft" fmla="*/ 0 w 901440"/>
+              <a:gd name="textAreaRight" fmla="*/ 902880 w 901440"/>
+              <a:gd name="textAreaTop" fmla="*/ 0 h 1024560"/>
+              <a:gd name="textAreaBottom" fmla="*/ 1026000 h 1024560"/>
             </a:gdLst>
             <a:ahLst/>
             <a:rect l="textAreaLeft" t="textAreaTop" r="textAreaRight" b="textAreaBottom"/>
@@ -12305,16 +12296,7 @@
                 </a:solidFill>
                 <a:latin typeface="Arial"/>
               </a:rPr>
-              <a:t>Format des Gliederungstextes durch </a:t>
-            </a:r>
-            <a:r>
-              <a:rPr b="0" lang="de-DE" sz="3200" spc="-1" strike="noStrike">
-                <a:solidFill>
-                  <a:srgbClr val="000000"/>
-                </a:solidFill>
-                <a:latin typeface="Arial"/>
-              </a:rPr>
-              <a:t>Klicken bearbeiten</a:t>
+              <a:t>Format des Gliederungstextes durch Klicken bearbeiten</a:t>
             </a:r>
             <a:endParaRPr b="0" lang="de-DE" sz="3200" spc="-1" strike="noStrike">
               <a:solidFill>
@@ -12865,7 +12847,7 @@
         <p:spPr>
           <a:xfrm>
             <a:off x="0" y="0"/>
-            <a:ext cx="12191040" cy="6856920"/>
+            <a:ext cx="12190680" cy="6856560"/>
           </a:xfrm>
           <a:prstGeom prst="rect">
             <a:avLst/>
@@ -13020,16 +13002,7 @@
                 </a:solidFill>
                 <a:latin typeface="Arial"/>
               </a:rPr>
-              <a:t>Format des Gliederungstextes durch </a:t>
-            </a:r>
-            <a:r>
-              <a:rPr b="0" lang="de-DE" sz="3200" spc="-1" strike="noStrike">
-                <a:solidFill>
-                  <a:srgbClr val="000000"/>
-                </a:solidFill>
-                <a:latin typeface="Arial"/>
-              </a:rPr>
-              <a:t>Klicken bearbeiten</a:t>
+              <a:t>Format des Gliederungstextes durch Klicken bearbeiten</a:t>
             </a:r>
             <a:endParaRPr b="0" lang="de-DE" sz="3200" spc="-1" strike="noStrike">
               <a:solidFill>
@@ -13265,8 +13238,8 @@
         </p:blipFill>
         <p:spPr>
           <a:xfrm flipH="1">
-            <a:off x="597240" y="0"/>
-            <a:ext cx="11594880" cy="6856920"/>
+            <a:off x="597600" y="0"/>
+            <a:ext cx="11594520" cy="6856560"/>
           </a:xfrm>
           <a:prstGeom prst="rect">
             <a:avLst/>
@@ -13600,7 +13573,7 @@
         <p:spPr>
           <a:xfrm>
             <a:off x="0" y="360"/>
-            <a:ext cx="12191040" cy="6856560"/>
+            <a:ext cx="12190680" cy="6856200"/>
           </a:xfrm>
           <a:prstGeom prst="rect">
             <a:avLst/>
@@ -13619,7 +13592,7 @@
         <p:spPr>
           <a:xfrm>
             <a:off x="6877800" y="1430280"/>
-            <a:ext cx="4823280" cy="1918080"/>
+            <a:ext cx="4822920" cy="1918080"/>
           </a:xfrm>
           <a:prstGeom prst="rect">
             <a:avLst/>
@@ -13673,7 +13646,7 @@
         <p:spPr>
           <a:xfrm>
             <a:off x="7379640" y="3132720"/>
-            <a:ext cx="3820320" cy="3157920"/>
+            <a:ext cx="3819960" cy="3157920"/>
           </a:xfrm>
           <a:prstGeom prst="rect">
             <a:avLst/>
@@ -13905,7 +13878,7 @@
         <p:spPr>
           <a:xfrm>
             <a:off x="2063160" y="443520"/>
-            <a:ext cx="8065080" cy="645120"/>
+            <a:ext cx="8064720" cy="644760"/>
           </a:xfrm>
           <a:prstGeom prst="rect">
             <a:avLst/>
@@ -13965,7 +13938,7 @@
         <p:spPr>
           <a:xfrm>
             <a:off x="2352600" y="1267920"/>
-            <a:ext cx="7485840" cy="4850280"/>
+            <a:ext cx="7485480" cy="4849920"/>
           </a:xfrm>
           <a:prstGeom prst="rect">
             <a:avLst/>
@@ -13984,7 +13957,7 @@
         <p:spPr>
           <a:xfrm>
             <a:off x="637200" y="6230520"/>
-            <a:ext cx="9952920" cy="363960"/>
+            <a:ext cx="9952560" cy="363960"/>
           </a:xfrm>
           <a:prstGeom prst="rect">
             <a:avLst/>
@@ -14072,7 +14045,7 @@
         <p:spPr>
           <a:xfrm>
             <a:off x="2063160" y="443520"/>
-            <a:ext cx="8065080" cy="645120"/>
+            <a:ext cx="8064720" cy="644760"/>
           </a:xfrm>
           <a:prstGeom prst="rect">
             <a:avLst/>
@@ -14127,7 +14100,7 @@
         <p:spPr>
           <a:xfrm>
             <a:off x="628560" y="1512000"/>
-            <a:ext cx="9952920" cy="638280"/>
+            <a:ext cx="9952560" cy="638280"/>
           </a:xfrm>
           <a:prstGeom prst="rect">
             <a:avLst/>
@@ -14190,7 +14163,7 @@
         <p:spPr>
           <a:xfrm>
             <a:off x="1131840" y="2229120"/>
-            <a:ext cx="4472640" cy="4184640"/>
+            <a:ext cx="4472280" cy="4184280"/>
           </a:xfrm>
           <a:prstGeom prst="rect">
             <a:avLst/>
@@ -14243,7 +14216,7 @@
         <p:spPr>
           <a:xfrm>
             <a:off x="2063160" y="443520"/>
-            <a:ext cx="8065080" cy="645120"/>
+            <a:ext cx="8064720" cy="644760"/>
           </a:xfrm>
           <a:prstGeom prst="rect">
             <a:avLst/>
@@ -14298,7 +14271,7 @@
         <p:spPr>
           <a:xfrm>
             <a:off x="628560" y="1512000"/>
-            <a:ext cx="9952920" cy="912600"/>
+            <a:ext cx="9952560" cy="912600"/>
           </a:xfrm>
           <a:prstGeom prst="rect">
             <a:avLst/>
@@ -14453,7 +14426,7 @@
         <p:spPr>
           <a:xfrm>
             <a:off x="5686920" y="2698200"/>
-            <a:ext cx="6327360" cy="1460880"/>
+            <a:ext cx="6327000" cy="1460880"/>
           </a:xfrm>
           <a:prstGeom prst="rect">
             <a:avLst/>
@@ -14510,15 +14483,15 @@
         <p:spPr>
           <a:xfrm>
             <a:off x="673920" y="1688040"/>
-            <a:ext cx="5085720" cy="3127680"/>
+            <a:ext cx="5085360" cy="3127320"/>
           </a:xfrm>
           <a:custGeom>
             <a:avLst/>
             <a:gdLst>
-              <a:gd name="textAreaLeft" fmla="*/ 0 w 5085720"/>
-              <a:gd name="textAreaRight" fmla="*/ 5086800 w 5085720"/>
-              <a:gd name="textAreaTop" fmla="*/ 0 h 3127680"/>
-              <a:gd name="textAreaBottom" fmla="*/ 3128760 h 3127680"/>
+              <a:gd name="textAreaLeft" fmla="*/ 0 w 5085360"/>
+              <a:gd name="textAreaRight" fmla="*/ 5086800 w 5085360"/>
+              <a:gd name="textAreaTop" fmla="*/ 0 h 3127320"/>
+              <a:gd name="textAreaBottom" fmla="*/ 3128760 h 3127320"/>
             </a:gdLst>
             <a:ahLst/>
             <a:rect l="textAreaLeft" t="textAreaTop" r="textAreaRight" b="textAreaBottom"/>
@@ -14824,7 +14797,7 @@
         <p:spPr>
           <a:xfrm>
             <a:off x="-39240" y="6496920"/>
-            <a:ext cx="12269880" cy="424080"/>
+            <a:ext cx="12269520" cy="423720"/>
           </a:xfrm>
           <a:prstGeom prst="rect">
             <a:avLst/>
@@ -14913,7 +14886,7 @@
         <p:spPr>
           <a:xfrm>
             <a:off x="2063160" y="443520"/>
-            <a:ext cx="8065080" cy="645120"/>
+            <a:ext cx="8064720" cy="644760"/>
           </a:xfrm>
           <a:prstGeom prst="rect">
             <a:avLst/>
@@ -14968,7 +14941,7 @@
         <p:spPr>
           <a:xfrm>
             <a:off x="628560" y="1512000"/>
-            <a:ext cx="9952920" cy="2558520"/>
+            <a:ext cx="9952560" cy="2558520"/>
           </a:xfrm>
           <a:prstGeom prst="rect">
             <a:avLst/>
@@ -15256,7 +15229,7 @@
         <p:spPr>
           <a:xfrm>
             <a:off x="5686920" y="2698560"/>
-            <a:ext cx="6327360" cy="1460880"/>
+            <a:ext cx="6327000" cy="1460880"/>
           </a:xfrm>
           <a:prstGeom prst="rect">
             <a:avLst/>
@@ -15313,15 +15286,15 @@
         <p:spPr>
           <a:xfrm>
             <a:off x="673920" y="1688040"/>
-            <a:ext cx="5085720" cy="3127680"/>
+            <a:ext cx="5085360" cy="3127320"/>
           </a:xfrm>
           <a:custGeom>
             <a:avLst/>
             <a:gdLst>
-              <a:gd name="textAreaLeft" fmla="*/ 0 w 5085720"/>
-              <a:gd name="textAreaRight" fmla="*/ 5086800 w 5085720"/>
-              <a:gd name="textAreaTop" fmla="*/ 0 h 3127680"/>
-              <a:gd name="textAreaBottom" fmla="*/ 3128760 h 3127680"/>
+              <a:gd name="textAreaLeft" fmla="*/ 0 w 5085360"/>
+              <a:gd name="textAreaRight" fmla="*/ 5086800 w 5085360"/>
+              <a:gd name="textAreaTop" fmla="*/ 0 h 3127320"/>
+              <a:gd name="textAreaBottom" fmla="*/ 3128760 h 3127320"/>
             </a:gdLst>
             <a:ahLst/>
             <a:rect l="textAreaLeft" t="textAreaTop" r="textAreaRight" b="textAreaBottom"/>
@@ -15627,7 +15600,7 @@
         <p:spPr>
           <a:xfrm>
             <a:off x="-39240" y="6496920"/>
-            <a:ext cx="12269880" cy="424080"/>
+            <a:ext cx="12269520" cy="423720"/>
           </a:xfrm>
           <a:prstGeom prst="rect">
             <a:avLst/>
@@ -15716,7 +15689,7 @@
         <p:spPr>
           <a:xfrm>
             <a:off x="2063160" y="443520"/>
-            <a:ext cx="8065080" cy="645120"/>
+            <a:ext cx="8064720" cy="644760"/>
           </a:xfrm>
           <a:prstGeom prst="rect">
             <a:avLst/>
@@ -15762,16 +15735,39 @@
           </a:p>
         </p:txBody>
       </p:sp>
-      <p:sp>
-        <p:nvSpPr>
-          <p:cNvPr id="280" name="Textfeld 4"/>
+      <p:pic>
+        <p:nvPicPr>
+          <p:cNvPr id="280" name="" descr=""/>
+          <p:cNvPicPr/>
+          <p:nvPr/>
+        </p:nvPicPr>
+        <p:blipFill>
+          <a:blip r:embed="rId1"/>
+          <a:stretch/>
+        </p:blipFill>
+        <p:spPr>
+          <a:xfrm>
+            <a:off x="4860000" y="2777040"/>
+            <a:ext cx="7382520" cy="3962520"/>
+          </a:xfrm>
+          <a:prstGeom prst="rect">
+            <a:avLst/>
+          </a:prstGeom>
+          <a:ln w="0">
+            <a:noFill/>
+          </a:ln>
+        </p:spPr>
+      </p:pic>
+      <p:sp>
+        <p:nvSpPr>
+          <p:cNvPr id="281" name="Textfeld 4"/>
           <p:cNvSpPr/>
           <p:nvPr/>
         </p:nvSpPr>
         <p:spPr>
           <a:xfrm>
             <a:off x="628560" y="1512000"/>
-            <a:ext cx="9952920" cy="1186920"/>
+            <a:ext cx="9952560" cy="1735560"/>
           </a:xfrm>
           <a:prstGeom prst="rect">
             <a:avLst/>
@@ -15895,8 +15891,55 @@
                 <a:latin typeface="Bahnschrift SemiLight"/>
                 <a:ea typeface="Arial Unicode MS"/>
               </a:rPr>
-              <a:t> </a:t>
+              <a:t>MAE: 4.898,059 €</a:t>
             </a:r>
+            <a:endParaRPr b="0" lang="de-DE" sz="1800" spc="-1" strike="noStrike">
+              <a:solidFill>
+                <a:srgbClr val="000000"/>
+              </a:solidFill>
+              <a:latin typeface="Arial"/>
+            </a:endParaRPr>
+          </a:p>
+          <a:p>
+            <a:pPr lvl="1" marL="432000" indent="-216000">
+              <a:lnSpc>
+                <a:spcPct val="100000"/>
+              </a:lnSpc>
+              <a:buClr>
+                <a:srgbClr val="000000"/>
+              </a:buClr>
+              <a:buSzPct val="45000"/>
+              <a:buFont typeface="Wingdings" charset="2"/>
+              <a:buChar char=""/>
+            </a:pPr>
+            <a:r>
+              <a:rPr b="0" lang="de-DE" sz="1800" spc="-1" strike="noStrike">
+                <a:solidFill>
+                  <a:srgbClr val="000000"/>
+                </a:solidFill>
+                <a:latin typeface="Bahnschrift SemiLight"/>
+                <a:ea typeface="Arial Unicode MS"/>
+              </a:rPr>
+              <a:t>Kreuzvalidierung unnötig, das Anzahl der Blätter bereits optimal ist</a:t>
+            </a:r>
+            <a:endParaRPr b="0" lang="de-DE" sz="1800" spc="-1" strike="noStrike">
+              <a:solidFill>
+                <a:srgbClr val="000000"/>
+              </a:solidFill>
+              <a:latin typeface="Arial"/>
+            </a:endParaRPr>
+          </a:p>
+          <a:p>
+            <a:pPr marL="285840" indent="-285840">
+              <a:lnSpc>
+                <a:spcPct val="100000"/>
+              </a:lnSpc>
+              <a:buClr>
+                <a:srgbClr val="000000"/>
+              </a:buClr>
+              <a:buFont typeface="Arial"/>
+              <a:buChar char="•"/>
+            </a:pPr>
             <a:endParaRPr b="0" lang="de-DE" sz="1800" spc="-1" strike="noStrike">
               <a:solidFill>
                 <a:srgbClr val="000000"/>
@@ -15938,14 +15981,14 @@
       </p:grpSpPr>
       <p:sp>
         <p:nvSpPr>
-          <p:cNvPr id="281" name="TextBox 3"/>
+          <p:cNvPr id="282" name="TextBox 3"/>
           <p:cNvSpPr/>
           <p:nvPr/>
         </p:nvSpPr>
         <p:spPr>
           <a:xfrm>
             <a:off x="5686920" y="2698200"/>
-            <a:ext cx="6327360" cy="1460880"/>
+            <a:ext cx="6327000" cy="1460880"/>
           </a:xfrm>
           <a:prstGeom prst="rect">
             <a:avLst/>
@@ -15995,22 +16038,22 @@
       </p:sp>
       <p:sp>
         <p:nvSpPr>
-          <p:cNvPr id="282" name="Freeform: Shape 152"/>
+          <p:cNvPr id="283" name="Freeform: Shape 152"/>
           <p:cNvSpPr/>
           <p:nvPr/>
         </p:nvSpPr>
         <p:spPr>
           <a:xfrm>
             <a:off x="673920" y="1688040"/>
-            <a:ext cx="5085720" cy="3127680"/>
+            <a:ext cx="5085360" cy="3127320"/>
           </a:xfrm>
           <a:custGeom>
             <a:avLst/>
             <a:gdLst>
-              <a:gd name="textAreaLeft" fmla="*/ 0 w 5085720"/>
-              <a:gd name="textAreaRight" fmla="*/ 5086800 w 5085720"/>
-              <a:gd name="textAreaTop" fmla="*/ 0 h 3127680"/>
-              <a:gd name="textAreaBottom" fmla="*/ 3128760 h 3127680"/>
+              <a:gd name="textAreaLeft" fmla="*/ 0 w 5085360"/>
+              <a:gd name="textAreaRight" fmla="*/ 5086800 w 5085360"/>
+              <a:gd name="textAreaTop" fmla="*/ 0 h 3127320"/>
+              <a:gd name="textAreaBottom" fmla="*/ 3128760 h 3127320"/>
             </a:gdLst>
             <a:ahLst/>
             <a:rect l="textAreaLeft" t="textAreaTop" r="textAreaRight" b="textAreaBottom"/>
@@ -16309,14 +16352,14 @@
       </p:sp>
       <p:sp>
         <p:nvSpPr>
-          <p:cNvPr id="283" name="Rechteck 1"/>
+          <p:cNvPr id="284" name="Rechteck 1"/>
           <p:cNvSpPr/>
           <p:nvPr/>
         </p:nvSpPr>
         <p:spPr>
           <a:xfrm>
             <a:off x="-39240" y="6496920"/>
-            <a:ext cx="12269880" cy="424080"/>
+            <a:ext cx="12269520" cy="423720"/>
           </a:xfrm>
           <a:prstGeom prst="rect">
             <a:avLst/>
@@ -16394,50 +16437,50 @@
       </p:grpSpPr>
       <p:grpSp>
         <p:nvGrpSpPr>
-          <p:cNvPr id="284" name="Group 32"/>
+          <p:cNvPr id="285" name="Group 32"/>
           <p:cNvGrpSpPr/>
           <p:nvPr/>
         </p:nvGrpSpPr>
         <p:grpSpPr>
           <a:xfrm>
             <a:off x="1313280" y="279720"/>
-            <a:ext cx="9400680" cy="3467520"/>
+            <a:ext cx="9400320" cy="3467160"/>
             <a:chOff x="1313280" y="279720"/>
-            <a:chExt cx="9400680" cy="3467520"/>
+            <a:chExt cx="9400320" cy="3467160"/>
           </a:xfrm>
         </p:grpSpPr>
         <p:grpSp>
           <p:nvGrpSpPr>
-            <p:cNvPr id="285" name="Group 36"/>
+            <p:cNvPr id="286" name="Group 36"/>
             <p:cNvGrpSpPr/>
             <p:nvPr/>
           </p:nvGrpSpPr>
           <p:grpSpPr>
             <a:xfrm>
               <a:off x="4695120" y="279720"/>
-              <a:ext cx="2625840" cy="3411360"/>
+              <a:ext cx="2625480" cy="3411000"/>
               <a:chOff x="4695120" y="279720"/>
-              <a:chExt cx="2625840" cy="3411360"/>
+              <a:chExt cx="2625480" cy="3411000"/>
             </a:xfrm>
           </p:grpSpPr>
           <p:sp>
             <p:nvSpPr>
-              <p:cNvPr id="286" name="Graphic 2"/>
+              <p:cNvPr id="287" name="Graphic 2"/>
               <p:cNvSpPr/>
               <p:nvPr/>
             </p:nvSpPr>
             <p:spPr>
               <a:xfrm>
                 <a:off x="4695120" y="279720"/>
-                <a:ext cx="2625840" cy="3411360"/>
+                <a:ext cx="2625480" cy="3411000"/>
               </a:xfrm>
               <a:custGeom>
                 <a:avLst/>
                 <a:gdLst>
-                  <a:gd name="textAreaLeft" fmla="*/ 0 w 2625840"/>
-                  <a:gd name="textAreaRight" fmla="*/ 2626920 w 2625840"/>
-                  <a:gd name="textAreaTop" fmla="*/ 0 h 3411360"/>
-                  <a:gd name="textAreaBottom" fmla="*/ 3412440 h 3411360"/>
+                  <a:gd name="textAreaLeft" fmla="*/ 0 w 2625480"/>
+                  <a:gd name="textAreaRight" fmla="*/ 2626920 w 2625480"/>
+                  <a:gd name="textAreaTop" fmla="*/ 0 h 3411000"/>
+                  <a:gd name="textAreaBottom" fmla="*/ 3412440 h 3411000"/>
                 </a:gdLst>
                 <a:ahLst/>
                 <a:rect l="textAreaLeft" t="textAreaTop" r="textAreaRight" b="textAreaBottom"/>
@@ -16570,36 +16613,36 @@
           </p:sp>
           <p:grpSp>
             <p:nvGrpSpPr>
-              <p:cNvPr id="287" name="Group 40"/>
+              <p:cNvPr id="288" name="Group 40"/>
               <p:cNvGrpSpPr/>
               <p:nvPr/>
             </p:nvGrpSpPr>
             <p:grpSpPr>
               <a:xfrm>
                 <a:off x="5502960" y="658080"/>
-                <a:ext cx="1326240" cy="1299600"/>
+                <a:ext cx="1325880" cy="1299240"/>
                 <a:chOff x="5502960" y="658080"/>
-                <a:chExt cx="1326240" cy="1299600"/>
+                <a:chExt cx="1325880" cy="1299240"/>
               </a:xfrm>
             </p:grpSpPr>
             <p:sp>
               <p:nvSpPr>
-                <p:cNvPr id="288" name="Graphic 4"/>
+                <p:cNvPr id="289" name="Graphic 4"/>
                 <p:cNvSpPr/>
                 <p:nvPr/>
               </p:nvSpPr>
               <p:spPr>
                 <a:xfrm>
                   <a:off x="5502960" y="658080"/>
-                  <a:ext cx="1326240" cy="1299600"/>
+                  <a:ext cx="1325880" cy="1299240"/>
                 </a:xfrm>
                 <a:custGeom>
                   <a:avLst/>
                   <a:gdLst>
-                    <a:gd name="textAreaLeft" fmla="*/ 0 w 1326240"/>
-                    <a:gd name="textAreaRight" fmla="*/ 1327320 w 1326240"/>
-                    <a:gd name="textAreaTop" fmla="*/ 0 h 1299600"/>
-                    <a:gd name="textAreaBottom" fmla="*/ 1300680 h 1299600"/>
+                    <a:gd name="textAreaLeft" fmla="*/ 0 w 1325880"/>
+                    <a:gd name="textAreaRight" fmla="*/ 1327320 w 1325880"/>
+                    <a:gd name="textAreaTop" fmla="*/ 0 h 1299240"/>
+                    <a:gd name="textAreaBottom" fmla="*/ 1300680 h 1299240"/>
                   </a:gdLst>
                   <a:ahLst/>
                   <a:rect l="textAreaLeft" t="textAreaTop" r="textAreaRight" b="textAreaBottom"/>
@@ -17119,22 +17162,22 @@
             </p:sp>
             <p:sp>
               <p:nvSpPr>
-                <p:cNvPr id="289" name="Freeform: Shape 42"/>
+                <p:cNvPr id="290" name="Freeform: Shape 42"/>
                 <p:cNvSpPr/>
                 <p:nvPr/>
               </p:nvSpPr>
               <p:spPr>
                 <a:xfrm>
                   <a:off x="5824800" y="1128600"/>
-                  <a:ext cx="623160" cy="411480"/>
+                  <a:ext cx="622800" cy="411120"/>
                 </a:xfrm>
                 <a:custGeom>
                   <a:avLst/>
                   <a:gdLst>
-                    <a:gd name="textAreaLeft" fmla="*/ 0 w 623160"/>
-                    <a:gd name="textAreaRight" fmla="*/ 624240 w 623160"/>
-                    <a:gd name="textAreaTop" fmla="*/ 0 h 411480"/>
-                    <a:gd name="textAreaBottom" fmla="*/ 412560 h 411480"/>
+                    <a:gd name="textAreaLeft" fmla="*/ 0 w 622800"/>
+                    <a:gd name="textAreaRight" fmla="*/ 624240 w 622800"/>
+                    <a:gd name="textAreaTop" fmla="*/ 0 h 411120"/>
+                    <a:gd name="textAreaBottom" fmla="*/ 412560 h 411120"/>
                   </a:gdLst>
                   <a:ahLst/>
                   <a:rect l="textAreaLeft" t="textAreaTop" r="textAreaRight" b="textAreaBottom"/>
@@ -17238,14 +17281,14 @@
         </p:grpSp>
         <p:sp>
           <p:nvSpPr>
-            <p:cNvPr id="290" name="Rectangle 38"/>
+            <p:cNvPr id="291" name="Rectangle 38"/>
             <p:cNvSpPr/>
             <p:nvPr/>
           </p:nvSpPr>
           <p:spPr>
             <a:xfrm>
               <a:off x="1313280" y="3684600"/>
-              <a:ext cx="9400680" cy="62640"/>
+              <a:ext cx="9400320" cy="62280"/>
             </a:xfrm>
             <a:prstGeom prst="rect">
               <a:avLst/>
@@ -17321,7 +17364,7 @@
       </p:grpSpPr>
       <p:sp>
         <p:nvSpPr>
-          <p:cNvPr id="291" name="PlaceHolder 1"/>
+          <p:cNvPr id="292" name="PlaceHolder 1"/>
           <p:cNvSpPr>
             <a:spLocks noGrp="1"/>
           </p:cNvSpPr>
@@ -17332,7 +17375,7 @@
         <p:spPr>
           <a:xfrm>
             <a:off x="690840" y="349200"/>
-            <a:ext cx="3406680" cy="791640"/>
+            <a:ext cx="3406320" cy="791280"/>
           </a:xfrm>
           <a:prstGeom prst="rect">
             <a:avLst/>
@@ -17380,14 +17423,14 @@
       </p:sp>
       <p:sp>
         <p:nvSpPr>
-          <p:cNvPr id="292" name="Textplatzhalter 1"/>
+          <p:cNvPr id="293" name="Textplatzhalter 1"/>
           <p:cNvSpPr/>
           <p:nvPr/>
         </p:nvSpPr>
         <p:spPr>
           <a:xfrm>
             <a:off x="5390640" y="349200"/>
-            <a:ext cx="3406680" cy="791640"/>
+            <a:ext cx="3406320" cy="791280"/>
           </a:xfrm>
           <a:prstGeom prst="rect">
             <a:avLst/>
@@ -17477,7 +17520,7 @@
         <p:spPr>
           <a:xfrm>
             <a:off x="0" y="477720"/>
-            <a:ext cx="5445360" cy="775080"/>
+            <a:ext cx="5445000" cy="775080"/>
           </a:xfrm>
           <a:prstGeom prst="rect">
             <a:avLst/>
@@ -17531,7 +17574,7 @@
         <p:spPr>
           <a:xfrm>
             <a:off x="762120" y="1355400"/>
-            <a:ext cx="8846280" cy="2284200"/>
+            <a:ext cx="8845920" cy="2284200"/>
           </a:xfrm>
           <a:prstGeom prst="rect">
             <a:avLst/>
@@ -17789,7 +17832,7 @@
       </p:grpSpPr>
       <p:sp>
         <p:nvSpPr>
-          <p:cNvPr id="293" name="PlaceHolder 1"/>
+          <p:cNvPr id="294" name="PlaceHolder 1"/>
           <p:cNvSpPr>
             <a:spLocks noGrp="1"/>
           </p:cNvSpPr>
@@ -17800,7 +17843,7 @@
         <p:spPr>
           <a:xfrm>
             <a:off x="1983960" y="380160"/>
-            <a:ext cx="8065080" cy="680040"/>
+            <a:ext cx="8064720" cy="679680"/>
           </a:xfrm>
           <a:prstGeom prst="rect">
             <a:avLst/>
@@ -17815,7 +17858,7 @@
             <a:normAutofit fontScale="79000"/>
           </a:bodyPr>
           <a:p>
-            <a:pPr marL="208080" indent="0" algn="ctr">
+            <a:pPr marL="207720" indent="0" algn="ctr">
               <a:lnSpc>
                 <a:spcPct val="90000"/>
               </a:lnSpc>
@@ -17878,14 +17921,14 @@
       </p:grpSpPr>
       <p:sp>
         <p:nvSpPr>
-          <p:cNvPr id="294" name="TextBox 12"/>
+          <p:cNvPr id="295" name="TextBox 12"/>
           <p:cNvSpPr/>
           <p:nvPr/>
         </p:nvSpPr>
         <p:spPr>
           <a:xfrm>
             <a:off x="354600" y="4205520"/>
-            <a:ext cx="4793760" cy="1468080"/>
+            <a:ext cx="4793400" cy="1468080"/>
           </a:xfrm>
           <a:prstGeom prst="rect">
             <a:avLst/>
@@ -18009,7 +18052,7 @@
         <p:spPr>
           <a:xfrm>
             <a:off x="1590840" y="240480"/>
-            <a:ext cx="8065080" cy="1017720"/>
+            <a:ext cx="8064720" cy="1017360"/>
           </a:xfrm>
           <a:prstGeom prst="rect">
             <a:avLst/>
@@ -18064,7 +18107,7 @@
         <p:spPr>
           <a:xfrm>
             <a:off x="596160" y="1539000"/>
-            <a:ext cx="10998720" cy="5064120"/>
+            <a:ext cx="10998360" cy="5064120"/>
           </a:xfrm>
           <a:prstGeom prst="rect">
             <a:avLst/>
@@ -20345,7 +20388,7 @@
         <p:spPr>
           <a:xfrm>
             <a:off x="5959800" y="1899720"/>
-            <a:ext cx="5886360" cy="2832480"/>
+            <a:ext cx="5886000" cy="2832480"/>
           </a:xfrm>
           <a:prstGeom prst="rect">
             <a:avLst/>
@@ -20415,15 +20458,15 @@
         <p:spPr>
           <a:xfrm>
             <a:off x="673920" y="1688040"/>
-            <a:ext cx="5085720" cy="3127680"/>
+            <a:ext cx="5085360" cy="3127320"/>
           </a:xfrm>
           <a:custGeom>
             <a:avLst/>
             <a:gdLst>
-              <a:gd name="textAreaLeft" fmla="*/ 0 w 5085720"/>
-              <a:gd name="textAreaRight" fmla="*/ 5086800 w 5085720"/>
-              <a:gd name="textAreaTop" fmla="*/ 0 h 3127680"/>
-              <a:gd name="textAreaBottom" fmla="*/ 3128760 h 3127680"/>
+              <a:gd name="textAreaLeft" fmla="*/ 0 w 5085360"/>
+              <a:gd name="textAreaRight" fmla="*/ 5086800 w 5085360"/>
+              <a:gd name="textAreaTop" fmla="*/ 0 h 3127320"/>
+              <a:gd name="textAreaBottom" fmla="*/ 3128760 h 3127320"/>
             </a:gdLst>
             <a:ahLst/>
             <a:rect l="textAreaLeft" t="textAreaTop" r="textAreaRight" b="textAreaBottom"/>
@@ -20729,7 +20772,7 @@
         <p:spPr>
           <a:xfrm>
             <a:off x="-39240" y="6496920"/>
-            <a:ext cx="12269880" cy="424080"/>
+            <a:ext cx="12269520" cy="423720"/>
           </a:xfrm>
           <a:prstGeom prst="rect">
             <a:avLst/>
@@ -20818,7 +20861,7 @@
         <p:spPr>
           <a:xfrm>
             <a:off x="2063160" y="460440"/>
-            <a:ext cx="8065080" cy="645120"/>
+            <a:ext cx="8064720" cy="644760"/>
           </a:xfrm>
           <a:prstGeom prst="rect">
             <a:avLst/>
@@ -20830,10 +20873,10 @@
         </p:spPr>
         <p:txBody>
           <a:bodyPr lIns="90000" rIns="90000" tIns="45000" bIns="45000" anchor="ctr">
-            <a:normAutofit fontScale="74000"/>
-          </a:bodyPr>
-          <a:p>
-            <a:pPr marL="207000" indent="0">
+            <a:normAutofit fontScale="73000"/>
+          </a:bodyPr>
+          <a:p>
+            <a:pPr marL="204120" indent="0">
               <a:lnSpc>
                 <a:spcPct val="90000"/>
               </a:lnSpc>
@@ -20873,7 +20916,7 @@
         <p:spPr>
           <a:xfrm>
             <a:off x="585360" y="1788840"/>
-            <a:ext cx="9952920" cy="3655800"/>
+            <a:ext cx="9952560" cy="3655800"/>
           </a:xfrm>
           <a:prstGeom prst="rect">
             <a:avLst/>
@@ -21199,7 +21242,7 @@
         <p:spPr>
           <a:xfrm>
             <a:off x="2063160" y="460440"/>
-            <a:ext cx="8065080" cy="645120"/>
+            <a:ext cx="8064720" cy="644760"/>
           </a:xfrm>
           <a:prstGeom prst="rect">
             <a:avLst/>
@@ -21211,10 +21254,10 @@
         </p:spPr>
         <p:txBody>
           <a:bodyPr lIns="90000" rIns="90000" tIns="45000" bIns="45000" anchor="ctr">
-            <a:normAutofit fontScale="74000"/>
-          </a:bodyPr>
-          <a:p>
-            <a:pPr marL="207000" indent="0">
+            <a:normAutofit fontScale="73000"/>
+          </a:bodyPr>
+          <a:p>
+            <a:pPr marL="204120" indent="0">
               <a:lnSpc>
                 <a:spcPct val="90000"/>
               </a:lnSpc>
@@ -21254,7 +21297,7 @@
         <p:spPr>
           <a:xfrm>
             <a:off x="585360" y="1788840"/>
-            <a:ext cx="9952920" cy="5027400"/>
+            <a:ext cx="9952560" cy="5027400"/>
           </a:xfrm>
           <a:prstGeom prst="rect">
             <a:avLst/>
@@ -21593,7 +21636,7 @@
         <p:spPr>
           <a:xfrm>
             <a:off x="5248800" y="2556360"/>
-            <a:ext cx="3792240" cy="2626920"/>
+            <a:ext cx="3791880" cy="2626560"/>
           </a:xfrm>
           <a:prstGeom prst="rect">
             <a:avLst/>
@@ -21646,7 +21689,7 @@
         <p:spPr>
           <a:xfrm>
             <a:off x="2063160" y="443520"/>
-            <a:ext cx="8065080" cy="645120"/>
+            <a:ext cx="8064720" cy="644760"/>
           </a:xfrm>
           <a:prstGeom prst="rect">
             <a:avLst/>
@@ -21701,7 +21744,7 @@
         <p:spPr>
           <a:xfrm>
             <a:off x="585360" y="1507680"/>
-            <a:ext cx="9952920" cy="638280"/>
+            <a:ext cx="9952560" cy="638280"/>
           </a:xfrm>
           <a:prstGeom prst="rect">
             <a:avLst/>
@@ -21788,7 +21831,7 @@
         <p:spPr>
           <a:xfrm>
             <a:off x="585360" y="2443680"/>
-            <a:ext cx="3213000" cy="3843000"/>
+            <a:ext cx="3212640" cy="3842640"/>
           </a:xfrm>
           <a:prstGeom prst="rect">
             <a:avLst/>
@@ -21812,7 +21855,7 @@
         <p:spPr>
           <a:xfrm>
             <a:off x="6339240" y="2553840"/>
-            <a:ext cx="3252600" cy="3843000"/>
+            <a:ext cx="3252240" cy="3842640"/>
           </a:xfrm>
           <a:prstGeom prst="rect">
             <a:avLst/>
@@ -21831,7 +21874,7 @@
         <p:spPr>
           <a:xfrm>
             <a:off x="4048920" y="4169160"/>
-            <a:ext cx="2039760" cy="392040"/>
+            <a:ext cx="2039400" cy="391680"/>
           </a:xfrm>
           <a:prstGeom prst="rightArrow">
             <a:avLst>
@@ -21926,7 +21969,7 @@
         <p:spPr>
           <a:xfrm>
             <a:off x="1662480" y="2282400"/>
-            <a:ext cx="7798680" cy="4462920"/>
+            <a:ext cx="7798320" cy="4462560"/>
           </a:xfrm>
           <a:prstGeom prst="rect">
             <a:avLst/>
@@ -21949,7 +21992,7 @@
         <p:spPr>
           <a:xfrm>
             <a:off x="2063160" y="443520"/>
-            <a:ext cx="8065080" cy="645120"/>
+            <a:ext cx="8064720" cy="644760"/>
           </a:xfrm>
           <a:prstGeom prst="rect">
             <a:avLst/>
@@ -22004,7 +22047,7 @@
         <p:spPr>
           <a:xfrm>
             <a:off x="585360" y="1553040"/>
-            <a:ext cx="9952920" cy="912600"/>
+            <a:ext cx="9952560" cy="912600"/>
           </a:xfrm>
           <a:prstGeom prst="rect">
             <a:avLst/>
@@ -22120,7 +22163,7 @@
         <p:spPr>
           <a:xfrm>
             <a:off x="2063160" y="443520"/>
-            <a:ext cx="8065080" cy="645120"/>
+            <a:ext cx="8064720" cy="644760"/>
           </a:xfrm>
           <a:prstGeom prst="rect">
             <a:avLst/>
@@ -22175,7 +22218,7 @@
         <p:spPr>
           <a:xfrm>
             <a:off x="585360" y="1483920"/>
-            <a:ext cx="9952920" cy="363960"/>
+            <a:ext cx="9952560" cy="363960"/>
           </a:xfrm>
           <a:prstGeom prst="rect">
             <a:avLst/>
@@ -22234,7 +22277,7 @@
         <p:spPr>
           <a:xfrm>
             <a:off x="1903680" y="1923840"/>
-            <a:ext cx="7316280" cy="4733280"/>
+            <a:ext cx="7315920" cy="4732920"/>
           </a:xfrm>
           <a:prstGeom prst="rect">
             <a:avLst/>

</xml_diff>

<commit_message>
small changes in documentation
</commit_message>
<xml_diff>
--- a/Präsentation_Vorlage.pptx
+++ b/Präsentation_Vorlage.pptx
@@ -17,24 +17,25 @@
     <p:sldId id="279" r:id="rId11"/>
     <p:sldId id="280" r:id="rId12"/>
     <p:sldId id="281" r:id="rId13"/>
-    <p:sldId id="277" r:id="rId14"/>
-    <p:sldId id="260" r:id="rId15"/>
-    <p:sldId id="261" r:id="rId16"/>
-    <p:sldId id="262" r:id="rId17"/>
-    <p:sldId id="263" r:id="rId18"/>
-    <p:sldId id="264" r:id="rId19"/>
-    <p:sldId id="265" r:id="rId20"/>
-    <p:sldId id="266" r:id="rId21"/>
-    <p:sldId id="267" r:id="rId22"/>
-    <p:sldId id="268" r:id="rId23"/>
-    <p:sldId id="269" r:id="rId24"/>
-    <p:sldId id="270" r:id="rId25"/>
-    <p:sldId id="271" r:id="rId26"/>
-    <p:sldId id="272" r:id="rId27"/>
-    <p:sldId id="273" r:id="rId28"/>
-    <p:sldId id="274" r:id="rId29"/>
-    <p:sldId id="275" r:id="rId30"/>
-    <p:sldId id="276" r:id="rId31"/>
+    <p:sldId id="282" r:id="rId14"/>
+    <p:sldId id="277" r:id="rId15"/>
+    <p:sldId id="260" r:id="rId16"/>
+    <p:sldId id="261" r:id="rId17"/>
+    <p:sldId id="262" r:id="rId18"/>
+    <p:sldId id="263" r:id="rId19"/>
+    <p:sldId id="264" r:id="rId20"/>
+    <p:sldId id="265" r:id="rId21"/>
+    <p:sldId id="266" r:id="rId22"/>
+    <p:sldId id="267" r:id="rId23"/>
+    <p:sldId id="268" r:id="rId24"/>
+    <p:sldId id="269" r:id="rId25"/>
+    <p:sldId id="270" r:id="rId26"/>
+    <p:sldId id="271" r:id="rId27"/>
+    <p:sldId id="272" r:id="rId28"/>
+    <p:sldId id="273" r:id="rId29"/>
+    <p:sldId id="274" r:id="rId30"/>
+    <p:sldId id="275" r:id="rId31"/>
+    <p:sldId id="276" r:id="rId32"/>
   </p:sldIdLst>
   <p:sldSz cx="12192000" cy="6858000"/>
   <p:notesSz cx="7559675" cy="10691813"/>
@@ -14028,6 +14029,478 @@
       </p:grpSpPr>
       <p:sp>
         <p:nvSpPr>
+          <p:cNvPr id="247" name="PlaceHolder 1"/>
+          <p:cNvSpPr>
+            <a:spLocks noGrp="1"/>
+          </p:cNvSpPr>
+          <p:nvPr>
+            <p:ph/>
+          </p:nvPr>
+        </p:nvSpPr>
+        <p:spPr>
+          <a:xfrm>
+            <a:off x="2063160" y="460440"/>
+            <a:ext cx="8064360" cy="644400"/>
+          </a:xfrm>
+          <a:prstGeom prst="rect">
+            <a:avLst/>
+          </a:prstGeom>
+          <a:noFill/>
+          <a:ln w="0">
+            <a:noFill/>
+          </a:ln>
+        </p:spPr>
+        <p:txBody>
+          <a:bodyPr lIns="90000" tIns="45000" rIns="90000" bIns="45000" anchor="ctr">
+            <a:normAutofit fontScale="80500" lnSpcReduction="20000"/>
+          </a:bodyPr>
+          <a:lstStyle/>
+          <a:p>
+            <a:pPr marL="204120">
+              <a:lnSpc>
+                <a:spcPct val="90000"/>
+              </a:lnSpc>
+              <a:spcBef>
+                <a:spcPts val="1001"/>
+              </a:spcBef>
+              <a:buNone/>
+              <a:tabLst>
+                <a:tab pos="0" algn="l"/>
+              </a:tabLst>
+            </a:pPr>
+            <a:r>
+              <a:rPr lang="de-DE" sz="5400" b="1" strike="noStrike" spc="-1" dirty="0">
+                <a:solidFill>
+                  <a:srgbClr val="FFFFFF"/>
+                </a:solidFill>
+                <a:latin typeface="CMU Serif"/>
+                <a:ea typeface="CMU Serif"/>
+              </a:rPr>
+              <a:t>Bereinigung der Daten 1</a:t>
+            </a:r>
+            <a:endParaRPr lang="de-DE" sz="5400" b="0" strike="noStrike" spc="-1" dirty="0">
+              <a:latin typeface="Arial"/>
+            </a:endParaRPr>
+          </a:p>
+        </p:txBody>
+      </p:sp>
+      <p:sp>
+        <p:nvSpPr>
+          <p:cNvPr id="248" name="Textfeld 2"/>
+          <p:cNvSpPr/>
+          <p:nvPr/>
+        </p:nvSpPr>
+        <p:spPr>
+          <a:xfrm>
+            <a:off x="585360" y="1788840"/>
+            <a:ext cx="9952200" cy="3930120"/>
+          </a:xfrm>
+          <a:prstGeom prst="rect">
+            <a:avLst/>
+          </a:prstGeom>
+          <a:noFill/>
+          <a:ln w="0">
+            <a:noFill/>
+          </a:ln>
+        </p:spPr>
+        <p:style>
+          <a:lnRef idx="0">
+            <a:scrgbClr r="0" g="0" b="0"/>
+          </a:lnRef>
+          <a:fillRef idx="0">
+            <a:scrgbClr r="0" g="0" b="0"/>
+          </a:fillRef>
+          <a:effectRef idx="0">
+            <a:scrgbClr r="0" g="0" b="0"/>
+          </a:effectRef>
+          <a:fontRef idx="minor"/>
+        </p:style>
+        <p:txBody>
+          <a:bodyPr lIns="90000" tIns="45000" rIns="90000" bIns="45000" anchor="t">
+            <a:spAutoFit/>
+          </a:bodyPr>
+          <a:lstStyle/>
+          <a:p>
+            <a:pPr>
+              <a:lnSpc>
+                <a:spcPct val="100000"/>
+              </a:lnSpc>
+              <a:buNone/>
+            </a:pPr>
+            <a:r>
+              <a:rPr lang="de-DE" sz="1800" b="1" strike="noStrike" spc="-1" dirty="0">
+                <a:solidFill>
+                  <a:srgbClr val="000000"/>
+                </a:solidFill>
+                <a:latin typeface="Bahnschrift SemiLight"/>
+                <a:ea typeface="Arial Unicode MS"/>
+              </a:rPr>
+              <a:t>Entfernung der Spalte „Unnamed..0“</a:t>
+            </a:r>
+            <a:endParaRPr lang="de-DE" sz="1800" b="0" strike="noStrike" spc="-1" dirty="0">
+              <a:latin typeface="Arial"/>
+            </a:endParaRPr>
+          </a:p>
+          <a:p>
+            <a:pPr marL="285840" indent="-285840">
+              <a:lnSpc>
+                <a:spcPct val="100000"/>
+              </a:lnSpc>
+              <a:buClr>
+                <a:srgbClr val="000000"/>
+              </a:buClr>
+              <a:buFont typeface="Arial"/>
+              <a:buChar char="•"/>
+            </a:pPr>
+            <a:r>
+              <a:rPr lang="de-DE" sz="1800" b="0" strike="noStrike" spc="-1" dirty="0">
+                <a:solidFill>
+                  <a:srgbClr val="000000"/>
+                </a:solidFill>
+                <a:latin typeface="Bahnschrift SemiLight"/>
+                <a:ea typeface="Arial Unicode MS"/>
+              </a:rPr>
+              <a:t>Spalte hat keine Relevanz, sie ist reine Nummerierung der Zeilen.</a:t>
+            </a:r>
+            <a:endParaRPr lang="de-DE" sz="1800" b="0" strike="noStrike" spc="-1" dirty="0">
+              <a:latin typeface="Arial"/>
+            </a:endParaRPr>
+          </a:p>
+          <a:p>
+            <a:pPr>
+              <a:lnSpc>
+                <a:spcPct val="100000"/>
+              </a:lnSpc>
+              <a:buNone/>
+            </a:pPr>
+            <a:endParaRPr lang="de-DE" sz="1800" b="0" strike="noStrike" spc="-1" dirty="0">
+              <a:latin typeface="Arial"/>
+            </a:endParaRPr>
+          </a:p>
+          <a:p>
+            <a:pPr>
+              <a:lnSpc>
+                <a:spcPct val="100000"/>
+              </a:lnSpc>
+              <a:buNone/>
+            </a:pPr>
+            <a:r>
+              <a:rPr lang="de-DE" sz="1800" b="1" strike="noStrike" spc="-1" dirty="0">
+                <a:solidFill>
+                  <a:srgbClr val="000000"/>
+                </a:solidFill>
+                <a:latin typeface="Bahnschrift SemiLight"/>
+                <a:ea typeface="Arial Unicode MS"/>
+              </a:rPr>
+              <a:t>Entfernung der Spalte „</a:t>
+            </a:r>
+            <a:r>
+              <a:rPr lang="de-DE" sz="1800" b="1" strike="noStrike" spc="-1" dirty="0" err="1">
+                <a:solidFill>
+                  <a:srgbClr val="000000"/>
+                </a:solidFill>
+                <a:latin typeface="Bahnschrift SemiLight"/>
+                <a:ea typeface="Arial Unicode MS"/>
+              </a:rPr>
+              <a:t>offer_description</a:t>
+            </a:r>
+            <a:r>
+              <a:rPr lang="de-DE" sz="1800" b="1" strike="noStrike" spc="-1" dirty="0">
+                <a:solidFill>
+                  <a:srgbClr val="000000"/>
+                </a:solidFill>
+                <a:latin typeface="Bahnschrift SemiLight"/>
+                <a:ea typeface="Arial Unicode MS"/>
+              </a:rPr>
+              <a:t>“</a:t>
+            </a:r>
+            <a:endParaRPr lang="de-DE" sz="1800" b="0" strike="noStrike" spc="-1" dirty="0">
+              <a:latin typeface="Arial"/>
+            </a:endParaRPr>
+          </a:p>
+          <a:p>
+            <a:pPr marL="285840" indent="-285840">
+              <a:lnSpc>
+                <a:spcPct val="100000"/>
+              </a:lnSpc>
+              <a:buClr>
+                <a:srgbClr val="000000"/>
+              </a:buClr>
+              <a:buFont typeface="Arial"/>
+              <a:buChar char="•"/>
+            </a:pPr>
+            <a:r>
+              <a:rPr lang="de-DE" sz="1800" b="0" strike="noStrike" spc="-1" dirty="0">
+                <a:solidFill>
+                  <a:srgbClr val="000000"/>
+                </a:solidFill>
+                <a:latin typeface="Bahnschrift SemiLight"/>
+                <a:ea typeface="Arial Unicode MS"/>
+              </a:rPr>
+              <a:t>Z.B.: wurde geschaut, ob in der Spalte </a:t>
+            </a:r>
+            <a:r>
+              <a:rPr lang="de-DE" sz="1800" b="0" strike="noStrike" spc="-1" dirty="0" err="1">
+                <a:solidFill>
+                  <a:srgbClr val="000000"/>
+                </a:solidFill>
+                <a:latin typeface="Bahnschrift SemiLight"/>
+                <a:ea typeface="Arial Unicode MS"/>
+              </a:rPr>
+              <a:t>offer_description</a:t>
+            </a:r>
+            <a:r>
+              <a:rPr lang="de-DE" sz="1800" b="0" strike="noStrike" spc="-1" dirty="0">
+                <a:solidFill>
+                  <a:srgbClr val="000000"/>
+                </a:solidFill>
+                <a:latin typeface="Bahnschrift SemiLight"/>
+                <a:ea typeface="Arial Unicode MS"/>
+              </a:rPr>
+              <a:t> Wort unfallfrei, </a:t>
+            </a:r>
+            <a:r>
+              <a:rPr lang="de-DE" sz="1800" b="0" strike="noStrike" spc="-1" dirty="0" err="1">
+                <a:solidFill>
+                  <a:srgbClr val="000000"/>
+                </a:solidFill>
+                <a:latin typeface="Bahnschrift SemiLight"/>
+                <a:ea typeface="Arial Unicode MS"/>
+              </a:rPr>
+              <a:t>sport</a:t>
+            </a:r>
+            <a:r>
+              <a:rPr lang="de-DE" sz="1800" b="0" strike="noStrike" spc="-1" dirty="0">
+                <a:solidFill>
+                  <a:srgbClr val="000000"/>
+                </a:solidFill>
+                <a:latin typeface="Bahnschrift SemiLight"/>
+                <a:ea typeface="Arial Unicode MS"/>
+              </a:rPr>
+              <a:t>, 4x4 usw. steht.</a:t>
+            </a:r>
+            <a:endParaRPr lang="de-DE" sz="1800" b="0" strike="noStrike" spc="-1" dirty="0">
+              <a:latin typeface="Arial"/>
+            </a:endParaRPr>
+          </a:p>
+          <a:p>
+            <a:pPr marL="285840" indent="-285840">
+              <a:lnSpc>
+                <a:spcPct val="100000"/>
+              </a:lnSpc>
+              <a:buClr>
+                <a:srgbClr val="000000"/>
+              </a:buClr>
+              <a:buFont typeface="Arial"/>
+              <a:buChar char="•"/>
+            </a:pPr>
+            <a:r>
+              <a:rPr lang="de-DE" sz="1800" b="0" strike="noStrike" spc="-1" dirty="0">
+                <a:solidFill>
+                  <a:srgbClr val="000000"/>
+                </a:solidFill>
+                <a:latin typeface="Bahnschrift SemiLight"/>
+                <a:ea typeface="Arial Unicode MS"/>
+              </a:rPr>
+              <a:t>Dies war auch der Fall bei </a:t>
+            </a:r>
+            <a:r>
+              <a:rPr lang="de-DE" sz="1800" b="0" strike="noStrike" spc="-1" dirty="0" err="1">
+                <a:solidFill>
+                  <a:srgbClr val="000000"/>
+                </a:solidFill>
+                <a:latin typeface="Bahnschrift SemiLight"/>
+                <a:ea typeface="Arial Unicode MS"/>
+              </a:rPr>
+              <a:t>sport</a:t>
+            </a:r>
+            <a:r>
+              <a:rPr lang="de-DE" sz="1800" b="0" strike="noStrike" spc="-1" dirty="0">
+                <a:solidFill>
+                  <a:srgbClr val="000000"/>
+                </a:solidFill>
+                <a:latin typeface="Bahnschrift SemiLight"/>
+                <a:ea typeface="Arial Unicode MS"/>
+              </a:rPr>
+              <a:t> bzw. 4x4 -&gt; neue Spalte erzeugt.</a:t>
+            </a:r>
+            <a:endParaRPr lang="de-DE" sz="1800" b="0" strike="noStrike" spc="-1" dirty="0">
+              <a:latin typeface="Arial"/>
+            </a:endParaRPr>
+          </a:p>
+          <a:p>
+            <a:pPr>
+              <a:lnSpc>
+                <a:spcPct val="100000"/>
+              </a:lnSpc>
+              <a:buNone/>
+            </a:pPr>
+            <a:endParaRPr lang="de-DE" sz="1800" b="0" strike="noStrike" spc="-1" dirty="0">
+              <a:latin typeface="Arial"/>
+            </a:endParaRPr>
+          </a:p>
+          <a:p>
+            <a:pPr>
+              <a:lnSpc>
+                <a:spcPct val="100000"/>
+              </a:lnSpc>
+              <a:buNone/>
+            </a:pPr>
+            <a:r>
+              <a:rPr lang="de-DE" sz="1800" b="1" strike="noStrike" spc="-1" dirty="0">
+                <a:solidFill>
+                  <a:srgbClr val="000000"/>
+                </a:solidFill>
+                <a:latin typeface="Bahnschrift SemiLight"/>
+                <a:ea typeface="Arial Unicode MS"/>
+              </a:rPr>
+              <a:t>Entfernung der Spalte „</a:t>
+            </a:r>
+            <a:r>
+              <a:rPr lang="de-DE" sz="1800" b="1" strike="noStrike" spc="-1" dirty="0" err="1">
+                <a:solidFill>
+                  <a:srgbClr val="000000"/>
+                </a:solidFill>
+                <a:latin typeface="Bahnschrift SemiLight"/>
+                <a:ea typeface="Arial Unicode MS"/>
+              </a:rPr>
+              <a:t>power_ps</a:t>
+            </a:r>
+            <a:r>
+              <a:rPr lang="de-DE" sz="1800" b="1" strike="noStrike" spc="-1" dirty="0">
+                <a:solidFill>
+                  <a:srgbClr val="000000"/>
+                </a:solidFill>
+                <a:latin typeface="Bahnschrift SemiLight"/>
+                <a:ea typeface="Arial Unicode MS"/>
+              </a:rPr>
+              <a:t>“</a:t>
+            </a:r>
+            <a:endParaRPr lang="de-DE" sz="1800" b="0" strike="noStrike" spc="-1" dirty="0">
+              <a:latin typeface="Arial"/>
+            </a:endParaRPr>
+          </a:p>
+          <a:p>
+            <a:pPr marL="285840" indent="-285840">
+              <a:lnSpc>
+                <a:spcPct val="100000"/>
+              </a:lnSpc>
+              <a:buClr>
+                <a:srgbClr val="000000"/>
+              </a:buClr>
+              <a:buFont typeface="Arial"/>
+              <a:buChar char="•"/>
+            </a:pPr>
+            <a:r>
+              <a:rPr lang="de-DE" sz="1800" b="0" strike="noStrike" spc="-1" dirty="0">
+                <a:solidFill>
+                  <a:srgbClr val="000000"/>
+                </a:solidFill>
+                <a:latin typeface="Bahnschrift SemiLight"/>
+                <a:ea typeface="Arial Unicode MS"/>
+              </a:rPr>
+              <a:t>Die Pferdestärke kann auch aus „</a:t>
+            </a:r>
+            <a:r>
+              <a:rPr lang="de-DE" sz="1800" b="0" strike="noStrike" spc="-1" dirty="0" err="1">
+                <a:solidFill>
+                  <a:srgbClr val="000000"/>
+                </a:solidFill>
+                <a:latin typeface="Bahnschrift SemiLight"/>
+                <a:ea typeface="Arial Unicode MS"/>
+              </a:rPr>
+              <a:t>power_kw</a:t>
+            </a:r>
+            <a:r>
+              <a:rPr lang="de-DE" sz="1800" b="0" strike="noStrike" spc="-1" dirty="0">
+                <a:solidFill>
+                  <a:srgbClr val="000000"/>
+                </a:solidFill>
+                <a:latin typeface="Bahnschrift SemiLight"/>
+                <a:ea typeface="Arial Unicode MS"/>
+              </a:rPr>
+              <a:t>“ durch Umwandlung gewonnen werden.</a:t>
+            </a:r>
+            <a:endParaRPr lang="de-DE" sz="1800" b="0" strike="noStrike" spc="-1" dirty="0">
+              <a:latin typeface="Arial"/>
+            </a:endParaRPr>
+          </a:p>
+          <a:p>
+            <a:pPr marL="285840" indent="-285840">
+              <a:lnSpc>
+                <a:spcPct val="100000"/>
+              </a:lnSpc>
+              <a:buClr>
+                <a:srgbClr val="000000"/>
+              </a:buClr>
+              <a:buFont typeface="Arial"/>
+              <a:buChar char="•"/>
+            </a:pPr>
+            <a:r>
+              <a:rPr lang="de-DE" sz="1800" b="0" strike="noStrike" spc="-1" dirty="0">
+                <a:solidFill>
+                  <a:srgbClr val="000000"/>
+                </a:solidFill>
+                <a:latin typeface="Bahnschrift SemiLight"/>
+                <a:ea typeface="Arial Unicode MS"/>
+              </a:rPr>
+              <a:t>Spalte ist daher überflüssig für die weitere Analyse.</a:t>
+            </a:r>
+            <a:endParaRPr lang="de-DE" sz="1800" b="0" strike="noStrike" spc="-1" dirty="0">
+              <a:latin typeface="Arial"/>
+            </a:endParaRPr>
+          </a:p>
+          <a:p>
+            <a:pPr>
+              <a:lnSpc>
+                <a:spcPct val="100000"/>
+              </a:lnSpc>
+              <a:buNone/>
+            </a:pPr>
+            <a:endParaRPr lang="de-DE" sz="1800" b="0" strike="noStrike" spc="-1" dirty="0">
+              <a:latin typeface="Arial"/>
+            </a:endParaRPr>
+          </a:p>
+          <a:p>
+            <a:pPr>
+              <a:lnSpc>
+                <a:spcPct val="100000"/>
+              </a:lnSpc>
+              <a:buNone/>
+            </a:pPr>
+            <a:endParaRPr lang="de-DE" sz="1800" b="0" strike="noStrike" spc="-1" dirty="0">
+              <a:latin typeface="Arial"/>
+            </a:endParaRPr>
+          </a:p>
+        </p:txBody>
+      </p:sp>
+    </p:spTree>
+  </p:cSld>
+  <p:clrMapOvr>
+    <a:masterClrMapping/>
+  </p:clrMapOvr>
+</p:sld>
+</file>
+
+<file path=ppt/slides/slide11.xml><?xml version="1.0" encoding="utf-8"?>
+<p:sld xmlns:a="http://schemas.openxmlformats.org/drawingml/2006/main" xmlns:r="http://schemas.openxmlformats.org/officeDocument/2006/relationships" xmlns:p="http://schemas.openxmlformats.org/presentationml/2006/main">
+  <p:cSld>
+    <p:spTree>
+      <p:nvGrpSpPr>
+        <p:cNvPr id="1" name=""/>
+        <p:cNvGrpSpPr/>
+        <p:nvPr/>
+      </p:nvGrpSpPr>
+      <p:grpSpPr>
+        <a:xfrm>
+          <a:off x="0" y="0"/>
+          <a:ext cx="0" cy="0"/>
+          <a:chOff x="0" y="0"/>
+          <a:chExt cx="0" cy="0"/>
+        </a:xfrm>
+      </p:grpSpPr>
+      <p:sp>
+        <p:nvSpPr>
           <p:cNvPr id="249" name="PlaceHolder 1"/>
           <p:cNvSpPr>
             <a:spLocks noGrp="1"/>
@@ -14477,7 +14950,7 @@
 </p:sld>
 </file>
 
-<file path=ppt/slides/slide11.xml><?xml version="1.0" encoding="utf-8"?>
+<file path=ppt/slides/slide12.xml><?xml version="1.0" encoding="utf-8"?>
 <p:sld xmlns:a="http://schemas.openxmlformats.org/drawingml/2006/main" xmlns:r="http://schemas.openxmlformats.org/officeDocument/2006/relationships" xmlns:p="http://schemas.openxmlformats.org/presentationml/2006/main">
   <p:cSld>
     <p:spTree>
@@ -14559,7 +15032,7 @@
         </p:nvSpPr>
         <p:spPr>
           <a:xfrm>
-            <a:off x="585360" y="1507680"/>
+            <a:off x="585360" y="1371960"/>
             <a:ext cx="9952200" cy="638280"/>
           </a:xfrm>
           <a:prstGeom prst="rect">
@@ -14595,16 +15068,36 @@
               <a:buNone/>
             </a:pPr>
             <a:r>
-              <a:rPr lang="de-DE" sz="1800" b="1" strike="noStrike" spc="-1">
+              <a:rPr lang="de-DE" sz="1800" b="1" strike="noStrike" spc="-1" dirty="0">
                 <a:solidFill>
                   <a:srgbClr val="000000"/>
                 </a:solidFill>
                 <a:latin typeface="Bahnschrift SemiLight"/>
                 <a:ea typeface="Arial Unicode MS"/>
               </a:rPr>
-              <a:t>Entfernung der Ausreißer in „price_in_euro“</a:t>
+              <a:t>Entfernung der Ausreißer in „</a:t>
             </a:r>
-            <a:endParaRPr lang="de-DE" sz="1800" b="0" strike="noStrike" spc="-1">
+            <a:r>
+              <a:rPr lang="de-DE" sz="1800" b="1" strike="noStrike" spc="-1" dirty="0" err="1">
+                <a:solidFill>
+                  <a:srgbClr val="000000"/>
+                </a:solidFill>
+                <a:latin typeface="Bahnschrift SemiLight"/>
+                <a:ea typeface="Arial Unicode MS"/>
+              </a:rPr>
+              <a:t>price_in_euro</a:t>
+            </a:r>
+            <a:r>
+              <a:rPr lang="de-DE" sz="1800" b="1" strike="noStrike" spc="-1" dirty="0">
+                <a:solidFill>
+                  <a:srgbClr val="000000"/>
+                </a:solidFill>
+                <a:latin typeface="Bahnschrift SemiLight"/>
+                <a:ea typeface="Arial Unicode MS"/>
+              </a:rPr>
+              <a:t>“</a:t>
+            </a:r>
+            <a:endParaRPr lang="de-DE" sz="1800" b="0" strike="noStrike" spc="-1" dirty="0">
               <a:latin typeface="Arial"/>
             </a:endParaRPr>
           </a:p>
@@ -14620,7 +15113,7 @@
               <a:buChar char="•"/>
             </a:pPr>
             <a:r>
-              <a:rPr lang="de-DE" sz="1800" b="0" strike="noStrike" spc="-1">
+              <a:rPr lang="de-DE" sz="1800" b="0" strike="noStrike" spc="-1" dirty="0">
                 <a:solidFill>
                   <a:srgbClr val="000000"/>
                 </a:solidFill>
@@ -14629,7 +15122,7 @@
               </a:rPr>
               <a:t>Setzen eines vernünftigen Höchstpreises für ein Gebrauchtwagen (60.000 €) </a:t>
             </a:r>
-            <a:endParaRPr lang="de-DE" sz="1800" b="0" strike="noStrike" spc="-1">
+            <a:endParaRPr lang="de-DE" sz="1800" b="0" strike="noStrike" spc="-1" dirty="0">
               <a:latin typeface="Arial"/>
             </a:endParaRPr>
           </a:p>
@@ -14648,7 +15141,7 @@
         </p:blipFill>
         <p:spPr>
           <a:xfrm>
-            <a:off x="585360" y="2443680"/>
+            <a:off x="585360" y="2098627"/>
             <a:ext cx="3212280" cy="3842280"/>
           </a:xfrm>
           <a:prstGeom prst="rect">
@@ -14672,7 +15165,7 @@
         </p:blipFill>
         <p:spPr>
           <a:xfrm>
-            <a:off x="6339240" y="2553840"/>
+            <a:off x="6339240" y="2208787"/>
             <a:ext cx="3251880" cy="3842280"/>
           </a:xfrm>
           <a:prstGeom prst="rect">
@@ -14691,7 +15184,7 @@
         </p:nvSpPr>
         <p:spPr>
           <a:xfrm>
-            <a:off x="4048920" y="4169160"/>
+            <a:off x="4048920" y="3824107"/>
             <a:ext cx="2039040" cy="391320"/>
           </a:xfrm>
           <a:prstGeom prst="rightArrow">
@@ -14731,6 +15224,192 @@
           </a:p>
         </p:txBody>
       </p:sp>
+      <p:graphicFrame>
+        <p:nvGraphicFramePr>
+          <p:cNvPr id="2" name="Tabelle 1">
+            <a:extLst>
+              <a:ext uri="{FF2B5EF4-FFF2-40B4-BE49-F238E27FC236}">
+                <a16:creationId xmlns:a16="http://schemas.microsoft.com/office/drawing/2014/main" id="{60626FF4-B8DA-C91B-8159-137DD1C2ADF3}"/>
+              </a:ext>
+            </a:extLst>
+          </p:cNvPr>
+          <p:cNvGraphicFramePr>
+            <a:graphicFrameLocks noGrp="1"/>
+          </p:cNvGraphicFramePr>
+          <p:nvPr>
+            <p:extLst>
+              <p:ext uri="{D42A27DB-BD31-4B8C-83A1-F6EECF244321}">
+                <p14:modId xmlns:p14="http://schemas.microsoft.com/office/powerpoint/2010/main" val="1270084066"/>
+              </p:ext>
+            </p:extLst>
+          </p:nvPr>
+        </p:nvGraphicFramePr>
+        <p:xfrm>
+          <a:off x="1026544" y="6051067"/>
+          <a:ext cx="2579297" cy="640080"/>
+        </p:xfrm>
+        <a:graphic>
+          <a:graphicData uri="http://schemas.openxmlformats.org/drawingml/2006/table">
+            <a:tbl>
+              <a:tblPr firstRow="1" bandRow="1">
+                <a:tableStyleId>{5C22544A-7EE6-4342-B048-85BDC9FD1C3A}</a:tableStyleId>
+              </a:tblPr>
+              <a:tblGrid>
+                <a:gridCol w="2579297">
+                  <a:extLst>
+                    <a:ext uri="{9D8B030D-6E8A-4147-A177-3AD203B41FA5}">
+                      <a16:colId xmlns:a16="http://schemas.microsoft.com/office/drawing/2014/main" val="2206608546"/>
+                    </a:ext>
+                  </a:extLst>
+                </a:gridCol>
+              </a:tblGrid>
+              <a:tr h="393141">
+                <a:tc>
+                  <a:txBody>
+                    <a:bodyPr/>
+                    <a:lstStyle/>
+                    <a:p>
+                      <a:pPr marL="0" indent="0" algn="ctr">
+                        <a:lnSpc>
+                          <a:spcPct val="100000"/>
+                        </a:lnSpc>
+                        <a:buClr>
+                          <a:srgbClr val="000000"/>
+                        </a:buClr>
+                        <a:buFont typeface="Arial"/>
+                        <a:buNone/>
+                      </a:pPr>
+                      <a:r>
+                        <a:rPr lang="de-DE" sz="1800" b="0" strike="noStrike" spc="-1" dirty="0">
+                          <a:latin typeface="Bahnschrift SemiLight" panose="020B0502040204020203" pitchFamily="34" charset="0"/>
+                        </a:rPr>
+                        <a:t>Median: 20.490</a:t>
+                      </a:r>
+                    </a:p>
+                    <a:p>
+                      <a:pPr marL="0" indent="0" algn="ctr">
+                        <a:lnSpc>
+                          <a:spcPct val="100000"/>
+                        </a:lnSpc>
+                        <a:buClr>
+                          <a:srgbClr val="000000"/>
+                        </a:buClr>
+                        <a:buFont typeface="Arial"/>
+                        <a:buNone/>
+                      </a:pPr>
+                      <a:r>
+                        <a:rPr lang="de-DE" b="0" spc="-1" dirty="0">
+                          <a:latin typeface="Bahnschrift SemiLight" panose="020B0502040204020203" pitchFamily="34" charset="0"/>
+                        </a:rPr>
+                        <a:t>Mittelwert: 29.416</a:t>
+                      </a:r>
+                    </a:p>
+                  </a:txBody>
+                  <a:tcPr anchor="ctr"/>
+                </a:tc>
+                <a:extLst>
+                  <a:ext uri="{0D108BD9-81ED-4DB2-BD59-A6C34878D82A}">
+                    <a16:rowId xmlns:a16="http://schemas.microsoft.com/office/drawing/2014/main" val="4287616049"/>
+                  </a:ext>
+                </a:extLst>
+              </a:tr>
+            </a:tbl>
+          </a:graphicData>
+        </a:graphic>
+      </p:graphicFrame>
+      <p:graphicFrame>
+        <p:nvGraphicFramePr>
+          <p:cNvPr id="3" name="Tabelle 2">
+            <a:extLst>
+              <a:ext uri="{FF2B5EF4-FFF2-40B4-BE49-F238E27FC236}">
+                <a16:creationId xmlns:a16="http://schemas.microsoft.com/office/drawing/2014/main" id="{69780583-94D6-C228-12B8-906A3EB9DC57}"/>
+              </a:ext>
+            </a:extLst>
+          </p:cNvPr>
+          <p:cNvGraphicFramePr>
+            <a:graphicFrameLocks noGrp="1"/>
+          </p:cNvGraphicFramePr>
+          <p:nvPr>
+            <p:extLst>
+              <p:ext uri="{D42A27DB-BD31-4B8C-83A1-F6EECF244321}">
+                <p14:modId xmlns:p14="http://schemas.microsoft.com/office/powerpoint/2010/main" val="3605190779"/>
+              </p:ext>
+            </p:extLst>
+          </p:nvPr>
+        </p:nvGraphicFramePr>
+        <p:xfrm>
+          <a:off x="6803367" y="6051067"/>
+          <a:ext cx="2579298" cy="640080"/>
+        </p:xfrm>
+        <a:graphic>
+          <a:graphicData uri="http://schemas.openxmlformats.org/drawingml/2006/table">
+            <a:tbl>
+              <a:tblPr firstRow="1" bandRow="1">
+                <a:tableStyleId>{5C22544A-7EE6-4342-B048-85BDC9FD1C3A}</a:tableStyleId>
+              </a:tblPr>
+              <a:tblGrid>
+                <a:gridCol w="2579298">
+                  <a:extLst>
+                    <a:ext uri="{9D8B030D-6E8A-4147-A177-3AD203B41FA5}">
+                      <a16:colId xmlns:a16="http://schemas.microsoft.com/office/drawing/2014/main" val="2731824057"/>
+                    </a:ext>
+                  </a:extLst>
+                </a:gridCol>
+              </a:tblGrid>
+              <a:tr h="393141">
+                <a:tc>
+                  <a:txBody>
+                    <a:bodyPr/>
+                    <a:lstStyle/>
+                    <a:p>
+                      <a:pPr marL="0" indent="0" algn="ctr">
+                        <a:lnSpc>
+                          <a:spcPct val="100000"/>
+                        </a:lnSpc>
+                        <a:buClr>
+                          <a:srgbClr val="000000"/>
+                        </a:buClr>
+                        <a:buFont typeface="Arial"/>
+                        <a:buNone/>
+                      </a:pPr>
+                      <a:r>
+                        <a:rPr lang="de-DE" sz="1800" b="0" strike="noStrike" spc="-1" dirty="0">
+                          <a:latin typeface="Bahnschrift SemiLight" panose="020B0502040204020203" pitchFamily="34" charset="0"/>
+                        </a:rPr>
+                        <a:t>Median: 19.488</a:t>
+                      </a:r>
+                    </a:p>
+                    <a:p>
+                      <a:pPr marL="0" indent="0" algn="ctr">
+                        <a:lnSpc>
+                          <a:spcPct val="100000"/>
+                        </a:lnSpc>
+                        <a:buClr>
+                          <a:srgbClr val="000000"/>
+                        </a:buClr>
+                        <a:buFont typeface="Arial"/>
+                        <a:buNone/>
+                      </a:pPr>
+                      <a:r>
+                        <a:rPr lang="de-DE" b="0" spc="-1" dirty="0">
+                          <a:latin typeface="Bahnschrift SemiLight" panose="020B0502040204020203" pitchFamily="34" charset="0"/>
+                        </a:rPr>
+                        <a:t>Mittelwert: 21.659</a:t>
+                      </a:r>
+                    </a:p>
+                  </a:txBody>
+                  <a:tcPr anchor="ctr"/>
+                </a:tc>
+                <a:extLst>
+                  <a:ext uri="{0D108BD9-81ED-4DB2-BD59-A6C34878D82A}">
+                    <a16:rowId xmlns:a16="http://schemas.microsoft.com/office/drawing/2014/main" val="4287616049"/>
+                  </a:ext>
+                </a:extLst>
+              </a:tr>
+            </a:tbl>
+          </a:graphicData>
+        </a:graphic>
+      </p:graphicFrame>
     </p:spTree>
   </p:cSld>
   <p:clrMapOvr>
@@ -14739,7 +15418,7 @@
 </p:sld>
 </file>
 
-<file path=ppt/slides/slide12.xml><?xml version="1.0" encoding="utf-8"?>
+<file path=ppt/slides/slide13.xml><?xml version="1.0" encoding="utf-8"?>
 <p:sld xmlns:a="http://schemas.openxmlformats.org/drawingml/2006/main" xmlns:r="http://schemas.openxmlformats.org/officeDocument/2006/relationships" xmlns:p="http://schemas.openxmlformats.org/presentationml/2006/main">
   <p:cSld>
     <p:spTree>
@@ -14929,7 +15608,7 @@
 </p:sld>
 </file>
 
-<file path=ppt/slides/slide13.xml><?xml version="1.0" encoding="utf-8"?>
+<file path=ppt/slides/slide14.xml><?xml version="1.0" encoding="utf-8"?>
 <p:sld xmlns:a="http://schemas.openxmlformats.org/drawingml/2006/main" xmlns:r="http://schemas.openxmlformats.org/officeDocument/2006/relationships" xmlns:p="http://schemas.openxmlformats.org/presentationml/2006/main">
   <p:cSld>
     <p:spTree>
@@ -15086,171 +15765,6 @@
           </a:ln>
         </p:spPr>
       </p:pic>
-    </p:spTree>
-  </p:cSld>
-  <p:clrMapOvr>
-    <a:masterClrMapping/>
-  </p:clrMapOvr>
-</p:sld>
-</file>
-
-<file path=ppt/slides/slide14.xml><?xml version="1.0" encoding="utf-8"?>
-<p:sld xmlns:a="http://schemas.openxmlformats.org/drawingml/2006/main" xmlns:r="http://schemas.openxmlformats.org/officeDocument/2006/relationships" xmlns:p="http://schemas.openxmlformats.org/presentationml/2006/main">
-  <p:cSld>
-    <p:spTree>
-      <p:nvGrpSpPr>
-        <p:cNvPr id="1" name=""/>
-        <p:cNvGrpSpPr/>
-        <p:nvPr/>
-      </p:nvGrpSpPr>
-      <p:grpSpPr>
-        <a:xfrm>
-          <a:off x="0" y="0"/>
-          <a:ext cx="0" cy="0"/>
-          <a:chOff x="0" y="0"/>
-          <a:chExt cx="0" cy="0"/>
-        </a:xfrm>
-      </p:grpSpPr>
-      <p:sp>
-        <p:nvSpPr>
-          <p:cNvPr id="263" name="PlaceHolder 1"/>
-          <p:cNvSpPr>
-            <a:spLocks noGrp="1"/>
-          </p:cNvSpPr>
-          <p:nvPr>
-            <p:ph/>
-          </p:nvPr>
-        </p:nvSpPr>
-        <p:spPr>
-          <a:xfrm>
-            <a:off x="2063160" y="443520"/>
-            <a:ext cx="8064360" cy="644400"/>
-          </a:xfrm>
-          <a:prstGeom prst="rect">
-            <a:avLst/>
-          </a:prstGeom>
-          <a:noFill/>
-          <a:ln w="0">
-            <a:noFill/>
-          </a:ln>
-        </p:spPr>
-        <p:txBody>
-          <a:bodyPr lIns="90000" tIns="45000" rIns="90000" bIns="45000" anchor="ctr">
-            <a:noAutofit/>
-          </a:bodyPr>
-          <a:lstStyle/>
-          <a:p>
-            <a:pPr marL="228600">
-              <a:lnSpc>
-                <a:spcPct val="90000"/>
-              </a:lnSpc>
-              <a:spcBef>
-                <a:spcPts val="1001"/>
-              </a:spcBef>
-              <a:buNone/>
-              <a:tabLst>
-                <a:tab pos="0" algn="l"/>
-              </a:tabLst>
-            </a:pPr>
-            <a:r>
-              <a:rPr lang="de-DE" sz="4000" b="1" strike="noStrike" spc="-1">
-                <a:solidFill>
-                  <a:srgbClr val="FFFFFF"/>
-                </a:solidFill>
-                <a:latin typeface="CMU Serif"/>
-                <a:ea typeface="CMU Serif"/>
-              </a:rPr>
-              <a:t>Bereinigung der Daten 5</a:t>
-            </a:r>
-            <a:endParaRPr lang="de-DE" sz="4000" b="0" strike="noStrike" spc="-1">
-              <a:latin typeface="Arial"/>
-            </a:endParaRPr>
-          </a:p>
-        </p:txBody>
-      </p:sp>
-      <p:pic>
-        <p:nvPicPr>
-          <p:cNvPr id="264" name="Grafik 3" descr="Ein Bild, das Text, Diagramm, Reihe, parallel enthält.&#10;&#10;KI-generierte Inhalte können fehlerhaft sein."/>
-          <p:cNvPicPr/>
-          <p:nvPr/>
-        </p:nvPicPr>
-        <p:blipFill>
-          <a:blip r:embed="rId2"/>
-          <a:srcRect t="3595"/>
-          <a:stretch/>
-        </p:blipFill>
-        <p:spPr>
-          <a:xfrm>
-            <a:off x="2352600" y="1267920"/>
-            <a:ext cx="7485120" cy="4849560"/>
-          </a:xfrm>
-          <a:prstGeom prst="rect">
-            <a:avLst/>
-          </a:prstGeom>
-          <a:ln w="0">
-            <a:noFill/>
-          </a:ln>
-        </p:spPr>
-      </p:pic>
-      <p:sp>
-        <p:nvSpPr>
-          <p:cNvPr id="265" name="Textfeld 2"/>
-          <p:cNvSpPr/>
-          <p:nvPr/>
-        </p:nvSpPr>
-        <p:spPr>
-          <a:xfrm>
-            <a:off x="637200" y="6230520"/>
-            <a:ext cx="9952200" cy="363960"/>
-          </a:xfrm>
-          <a:prstGeom prst="rect">
-            <a:avLst/>
-          </a:prstGeom>
-          <a:noFill/>
-          <a:ln w="0">
-            <a:noFill/>
-          </a:ln>
-        </p:spPr>
-        <p:style>
-          <a:lnRef idx="0">
-            <a:scrgbClr r="0" g="0" b="0"/>
-          </a:lnRef>
-          <a:fillRef idx="0">
-            <a:scrgbClr r="0" g="0" b="0"/>
-          </a:fillRef>
-          <a:effectRef idx="0">
-            <a:scrgbClr r="0" g="0" b="0"/>
-          </a:effectRef>
-          <a:fontRef idx="minor"/>
-        </p:style>
-        <p:txBody>
-          <a:bodyPr lIns="90000" tIns="45000" rIns="90000" bIns="45000" anchor="t">
-            <a:spAutoFit/>
-          </a:bodyPr>
-          <a:lstStyle/>
-          <a:p>
-            <a:pPr>
-              <a:lnSpc>
-                <a:spcPct val="100000"/>
-              </a:lnSpc>
-              <a:buNone/>
-            </a:pPr>
-            <a:r>
-              <a:rPr lang="de-DE" sz="1800" b="1" strike="noStrike" spc="-1" dirty="0">
-                <a:solidFill>
-                  <a:srgbClr val="000000"/>
-                </a:solidFill>
-                <a:latin typeface="Bahnschrift SemiLight"/>
-                <a:ea typeface="Arial Unicode MS"/>
-              </a:rPr>
-              <a:t>Der Sprung beträgt ca. 7000 €</a:t>
-            </a:r>
-            <a:endParaRPr lang="de-DE" sz="1800" b="0" strike="noStrike" spc="-1" dirty="0">
-              <a:latin typeface="Arial"/>
-            </a:endParaRPr>
-          </a:p>
-        </p:txBody>
-      </p:sp>
     </p:spTree>
   </p:cSld>
   <p:clrMapOvr>
@@ -15278,7 +15792,7 @@
       </p:grpSpPr>
       <p:sp>
         <p:nvSpPr>
-          <p:cNvPr id="266" name="PlaceHolder 1"/>
+          <p:cNvPr id="263" name="PlaceHolder 1"/>
           <p:cNvSpPr>
             <a:spLocks noGrp="1"/>
           </p:cNvSpPr>
@@ -15333,16 +15847,40 @@
           </a:p>
         </p:txBody>
       </p:sp>
-      <p:sp>
-        <p:nvSpPr>
-          <p:cNvPr id="267" name="Textfeld 2"/>
+      <p:pic>
+        <p:nvPicPr>
+          <p:cNvPr id="264" name="Grafik 3" descr="Ein Bild, das Text, Diagramm, Reihe, parallel enthält.&#10;&#10;KI-generierte Inhalte können fehlerhaft sein."/>
+          <p:cNvPicPr/>
+          <p:nvPr/>
+        </p:nvPicPr>
+        <p:blipFill>
+          <a:blip r:embed="rId2"/>
+          <a:srcRect t="3595"/>
+          <a:stretch/>
+        </p:blipFill>
+        <p:spPr>
+          <a:xfrm>
+            <a:off x="2352600" y="1267920"/>
+            <a:ext cx="7485120" cy="4849560"/>
+          </a:xfrm>
+          <a:prstGeom prst="rect">
+            <a:avLst/>
+          </a:prstGeom>
+          <a:ln w="0">
+            <a:noFill/>
+          </a:ln>
+        </p:spPr>
+      </p:pic>
+      <p:sp>
+        <p:nvSpPr>
+          <p:cNvPr id="265" name="Textfeld 2"/>
           <p:cNvSpPr/>
           <p:nvPr/>
         </p:nvSpPr>
         <p:spPr>
           <a:xfrm>
-            <a:off x="628560" y="1512000"/>
-            <a:ext cx="9952200" cy="644877"/>
+            <a:off x="637200" y="6230520"/>
+            <a:ext cx="9952200" cy="363960"/>
           </a:xfrm>
           <a:prstGeom prst="rect">
             <a:avLst/>
@@ -15370,25 +15908,21 @@
           </a:bodyPr>
           <a:lstStyle/>
           <a:p>
-            <a:pPr marL="285840" indent="-285840">
+            <a:pPr>
               <a:lnSpc>
                 <a:spcPct val="100000"/>
               </a:lnSpc>
-              <a:buClr>
-                <a:srgbClr val="000000"/>
-              </a:buClr>
-              <a:buFont typeface="Arial"/>
-              <a:buChar char="•"/>
+              <a:buNone/>
             </a:pPr>
             <a:r>
-              <a:rPr lang="de-DE" sz="1800" b="0" strike="noStrike" spc="-1" dirty="0">
+              <a:rPr lang="de-DE" sz="1800" b="1" strike="noStrike" spc="-1" dirty="0">
                 <a:solidFill>
                   <a:srgbClr val="000000"/>
                 </a:solidFill>
                 <a:latin typeface="Bahnschrift SemiLight"/>
                 <a:ea typeface="Arial Unicode MS"/>
               </a:rPr>
-              <a:t>Klassifiziert man die Autos anhand dieses Sprungs, wird nochmal der Preisunterschied deutlich.</a:t>
+              <a:t>Der Sprung beträgt ca. 7000 €</a:t>
             </a:r>
             <a:endParaRPr lang="de-DE" sz="1800" b="0" strike="noStrike" spc="-1" dirty="0">
               <a:latin typeface="Arial"/>
@@ -15396,29 +15930,6 @@
           </a:p>
         </p:txBody>
       </p:sp>
-      <p:pic>
-        <p:nvPicPr>
-          <p:cNvPr id="268" name="Grafik 2" descr="Ein Bild, das Text, Screenshot, Diagramm, Rechteck enthält.&#10;&#10;KI-generierte Inhalte können fehlerhaft sein."/>
-          <p:cNvPicPr/>
-          <p:nvPr/>
-        </p:nvPicPr>
-        <p:blipFill>
-          <a:blip r:embed="rId2"/>
-          <a:stretch/>
-        </p:blipFill>
-        <p:spPr>
-          <a:xfrm>
-            <a:off x="1131840" y="2229120"/>
-            <a:ext cx="4471920" cy="4183920"/>
-          </a:xfrm>
-          <a:prstGeom prst="rect">
-            <a:avLst/>
-          </a:prstGeom>
-          <a:ln w="0">
-            <a:noFill/>
-          </a:ln>
-        </p:spPr>
-      </p:pic>
     </p:spTree>
   </p:cSld>
   <p:clrMapOvr>
@@ -15446,6 +15957,174 @@
       </p:grpSpPr>
       <p:sp>
         <p:nvSpPr>
+          <p:cNvPr id="266" name="PlaceHolder 1"/>
+          <p:cNvSpPr>
+            <a:spLocks noGrp="1"/>
+          </p:cNvSpPr>
+          <p:nvPr>
+            <p:ph/>
+          </p:nvPr>
+        </p:nvSpPr>
+        <p:spPr>
+          <a:xfrm>
+            <a:off x="2063160" y="443520"/>
+            <a:ext cx="8064360" cy="644400"/>
+          </a:xfrm>
+          <a:prstGeom prst="rect">
+            <a:avLst/>
+          </a:prstGeom>
+          <a:noFill/>
+          <a:ln w="0">
+            <a:noFill/>
+          </a:ln>
+        </p:spPr>
+        <p:txBody>
+          <a:bodyPr lIns="90000" tIns="45000" rIns="90000" bIns="45000" anchor="ctr">
+            <a:noAutofit/>
+          </a:bodyPr>
+          <a:lstStyle/>
+          <a:p>
+            <a:pPr marL="228600">
+              <a:lnSpc>
+                <a:spcPct val="90000"/>
+              </a:lnSpc>
+              <a:spcBef>
+                <a:spcPts val="1001"/>
+              </a:spcBef>
+              <a:buNone/>
+              <a:tabLst>
+                <a:tab pos="0" algn="l"/>
+              </a:tabLst>
+            </a:pPr>
+            <a:r>
+              <a:rPr lang="de-DE" sz="4000" b="1" strike="noStrike" spc="-1">
+                <a:solidFill>
+                  <a:srgbClr val="FFFFFF"/>
+                </a:solidFill>
+                <a:latin typeface="CMU Serif"/>
+                <a:ea typeface="CMU Serif"/>
+              </a:rPr>
+              <a:t>Bereinigung der Daten 5</a:t>
+            </a:r>
+            <a:endParaRPr lang="de-DE" sz="4000" b="0" strike="noStrike" spc="-1">
+              <a:latin typeface="Arial"/>
+            </a:endParaRPr>
+          </a:p>
+        </p:txBody>
+      </p:sp>
+      <p:sp>
+        <p:nvSpPr>
+          <p:cNvPr id="267" name="Textfeld 2"/>
+          <p:cNvSpPr/>
+          <p:nvPr/>
+        </p:nvSpPr>
+        <p:spPr>
+          <a:xfrm>
+            <a:off x="628560" y="1512000"/>
+            <a:ext cx="9952200" cy="644877"/>
+          </a:xfrm>
+          <a:prstGeom prst="rect">
+            <a:avLst/>
+          </a:prstGeom>
+          <a:noFill/>
+          <a:ln w="0">
+            <a:noFill/>
+          </a:ln>
+        </p:spPr>
+        <p:style>
+          <a:lnRef idx="0">
+            <a:scrgbClr r="0" g="0" b="0"/>
+          </a:lnRef>
+          <a:fillRef idx="0">
+            <a:scrgbClr r="0" g="0" b="0"/>
+          </a:fillRef>
+          <a:effectRef idx="0">
+            <a:scrgbClr r="0" g="0" b="0"/>
+          </a:effectRef>
+          <a:fontRef idx="minor"/>
+        </p:style>
+        <p:txBody>
+          <a:bodyPr lIns="90000" tIns="45000" rIns="90000" bIns="45000" anchor="t">
+            <a:spAutoFit/>
+          </a:bodyPr>
+          <a:lstStyle/>
+          <a:p>
+            <a:pPr marL="285840" indent="-285840">
+              <a:lnSpc>
+                <a:spcPct val="100000"/>
+              </a:lnSpc>
+              <a:buClr>
+                <a:srgbClr val="000000"/>
+              </a:buClr>
+              <a:buFont typeface="Arial"/>
+              <a:buChar char="•"/>
+            </a:pPr>
+            <a:r>
+              <a:rPr lang="de-DE" sz="1800" b="0" strike="noStrike" spc="-1" dirty="0">
+                <a:solidFill>
+                  <a:srgbClr val="000000"/>
+                </a:solidFill>
+                <a:latin typeface="Bahnschrift SemiLight"/>
+                <a:ea typeface="Arial Unicode MS"/>
+              </a:rPr>
+              <a:t>Klassifiziert man die Autos anhand dieses Sprungs, wird nochmal der Preisunterschied deutlich.</a:t>
+            </a:r>
+            <a:endParaRPr lang="de-DE" sz="1800" b="0" strike="noStrike" spc="-1" dirty="0">
+              <a:latin typeface="Arial"/>
+            </a:endParaRPr>
+          </a:p>
+        </p:txBody>
+      </p:sp>
+      <p:pic>
+        <p:nvPicPr>
+          <p:cNvPr id="268" name="Grafik 2" descr="Ein Bild, das Text, Screenshot, Diagramm, Rechteck enthält.&#10;&#10;KI-generierte Inhalte können fehlerhaft sein."/>
+          <p:cNvPicPr/>
+          <p:nvPr/>
+        </p:nvPicPr>
+        <p:blipFill>
+          <a:blip r:embed="rId2"/>
+          <a:stretch/>
+        </p:blipFill>
+        <p:spPr>
+          <a:xfrm>
+            <a:off x="3859380" y="2156877"/>
+            <a:ext cx="4471920" cy="4183920"/>
+          </a:xfrm>
+          <a:prstGeom prst="rect">
+            <a:avLst/>
+          </a:prstGeom>
+          <a:ln w="0">
+            <a:noFill/>
+          </a:ln>
+        </p:spPr>
+      </p:pic>
+    </p:spTree>
+  </p:cSld>
+  <p:clrMapOvr>
+    <a:masterClrMapping/>
+  </p:clrMapOvr>
+</p:sld>
+</file>
+
+<file path=ppt/slides/slide17.xml><?xml version="1.0" encoding="utf-8"?>
+<p:sld xmlns:a="http://schemas.openxmlformats.org/drawingml/2006/main" xmlns:r="http://schemas.openxmlformats.org/officeDocument/2006/relationships" xmlns:p="http://schemas.openxmlformats.org/presentationml/2006/main">
+  <p:cSld>
+    <p:spTree>
+      <p:nvGrpSpPr>
+        <p:cNvPr id="1" name=""/>
+        <p:cNvGrpSpPr/>
+        <p:nvPr/>
+      </p:nvGrpSpPr>
+      <p:grpSpPr>
+        <a:xfrm>
+          <a:off x="0" y="0"/>
+          <a:ext cx="0" cy="0"/>
+          <a:chOff x="0" y="0"/>
+          <a:chExt cx="0" cy="0"/>
+        </a:xfrm>
+      </p:grpSpPr>
+      <p:sp>
+        <p:nvSpPr>
           <p:cNvPr id="269" name="PlaceHolder 1"/>
           <p:cNvSpPr>
             <a:spLocks noGrp="1"/>
@@ -15509,7 +16188,7 @@
         </p:nvSpPr>
         <p:spPr>
           <a:xfrm>
-            <a:off x="628560" y="1512000"/>
+            <a:off x="628560" y="1451615"/>
             <a:ext cx="9952200" cy="912600"/>
           </a:xfrm>
           <a:prstGeom prst="rect">
@@ -15614,7 +16293,7 @@
 </p:sld>
 </file>
 
-<file path=ppt/slides/slide17.xml><?xml version="1.0" encoding="utf-8"?>
+<file path=ppt/slides/slide18.xml><?xml version="1.0" encoding="utf-8"?>
 <p:sld xmlns:a="http://schemas.openxmlformats.org/drawingml/2006/main" xmlns:r="http://schemas.openxmlformats.org/officeDocument/2006/relationships" xmlns:p="http://schemas.openxmlformats.org/presentationml/2006/main">
   <p:cSld>
     <p:spTree>
@@ -16052,7 +16731,7 @@
 </p:sld>
 </file>
 
-<file path=ppt/slides/slide18.xml><?xml version="1.0" encoding="utf-8"?>
+<file path=ppt/slides/slide19.xml><?xml version="1.0" encoding="utf-8"?>
 <p:sld xmlns:a="http://schemas.openxmlformats.org/drawingml/2006/main" xmlns:r="http://schemas.openxmlformats.org/officeDocument/2006/relationships" xmlns:p="http://schemas.openxmlformats.org/presentationml/2006/main">
   <p:cSld>
     <p:spTree>
@@ -16468,7 +17147,287 @@
 </p:sld>
 </file>
 
-<file path=ppt/slides/slide19.xml><?xml version="1.0" encoding="utf-8"?>
+<file path=ppt/slides/slide2.xml><?xml version="1.0" encoding="utf-8"?>
+<p:sld xmlns:a="http://schemas.openxmlformats.org/drawingml/2006/main" xmlns:r="http://schemas.openxmlformats.org/officeDocument/2006/relationships" xmlns:p="http://schemas.openxmlformats.org/presentationml/2006/main">
+  <p:cSld>
+    <p:spTree>
+      <p:nvGrpSpPr>
+        <p:cNvPr id="1" name=""/>
+        <p:cNvGrpSpPr/>
+        <p:nvPr/>
+      </p:nvGrpSpPr>
+      <p:grpSpPr>
+        <a:xfrm>
+          <a:off x="0" y="0"/>
+          <a:ext cx="0" cy="0"/>
+          <a:chOff x="0" y="0"/>
+          <a:chExt cx="0" cy="0"/>
+        </a:xfrm>
+      </p:grpSpPr>
+      <p:sp>
+        <p:nvSpPr>
+          <p:cNvPr id="238" name="TextBox 3"/>
+          <p:cNvSpPr/>
+          <p:nvPr/>
+        </p:nvSpPr>
+        <p:spPr>
+          <a:xfrm>
+            <a:off x="0" y="477720"/>
+            <a:ext cx="5444640" cy="775080"/>
+          </a:xfrm>
+          <a:prstGeom prst="rect">
+            <a:avLst/>
+          </a:prstGeom>
+          <a:noFill/>
+          <a:ln w="0">
+            <a:noFill/>
+          </a:ln>
+        </p:spPr>
+        <p:style>
+          <a:lnRef idx="0">
+            <a:scrgbClr r="0" g="0" b="0"/>
+          </a:lnRef>
+          <a:fillRef idx="0">
+            <a:scrgbClr r="0" g="0" b="0"/>
+          </a:fillRef>
+          <a:effectRef idx="0">
+            <a:scrgbClr r="0" g="0" b="0"/>
+          </a:effectRef>
+          <a:fontRef idx="minor"/>
+        </p:style>
+        <p:txBody>
+          <a:bodyPr lIns="90000" tIns="45000" rIns="90000" bIns="45000" anchor="ctr">
+            <a:spAutoFit/>
+          </a:bodyPr>
+          <a:lstStyle/>
+          <a:p>
+            <a:pPr algn="ctr">
+              <a:lnSpc>
+                <a:spcPts val="5400"/>
+              </a:lnSpc>
+              <a:buNone/>
+            </a:pPr>
+            <a:r>
+              <a:rPr lang="de-DE" sz="6000" b="1" strike="noStrike" spc="-1">
+                <a:solidFill>
+                  <a:srgbClr val="002060"/>
+                </a:solidFill>
+                <a:latin typeface="CMU Serif"/>
+                <a:ea typeface="CMU Serif"/>
+              </a:rPr>
+              <a:t>Gliederung</a:t>
+            </a:r>
+            <a:endParaRPr lang="de-DE" sz="6000" b="0" strike="noStrike" spc="-1">
+              <a:latin typeface="Arial"/>
+            </a:endParaRPr>
+          </a:p>
+        </p:txBody>
+      </p:sp>
+      <p:sp>
+        <p:nvSpPr>
+          <p:cNvPr id="239" name="Textfeld 1"/>
+          <p:cNvSpPr/>
+          <p:nvPr/>
+        </p:nvSpPr>
+        <p:spPr>
+          <a:xfrm>
+            <a:off x="762120" y="1355400"/>
+            <a:ext cx="8845560" cy="2284200"/>
+          </a:xfrm>
+          <a:prstGeom prst="rect">
+            <a:avLst/>
+          </a:prstGeom>
+          <a:noFill/>
+          <a:ln w="0">
+            <a:noFill/>
+          </a:ln>
+        </p:spPr>
+        <p:style>
+          <a:lnRef idx="0">
+            <a:scrgbClr r="0" g="0" b="0"/>
+          </a:lnRef>
+          <a:fillRef idx="0">
+            <a:scrgbClr r="0" g="0" b="0"/>
+          </a:fillRef>
+          <a:effectRef idx="0">
+            <a:scrgbClr r="0" g="0" b="0"/>
+          </a:effectRef>
+          <a:fontRef idx="minor"/>
+        </p:style>
+        <p:txBody>
+          <a:bodyPr lIns="90000" tIns="45000" rIns="90000" bIns="45000" anchor="t">
+            <a:spAutoFit/>
+          </a:bodyPr>
+          <a:lstStyle/>
+          <a:p>
+            <a:pPr>
+              <a:lnSpc>
+                <a:spcPct val="100000"/>
+              </a:lnSpc>
+              <a:buNone/>
+            </a:pPr>
+            <a:r>
+              <a:rPr lang="de-DE" sz="1800" b="0" strike="noStrike" spc="-1">
+                <a:solidFill>
+                  <a:srgbClr val="000000"/>
+                </a:solidFill>
+                <a:latin typeface="Bahnschrift SemiLight"/>
+                <a:ea typeface="Arial Unicode MS"/>
+              </a:rPr>
+              <a:t>Vorstellung des Datensatzes und Zweck der Analyse</a:t>
+            </a:r>
+            <a:endParaRPr lang="de-DE" sz="1800" b="0" strike="noStrike" spc="-1">
+              <a:latin typeface="Arial"/>
+            </a:endParaRPr>
+          </a:p>
+          <a:p>
+            <a:pPr>
+              <a:lnSpc>
+                <a:spcPct val="100000"/>
+              </a:lnSpc>
+              <a:buNone/>
+            </a:pPr>
+            <a:r>
+              <a:rPr lang="de-DE" sz="1800" b="0" strike="noStrike" spc="-1">
+                <a:solidFill>
+                  <a:srgbClr val="000000"/>
+                </a:solidFill>
+                <a:latin typeface="Bahnschrift SemiLight"/>
+                <a:ea typeface="Arial Unicode MS"/>
+              </a:rPr>
+              <a:t>Bereinigung des Datensatzes</a:t>
+            </a:r>
+            <a:endParaRPr lang="de-DE" sz="1800" b="0" strike="noStrike" spc="-1">
+              <a:latin typeface="Arial"/>
+            </a:endParaRPr>
+          </a:p>
+          <a:p>
+            <a:pPr>
+              <a:lnSpc>
+                <a:spcPct val="100000"/>
+              </a:lnSpc>
+              <a:buNone/>
+            </a:pPr>
+            <a:r>
+              <a:rPr lang="de-DE" sz="1800" b="0" strike="noStrike" spc="-1">
+                <a:solidFill>
+                  <a:srgbClr val="000000"/>
+                </a:solidFill>
+                <a:latin typeface="Bahnschrift SemiLight"/>
+                <a:ea typeface="Arial Unicode MS"/>
+              </a:rPr>
+              <a:t>Deskriptive Datenanalyse</a:t>
+            </a:r>
+            <a:endParaRPr lang="de-DE" sz="1800" b="0" strike="noStrike" spc="-1">
+              <a:latin typeface="Arial"/>
+            </a:endParaRPr>
+          </a:p>
+          <a:p>
+            <a:pPr>
+              <a:lnSpc>
+                <a:spcPct val="100000"/>
+              </a:lnSpc>
+              <a:buNone/>
+            </a:pPr>
+            <a:r>
+              <a:rPr lang="de-DE" sz="1800" b="0" strike="noStrike" spc="-1">
+                <a:solidFill>
+                  <a:srgbClr val="000000"/>
+                </a:solidFill>
+                <a:latin typeface="Bahnschrift SemiLight"/>
+                <a:ea typeface="Arial Unicode MS"/>
+              </a:rPr>
+              <a:t>3 Maschinelle Lernverfahren:</a:t>
+            </a:r>
+            <a:endParaRPr lang="de-DE" sz="1800" b="0" strike="noStrike" spc="-1">
+              <a:latin typeface="Arial"/>
+            </a:endParaRPr>
+          </a:p>
+          <a:p>
+            <a:pPr>
+              <a:lnSpc>
+                <a:spcPct val="100000"/>
+              </a:lnSpc>
+              <a:buNone/>
+            </a:pPr>
+            <a:r>
+              <a:rPr lang="de-DE" sz="1800" b="0" strike="noStrike" spc="-1">
+                <a:solidFill>
+                  <a:srgbClr val="000000"/>
+                </a:solidFill>
+                <a:latin typeface="Bahnschrift SemiLight"/>
+                <a:ea typeface="Arial Unicode MS"/>
+              </a:rPr>
+              <a:t>	Maschinelles Lernverfahren 1</a:t>
+            </a:r>
+            <a:endParaRPr lang="de-DE" sz="1800" b="0" strike="noStrike" spc="-1">
+              <a:latin typeface="Arial"/>
+            </a:endParaRPr>
+          </a:p>
+          <a:p>
+            <a:pPr>
+              <a:lnSpc>
+                <a:spcPct val="100000"/>
+              </a:lnSpc>
+              <a:buNone/>
+            </a:pPr>
+            <a:r>
+              <a:rPr lang="de-DE" sz="1800" b="0" strike="noStrike" spc="-1">
+                <a:solidFill>
+                  <a:srgbClr val="000000"/>
+                </a:solidFill>
+                <a:latin typeface="Bahnschrift SemiLight"/>
+                <a:ea typeface="Arial Unicode MS"/>
+              </a:rPr>
+              <a:t>	Maschinelles Lernverfahren 2</a:t>
+            </a:r>
+            <a:endParaRPr lang="de-DE" sz="1800" b="0" strike="noStrike" spc="-1">
+              <a:latin typeface="Arial"/>
+            </a:endParaRPr>
+          </a:p>
+          <a:p>
+            <a:pPr>
+              <a:lnSpc>
+                <a:spcPct val="100000"/>
+              </a:lnSpc>
+              <a:buNone/>
+            </a:pPr>
+            <a:r>
+              <a:rPr lang="de-DE" sz="1800" b="0" strike="noStrike" spc="-1">
+                <a:solidFill>
+                  <a:srgbClr val="000000"/>
+                </a:solidFill>
+                <a:latin typeface="Bahnschrift SemiLight"/>
+                <a:ea typeface="Arial Unicode MS"/>
+              </a:rPr>
+              <a:t>	Maschinelles Lernverfahren 3</a:t>
+            </a:r>
+            <a:endParaRPr lang="de-DE" sz="1800" b="0" strike="noStrike" spc="-1">
+              <a:latin typeface="Arial"/>
+            </a:endParaRPr>
+          </a:p>
+          <a:p>
+            <a:pPr>
+              <a:lnSpc>
+                <a:spcPct val="100000"/>
+              </a:lnSpc>
+              <a:buNone/>
+            </a:pPr>
+            <a:endParaRPr lang="de-DE" sz="1800" b="0" strike="noStrike" spc="-1">
+              <a:latin typeface="Arial"/>
+            </a:endParaRPr>
+          </a:p>
+        </p:txBody>
+      </p:sp>
+    </p:spTree>
+  </p:cSld>
+  <p:clrMapOvr>
+    <a:masterClrMapping/>
+  </p:clrMapOvr>
+</p:sld>
+</file>
+
+<file path=ppt/slides/slide20.xml><?xml version="1.0" encoding="utf-8"?>
 <p:sld xmlns:a="http://schemas.openxmlformats.org/drawingml/2006/main" xmlns:r="http://schemas.openxmlformats.org/officeDocument/2006/relationships" xmlns:p="http://schemas.openxmlformats.org/presentationml/2006/main">
   <p:cSld>
     <p:spTree>
@@ -16896,287 +17855,7 @@
 </p:sld>
 </file>
 
-<file path=ppt/slides/slide2.xml><?xml version="1.0" encoding="utf-8"?>
-<p:sld xmlns:a="http://schemas.openxmlformats.org/drawingml/2006/main" xmlns:r="http://schemas.openxmlformats.org/officeDocument/2006/relationships" xmlns:p="http://schemas.openxmlformats.org/presentationml/2006/main">
-  <p:cSld>
-    <p:spTree>
-      <p:nvGrpSpPr>
-        <p:cNvPr id="1" name=""/>
-        <p:cNvGrpSpPr/>
-        <p:nvPr/>
-      </p:nvGrpSpPr>
-      <p:grpSpPr>
-        <a:xfrm>
-          <a:off x="0" y="0"/>
-          <a:ext cx="0" cy="0"/>
-          <a:chOff x="0" y="0"/>
-          <a:chExt cx="0" cy="0"/>
-        </a:xfrm>
-      </p:grpSpPr>
-      <p:sp>
-        <p:nvSpPr>
-          <p:cNvPr id="238" name="TextBox 3"/>
-          <p:cNvSpPr/>
-          <p:nvPr/>
-        </p:nvSpPr>
-        <p:spPr>
-          <a:xfrm>
-            <a:off x="0" y="477720"/>
-            <a:ext cx="5444640" cy="775080"/>
-          </a:xfrm>
-          <a:prstGeom prst="rect">
-            <a:avLst/>
-          </a:prstGeom>
-          <a:noFill/>
-          <a:ln w="0">
-            <a:noFill/>
-          </a:ln>
-        </p:spPr>
-        <p:style>
-          <a:lnRef idx="0">
-            <a:scrgbClr r="0" g="0" b="0"/>
-          </a:lnRef>
-          <a:fillRef idx="0">
-            <a:scrgbClr r="0" g="0" b="0"/>
-          </a:fillRef>
-          <a:effectRef idx="0">
-            <a:scrgbClr r="0" g="0" b="0"/>
-          </a:effectRef>
-          <a:fontRef idx="minor"/>
-        </p:style>
-        <p:txBody>
-          <a:bodyPr lIns="90000" tIns="45000" rIns="90000" bIns="45000" anchor="ctr">
-            <a:spAutoFit/>
-          </a:bodyPr>
-          <a:lstStyle/>
-          <a:p>
-            <a:pPr algn="ctr">
-              <a:lnSpc>
-                <a:spcPts val="5400"/>
-              </a:lnSpc>
-              <a:buNone/>
-            </a:pPr>
-            <a:r>
-              <a:rPr lang="de-DE" sz="6000" b="1" strike="noStrike" spc="-1">
-                <a:solidFill>
-                  <a:srgbClr val="002060"/>
-                </a:solidFill>
-                <a:latin typeface="CMU Serif"/>
-                <a:ea typeface="CMU Serif"/>
-              </a:rPr>
-              <a:t>Gliederung</a:t>
-            </a:r>
-            <a:endParaRPr lang="de-DE" sz="6000" b="0" strike="noStrike" spc="-1">
-              <a:latin typeface="Arial"/>
-            </a:endParaRPr>
-          </a:p>
-        </p:txBody>
-      </p:sp>
-      <p:sp>
-        <p:nvSpPr>
-          <p:cNvPr id="239" name="Textfeld 1"/>
-          <p:cNvSpPr/>
-          <p:nvPr/>
-        </p:nvSpPr>
-        <p:spPr>
-          <a:xfrm>
-            <a:off x="762120" y="1355400"/>
-            <a:ext cx="8845560" cy="2284200"/>
-          </a:xfrm>
-          <a:prstGeom prst="rect">
-            <a:avLst/>
-          </a:prstGeom>
-          <a:noFill/>
-          <a:ln w="0">
-            <a:noFill/>
-          </a:ln>
-        </p:spPr>
-        <p:style>
-          <a:lnRef idx="0">
-            <a:scrgbClr r="0" g="0" b="0"/>
-          </a:lnRef>
-          <a:fillRef idx="0">
-            <a:scrgbClr r="0" g="0" b="0"/>
-          </a:fillRef>
-          <a:effectRef idx="0">
-            <a:scrgbClr r="0" g="0" b="0"/>
-          </a:effectRef>
-          <a:fontRef idx="minor"/>
-        </p:style>
-        <p:txBody>
-          <a:bodyPr lIns="90000" tIns="45000" rIns="90000" bIns="45000" anchor="t">
-            <a:spAutoFit/>
-          </a:bodyPr>
-          <a:lstStyle/>
-          <a:p>
-            <a:pPr>
-              <a:lnSpc>
-                <a:spcPct val="100000"/>
-              </a:lnSpc>
-              <a:buNone/>
-            </a:pPr>
-            <a:r>
-              <a:rPr lang="de-DE" sz="1800" b="0" strike="noStrike" spc="-1">
-                <a:solidFill>
-                  <a:srgbClr val="000000"/>
-                </a:solidFill>
-                <a:latin typeface="Bahnschrift SemiLight"/>
-                <a:ea typeface="Arial Unicode MS"/>
-              </a:rPr>
-              <a:t>Vorstellung des Datensatzes und Zweck der Analyse</a:t>
-            </a:r>
-            <a:endParaRPr lang="de-DE" sz="1800" b="0" strike="noStrike" spc="-1">
-              <a:latin typeface="Arial"/>
-            </a:endParaRPr>
-          </a:p>
-          <a:p>
-            <a:pPr>
-              <a:lnSpc>
-                <a:spcPct val="100000"/>
-              </a:lnSpc>
-              <a:buNone/>
-            </a:pPr>
-            <a:r>
-              <a:rPr lang="de-DE" sz="1800" b="0" strike="noStrike" spc="-1">
-                <a:solidFill>
-                  <a:srgbClr val="000000"/>
-                </a:solidFill>
-                <a:latin typeface="Bahnschrift SemiLight"/>
-                <a:ea typeface="Arial Unicode MS"/>
-              </a:rPr>
-              <a:t>Bereinigung des Datensatzes</a:t>
-            </a:r>
-            <a:endParaRPr lang="de-DE" sz="1800" b="0" strike="noStrike" spc="-1">
-              <a:latin typeface="Arial"/>
-            </a:endParaRPr>
-          </a:p>
-          <a:p>
-            <a:pPr>
-              <a:lnSpc>
-                <a:spcPct val="100000"/>
-              </a:lnSpc>
-              <a:buNone/>
-            </a:pPr>
-            <a:r>
-              <a:rPr lang="de-DE" sz="1800" b="0" strike="noStrike" spc="-1">
-                <a:solidFill>
-                  <a:srgbClr val="000000"/>
-                </a:solidFill>
-                <a:latin typeface="Bahnschrift SemiLight"/>
-                <a:ea typeface="Arial Unicode MS"/>
-              </a:rPr>
-              <a:t>Deskriptive Datenanalyse</a:t>
-            </a:r>
-            <a:endParaRPr lang="de-DE" sz="1800" b="0" strike="noStrike" spc="-1">
-              <a:latin typeface="Arial"/>
-            </a:endParaRPr>
-          </a:p>
-          <a:p>
-            <a:pPr>
-              <a:lnSpc>
-                <a:spcPct val="100000"/>
-              </a:lnSpc>
-              <a:buNone/>
-            </a:pPr>
-            <a:r>
-              <a:rPr lang="de-DE" sz="1800" b="0" strike="noStrike" spc="-1">
-                <a:solidFill>
-                  <a:srgbClr val="000000"/>
-                </a:solidFill>
-                <a:latin typeface="Bahnschrift SemiLight"/>
-                <a:ea typeface="Arial Unicode MS"/>
-              </a:rPr>
-              <a:t>3 Maschinelle Lernverfahren:</a:t>
-            </a:r>
-            <a:endParaRPr lang="de-DE" sz="1800" b="0" strike="noStrike" spc="-1">
-              <a:latin typeface="Arial"/>
-            </a:endParaRPr>
-          </a:p>
-          <a:p>
-            <a:pPr>
-              <a:lnSpc>
-                <a:spcPct val="100000"/>
-              </a:lnSpc>
-              <a:buNone/>
-            </a:pPr>
-            <a:r>
-              <a:rPr lang="de-DE" sz="1800" b="0" strike="noStrike" spc="-1">
-                <a:solidFill>
-                  <a:srgbClr val="000000"/>
-                </a:solidFill>
-                <a:latin typeface="Bahnschrift SemiLight"/>
-                <a:ea typeface="Arial Unicode MS"/>
-              </a:rPr>
-              <a:t>	Maschinelles Lernverfahren 1</a:t>
-            </a:r>
-            <a:endParaRPr lang="de-DE" sz="1800" b="0" strike="noStrike" spc="-1">
-              <a:latin typeface="Arial"/>
-            </a:endParaRPr>
-          </a:p>
-          <a:p>
-            <a:pPr>
-              <a:lnSpc>
-                <a:spcPct val="100000"/>
-              </a:lnSpc>
-              <a:buNone/>
-            </a:pPr>
-            <a:r>
-              <a:rPr lang="de-DE" sz="1800" b="0" strike="noStrike" spc="-1">
-                <a:solidFill>
-                  <a:srgbClr val="000000"/>
-                </a:solidFill>
-                <a:latin typeface="Bahnschrift SemiLight"/>
-                <a:ea typeface="Arial Unicode MS"/>
-              </a:rPr>
-              <a:t>	Maschinelles Lernverfahren 2</a:t>
-            </a:r>
-            <a:endParaRPr lang="de-DE" sz="1800" b="0" strike="noStrike" spc="-1">
-              <a:latin typeface="Arial"/>
-            </a:endParaRPr>
-          </a:p>
-          <a:p>
-            <a:pPr>
-              <a:lnSpc>
-                <a:spcPct val="100000"/>
-              </a:lnSpc>
-              <a:buNone/>
-            </a:pPr>
-            <a:r>
-              <a:rPr lang="de-DE" sz="1800" b="0" strike="noStrike" spc="-1">
-                <a:solidFill>
-                  <a:srgbClr val="000000"/>
-                </a:solidFill>
-                <a:latin typeface="Bahnschrift SemiLight"/>
-                <a:ea typeface="Arial Unicode MS"/>
-              </a:rPr>
-              <a:t>	Maschinelles Lernverfahren 3</a:t>
-            </a:r>
-            <a:endParaRPr lang="de-DE" sz="1800" b="0" strike="noStrike" spc="-1">
-              <a:latin typeface="Arial"/>
-            </a:endParaRPr>
-          </a:p>
-          <a:p>
-            <a:pPr>
-              <a:lnSpc>
-                <a:spcPct val="100000"/>
-              </a:lnSpc>
-              <a:buNone/>
-            </a:pPr>
-            <a:endParaRPr lang="de-DE" sz="1800" b="0" strike="noStrike" spc="-1">
-              <a:latin typeface="Arial"/>
-            </a:endParaRPr>
-          </a:p>
-        </p:txBody>
-      </p:sp>
-    </p:spTree>
-  </p:cSld>
-  <p:clrMapOvr>
-    <a:masterClrMapping/>
-  </p:clrMapOvr>
-</p:sld>
-</file>
-
-<file path=ppt/slides/slide20.xml><?xml version="1.0" encoding="utf-8"?>
+<file path=ppt/slides/slide21.xml><?xml version="1.0" encoding="utf-8"?>
 <p:sld xmlns:a="http://schemas.openxmlformats.org/drawingml/2006/main" xmlns:r="http://schemas.openxmlformats.org/officeDocument/2006/relationships" xmlns:p="http://schemas.openxmlformats.org/presentationml/2006/main">
   <p:cSld>
     <p:spTree>
@@ -17477,7 +18156,7 @@
 </p:sld>
 </file>
 
-<file path=ppt/slides/slide21.xml><?xml version="1.0" encoding="utf-8"?>
+<file path=ppt/slides/slide22.xml><?xml version="1.0" encoding="utf-8"?>
 <p:sld xmlns:a="http://schemas.openxmlformats.org/drawingml/2006/main" xmlns:r="http://schemas.openxmlformats.org/officeDocument/2006/relationships" xmlns:p="http://schemas.openxmlformats.org/presentationml/2006/main">
   <p:cSld>
     <p:spTree>
@@ -17936,7 +18615,7 @@
 </p:sld>
 </file>
 
-<file path=ppt/slides/slide22.xml><?xml version="1.0" encoding="utf-8"?>
+<file path=ppt/slides/slide23.xml><?xml version="1.0" encoding="utf-8"?>
 <p:sld xmlns:a="http://schemas.openxmlformats.org/drawingml/2006/main" xmlns:r="http://schemas.openxmlformats.org/officeDocument/2006/relationships" xmlns:p="http://schemas.openxmlformats.org/presentationml/2006/main" show="0">
   <p:cSld>
     <p:spTree>
@@ -18818,7 +19497,7 @@
 </p:sld>
 </file>
 
-<file path=ppt/slides/slide23.xml><?xml version="1.0" encoding="utf-8"?>
+<file path=ppt/slides/slide24.xml><?xml version="1.0" encoding="utf-8"?>
 <p:sld xmlns:a="http://schemas.openxmlformats.org/drawingml/2006/main" xmlns:r="http://schemas.openxmlformats.org/officeDocument/2006/relationships" xmlns:p="http://schemas.openxmlformats.org/presentationml/2006/main">
   <p:cSld>
     <p:spTree>
@@ -18965,7 +19644,7 @@
 </p:sld>
 </file>
 
-<file path=ppt/slides/slide24.xml><?xml version="1.0" encoding="utf-8"?>
+<file path=ppt/slides/slide25.xml><?xml version="1.0" encoding="utf-8"?>
 <p:sld xmlns:a="http://schemas.openxmlformats.org/drawingml/2006/main" xmlns:r="http://schemas.openxmlformats.org/officeDocument/2006/relationships" xmlns:p="http://schemas.openxmlformats.org/presentationml/2006/main">
   <p:cSld>
     <p:spTree>
@@ -19047,7 +19726,7 @@
 </p:sld>
 </file>
 
-<file path=ppt/slides/slide25.xml><?xml version="1.0" encoding="utf-8"?>
+<file path=ppt/slides/slide26.xml><?xml version="1.0" encoding="utf-8"?>
 <p:sld xmlns:a="http://schemas.openxmlformats.org/drawingml/2006/main" xmlns:r="http://schemas.openxmlformats.org/officeDocument/2006/relationships" xmlns:p="http://schemas.openxmlformats.org/presentationml/2006/main">
   <p:cSld>
     <p:spTree>
@@ -22529,7 +23208,7 @@
         </p:nvSpPr>
         <p:spPr>
           <a:xfrm>
-            <a:off x="2528391" y="2533799"/>
+            <a:off x="2528391" y="2784123"/>
             <a:ext cx="6003134" cy="644877"/>
           </a:xfrm>
           <a:prstGeom prst="rect">
@@ -22660,6 +23339,194 @@
           </a:p>
         </p:txBody>
       </p:sp>
+      <p:pic>
+        <p:nvPicPr>
+          <p:cNvPr id="3" name="Grafik 2">
+            <a:extLst>
+              <a:ext uri="{FF2B5EF4-FFF2-40B4-BE49-F238E27FC236}">
+                <a16:creationId xmlns:a16="http://schemas.microsoft.com/office/drawing/2014/main" id="{228409C9-D617-8B42-0B3C-774379C5D760}"/>
+              </a:ext>
+            </a:extLst>
+          </p:cNvPr>
+          <p:cNvPicPr>
+            <a:picLocks noChangeAspect="1"/>
+          </p:cNvPicPr>
+          <p:nvPr/>
+        </p:nvPicPr>
+        <p:blipFill>
+          <a:blip r:embed="rId3"/>
+          <a:stretch>
+            <a:fillRect/>
+          </a:stretch>
+        </p:blipFill>
+        <p:spPr>
+          <a:xfrm>
+            <a:off x="545199" y="3920591"/>
+            <a:ext cx="1775306" cy="1787986"/>
+          </a:xfrm>
+          <a:prstGeom prst="rect">
+            <a:avLst/>
+          </a:prstGeom>
+        </p:spPr>
+      </p:pic>
+      <p:sp>
+        <p:nvSpPr>
+          <p:cNvPr id="4" name="Textfeld 2">
+            <a:extLst>
+              <a:ext uri="{FF2B5EF4-FFF2-40B4-BE49-F238E27FC236}">
+                <a16:creationId xmlns:a16="http://schemas.microsoft.com/office/drawing/2014/main" id="{C7114ABC-B61A-3700-C197-677DB4C72E80}"/>
+              </a:ext>
+            </a:extLst>
+          </p:cNvPr>
+          <p:cNvSpPr/>
+          <p:nvPr/>
+        </p:nvSpPr>
+        <p:spPr>
+          <a:xfrm>
+            <a:off x="2528391" y="3920591"/>
+            <a:ext cx="5094483" cy="921876"/>
+          </a:xfrm>
+          <a:prstGeom prst="rect">
+            <a:avLst/>
+          </a:prstGeom>
+          <a:noFill/>
+          <a:ln w="0">
+            <a:noFill/>
+          </a:ln>
+        </p:spPr>
+        <p:style>
+          <a:lnRef idx="0">
+            <a:scrgbClr r="0" g="0" b="0"/>
+          </a:lnRef>
+          <a:fillRef idx="0">
+            <a:scrgbClr r="0" g="0" b="0"/>
+          </a:fillRef>
+          <a:effectRef idx="0">
+            <a:scrgbClr r="0" g="0" b="0"/>
+          </a:effectRef>
+          <a:fontRef idx="minor"/>
+        </p:style>
+        <p:txBody>
+          <a:bodyPr wrap="square" lIns="90000" tIns="45000" rIns="90000" bIns="45000" anchor="t">
+            <a:spAutoFit/>
+          </a:bodyPr>
+          <a:lstStyle/>
+          <a:p>
+            <a:pPr marL="285840" indent="-285840">
+              <a:lnSpc>
+                <a:spcPct val="100000"/>
+              </a:lnSpc>
+              <a:buClr>
+                <a:srgbClr val="000000"/>
+              </a:buClr>
+              <a:buFont typeface="Arial"/>
+              <a:buChar char="•"/>
+            </a:pPr>
+            <a:r>
+              <a:rPr lang="de-DE" sz="1800" b="0" strike="noStrike" spc="-1" dirty="0">
+                <a:latin typeface="Bahnschrift SemiLight" panose="020B0502040204020203" pitchFamily="34" charset="0"/>
+              </a:rPr>
+              <a:t>Median: 20.490</a:t>
+            </a:r>
+          </a:p>
+          <a:p>
+            <a:pPr marL="285840" indent="-285840">
+              <a:lnSpc>
+                <a:spcPct val="100000"/>
+              </a:lnSpc>
+              <a:buClr>
+                <a:srgbClr val="000000"/>
+              </a:buClr>
+              <a:buFont typeface="Arial"/>
+              <a:buChar char="•"/>
+            </a:pPr>
+            <a:r>
+              <a:rPr lang="de-DE" spc="-1" dirty="0">
+                <a:latin typeface="Bahnschrift SemiLight" panose="020B0502040204020203" pitchFamily="34" charset="0"/>
+              </a:rPr>
+              <a:t>Mittelwert: 29.416,2</a:t>
+            </a:r>
+          </a:p>
+          <a:p>
+            <a:pPr>
+              <a:lnSpc>
+                <a:spcPct val="100000"/>
+              </a:lnSpc>
+              <a:buClr>
+                <a:srgbClr val="000000"/>
+              </a:buClr>
+            </a:pPr>
+            <a:r>
+              <a:rPr lang="de-DE" spc="-1" dirty="0">
+                <a:latin typeface="Bahnschrift SemiLight" panose="020B0502040204020203" pitchFamily="34" charset="0"/>
+              </a:rPr>
+              <a:t>= schiefe Verteilung der Zielvariable</a:t>
+            </a:r>
+          </a:p>
+        </p:txBody>
+      </p:sp>
+      <p:sp>
+        <p:nvSpPr>
+          <p:cNvPr id="8" name="Textfeld 2">
+            <a:extLst>
+              <a:ext uri="{FF2B5EF4-FFF2-40B4-BE49-F238E27FC236}">
+                <a16:creationId xmlns:a16="http://schemas.microsoft.com/office/drawing/2014/main" id="{53250606-170C-3CC9-EB74-E1FF43CB1D17}"/>
+              </a:ext>
+            </a:extLst>
+          </p:cNvPr>
+          <p:cNvSpPr/>
+          <p:nvPr/>
+        </p:nvSpPr>
+        <p:spPr>
+          <a:xfrm>
+            <a:off x="2528391" y="5150119"/>
+            <a:ext cx="8358145" cy="367878"/>
+          </a:xfrm>
+          <a:prstGeom prst="rect">
+            <a:avLst/>
+          </a:prstGeom>
+          <a:noFill/>
+          <a:ln w="0">
+            <a:noFill/>
+          </a:ln>
+        </p:spPr>
+        <p:style>
+          <a:lnRef idx="0">
+            <a:scrgbClr r="0" g="0" b="0"/>
+          </a:lnRef>
+          <a:fillRef idx="0">
+            <a:scrgbClr r="0" g="0" b="0"/>
+          </a:fillRef>
+          <a:effectRef idx="0">
+            <a:scrgbClr r="0" g="0" b="0"/>
+          </a:effectRef>
+          <a:fontRef idx="minor"/>
+        </p:style>
+        <p:txBody>
+          <a:bodyPr wrap="square" lIns="90000" tIns="45000" rIns="90000" bIns="45000" anchor="t">
+            <a:spAutoFit/>
+          </a:bodyPr>
+          <a:lstStyle/>
+          <a:p>
+            <a:pPr marL="285840" indent="-285840">
+              <a:lnSpc>
+                <a:spcPct val="100000"/>
+              </a:lnSpc>
+              <a:buClr>
+                <a:srgbClr val="000000"/>
+              </a:buClr>
+              <a:buFont typeface="Arial"/>
+              <a:buChar char="•"/>
+            </a:pPr>
+            <a:r>
+              <a:rPr lang="de-DE" sz="1800" b="0" strike="noStrike" spc="-1" dirty="0">
+                <a:latin typeface="Bahnschrift SemiLight" panose="020B0502040204020203" pitchFamily="34" charset="0"/>
+              </a:rPr>
+              <a:t>Extreme Ausreißer wegen Exklusivmarken wie Lamborghini, Ferrari usw.</a:t>
+            </a:r>
+          </a:p>
+        </p:txBody>
+      </p:sp>
     </p:spTree>
     <p:extLst>
       <p:ext uri="{BB962C8B-B14F-4D97-AF65-F5344CB8AC3E}">
@@ -22674,6 +23541,289 @@
 </file>
 
 <file path=ppt/slides/slide8.xml><?xml version="1.0" encoding="utf-8"?>
+<p:sld xmlns:a="http://schemas.openxmlformats.org/drawingml/2006/main" xmlns:r="http://schemas.openxmlformats.org/officeDocument/2006/relationships" xmlns:p="http://schemas.openxmlformats.org/presentationml/2006/main">
+  <p:cSld>
+    <p:spTree>
+      <p:nvGrpSpPr>
+        <p:cNvPr id="1" name="">
+          <a:extLst>
+            <a:ext uri="{FF2B5EF4-FFF2-40B4-BE49-F238E27FC236}">
+              <a16:creationId xmlns:a16="http://schemas.microsoft.com/office/drawing/2014/main" id="{8DE1D933-9628-78B2-79A8-E026F8A86FBF}"/>
+            </a:ext>
+          </a:extLst>
+        </p:cNvPr>
+        <p:cNvGrpSpPr/>
+        <p:nvPr/>
+      </p:nvGrpSpPr>
+      <p:grpSpPr>
+        <a:xfrm>
+          <a:off x="0" y="0"/>
+          <a:ext cx="0" cy="0"/>
+          <a:chOff x="0" y="0"/>
+          <a:chExt cx="0" cy="0"/>
+        </a:xfrm>
+      </p:grpSpPr>
+      <p:sp>
+        <p:nvSpPr>
+          <p:cNvPr id="269" name="PlaceHolder 1">
+            <a:extLst>
+              <a:ext uri="{FF2B5EF4-FFF2-40B4-BE49-F238E27FC236}">
+                <a16:creationId xmlns:a16="http://schemas.microsoft.com/office/drawing/2014/main" id="{B8E62134-62AD-6E7F-8A20-DA37C38F2BAF}"/>
+              </a:ext>
+            </a:extLst>
+          </p:cNvPr>
+          <p:cNvSpPr>
+            <a:spLocks noGrp="1"/>
+          </p:cNvSpPr>
+          <p:nvPr>
+            <p:ph/>
+          </p:nvPr>
+        </p:nvSpPr>
+        <p:spPr>
+          <a:xfrm>
+            <a:off x="2063820" y="383135"/>
+            <a:ext cx="8064360" cy="644400"/>
+          </a:xfrm>
+          <a:prstGeom prst="rect">
+            <a:avLst/>
+          </a:prstGeom>
+          <a:noFill/>
+          <a:ln w="0">
+            <a:noFill/>
+          </a:ln>
+        </p:spPr>
+        <p:txBody>
+          <a:bodyPr lIns="90000" tIns="45000" rIns="90000" bIns="45000" anchor="ctr">
+            <a:noAutofit/>
+          </a:bodyPr>
+          <a:lstStyle/>
+          <a:p>
+            <a:pPr marL="228600">
+              <a:lnSpc>
+                <a:spcPct val="90000"/>
+              </a:lnSpc>
+              <a:spcBef>
+                <a:spcPts val="1001"/>
+              </a:spcBef>
+              <a:buNone/>
+              <a:tabLst>
+                <a:tab pos="0" algn="l"/>
+              </a:tabLst>
+            </a:pPr>
+            <a:r>
+              <a:rPr lang="de-DE" sz="4600" b="1" spc="-1" dirty="0">
+                <a:solidFill>
+                  <a:srgbClr val="FFFFFF"/>
+                </a:solidFill>
+                <a:latin typeface="CMU Serif"/>
+                <a:ea typeface="CMU Serif"/>
+              </a:rPr>
+              <a:t>Analyse</a:t>
+            </a:r>
+            <a:r>
+              <a:rPr lang="de-DE" sz="4000" b="1" spc="-1" dirty="0">
+                <a:solidFill>
+                  <a:srgbClr val="FFFFFF"/>
+                </a:solidFill>
+                <a:latin typeface="CMU Serif"/>
+                <a:ea typeface="CMU Serif"/>
+              </a:rPr>
+              <a:t> </a:t>
+            </a:r>
+            <a:r>
+              <a:rPr lang="de-DE" sz="4600" b="1" spc="-1" dirty="0">
+                <a:solidFill>
+                  <a:srgbClr val="FFFFFF"/>
+                </a:solidFill>
+                <a:latin typeface="CMU Serif"/>
+                <a:ea typeface="CMU Serif"/>
+              </a:rPr>
+              <a:t>4</a:t>
+            </a:r>
+            <a:endParaRPr lang="de-DE" sz="4600" b="0" strike="noStrike" spc="-1" dirty="0">
+              <a:latin typeface="Arial"/>
+            </a:endParaRPr>
+          </a:p>
+        </p:txBody>
+      </p:sp>
+      <p:sp>
+        <p:nvSpPr>
+          <p:cNvPr id="8" name="Textfeld 2">
+            <a:extLst>
+              <a:ext uri="{FF2B5EF4-FFF2-40B4-BE49-F238E27FC236}">
+                <a16:creationId xmlns:a16="http://schemas.microsoft.com/office/drawing/2014/main" id="{D15D60DC-5607-AAE5-86F6-DD1A78C7BA8B}"/>
+              </a:ext>
+            </a:extLst>
+          </p:cNvPr>
+          <p:cNvSpPr/>
+          <p:nvPr/>
+        </p:nvSpPr>
+        <p:spPr>
+          <a:xfrm>
+            <a:off x="6521570" y="2137065"/>
+            <a:ext cx="3847382" cy="2583869"/>
+          </a:xfrm>
+          <a:prstGeom prst="rect">
+            <a:avLst/>
+          </a:prstGeom>
+          <a:noFill/>
+          <a:ln w="0">
+            <a:noFill/>
+          </a:ln>
+        </p:spPr>
+        <p:style>
+          <a:lnRef idx="0">
+            <a:scrgbClr r="0" g="0" b="0"/>
+          </a:lnRef>
+          <a:fillRef idx="0">
+            <a:scrgbClr r="0" g="0" b="0"/>
+          </a:fillRef>
+          <a:effectRef idx="0">
+            <a:scrgbClr r="0" g="0" b="0"/>
+          </a:effectRef>
+          <a:fontRef idx="minor"/>
+        </p:style>
+        <p:txBody>
+          <a:bodyPr wrap="square" lIns="90000" tIns="45000" rIns="90000" bIns="45000" anchor="t">
+            <a:spAutoFit/>
+          </a:bodyPr>
+          <a:lstStyle/>
+          <a:p>
+            <a:pPr marL="285840" indent="-285840">
+              <a:lnSpc>
+                <a:spcPct val="100000"/>
+              </a:lnSpc>
+              <a:buClr>
+                <a:srgbClr val="000000"/>
+              </a:buClr>
+              <a:buFont typeface="Arial"/>
+              <a:buChar char="•"/>
+            </a:pPr>
+            <a:r>
+              <a:rPr lang="de-DE" spc="-1" dirty="0">
+                <a:latin typeface="Bahnschrift SemiLight" panose="020B0502040204020203" pitchFamily="34" charset="0"/>
+              </a:rPr>
+              <a:t>Beim untersuchen der Beziehung zwischen Preis und Kilometerstand stellt man fest, dass nicht nur der Preis extreme Ausreißer enthält, sondern das dies auch der Fall beim Kilometerstand ist und daher ist die Interpretation dieses Plots unmöglich</a:t>
+            </a:r>
+            <a:endParaRPr lang="de-DE" sz="1800" b="0" strike="noStrike" spc="-1" dirty="0">
+              <a:latin typeface="Bahnschrift SemiLight" panose="020B0502040204020203" pitchFamily="34" charset="0"/>
+            </a:endParaRPr>
+          </a:p>
+        </p:txBody>
+      </p:sp>
+      <p:pic>
+        <p:nvPicPr>
+          <p:cNvPr id="9" name="Grafik 8" descr="Ein Bild, das Text, Screenshot, Diagramm, Reihe enthält.&#10;&#10;KI-generierte Inhalte können fehlerhaft sein.">
+            <a:extLst>
+              <a:ext uri="{FF2B5EF4-FFF2-40B4-BE49-F238E27FC236}">
+                <a16:creationId xmlns:a16="http://schemas.microsoft.com/office/drawing/2014/main" id="{DDC69535-3B0E-DB8B-492E-1F4E750ACBF6}"/>
+              </a:ext>
+            </a:extLst>
+          </p:cNvPr>
+          <p:cNvPicPr>
+            <a:picLocks noChangeAspect="1"/>
+          </p:cNvPicPr>
+          <p:nvPr/>
+        </p:nvPicPr>
+        <p:blipFill>
+          <a:blip r:embed="rId2">
+            <a:extLst>
+              <a:ext uri="{28A0092B-C50C-407E-A947-70E740481C1C}">
+                <a14:useLocalDpi xmlns:a14="http://schemas.microsoft.com/office/drawing/2010/main" val="0"/>
+              </a:ext>
+            </a:extLst>
+          </a:blip>
+          <a:stretch>
+            <a:fillRect/>
+          </a:stretch>
+        </p:blipFill>
+        <p:spPr>
+          <a:xfrm>
+            <a:off x="515876" y="1564058"/>
+            <a:ext cx="5580124" cy="3985802"/>
+          </a:xfrm>
+          <a:prstGeom prst="rect">
+            <a:avLst/>
+          </a:prstGeom>
+        </p:spPr>
+      </p:pic>
+      <p:sp>
+        <p:nvSpPr>
+          <p:cNvPr id="2" name="Textfeld 2">
+            <a:extLst>
+              <a:ext uri="{FF2B5EF4-FFF2-40B4-BE49-F238E27FC236}">
+                <a16:creationId xmlns:a16="http://schemas.microsoft.com/office/drawing/2014/main" id="{59FA23B5-26D8-9BFF-6655-1FCE9A3FD171}"/>
+              </a:ext>
+            </a:extLst>
+          </p:cNvPr>
+          <p:cNvSpPr/>
+          <p:nvPr/>
+        </p:nvSpPr>
+        <p:spPr>
+          <a:xfrm>
+            <a:off x="411193" y="5763944"/>
+            <a:ext cx="11105070" cy="644877"/>
+          </a:xfrm>
+          <a:prstGeom prst="rect">
+            <a:avLst/>
+          </a:prstGeom>
+          <a:noFill/>
+          <a:ln w="0">
+            <a:noFill/>
+          </a:ln>
+        </p:spPr>
+        <p:style>
+          <a:lnRef idx="0">
+            <a:scrgbClr r="0" g="0" b="0"/>
+          </a:lnRef>
+          <a:fillRef idx="0">
+            <a:scrgbClr r="0" g="0" b="0"/>
+          </a:fillRef>
+          <a:effectRef idx="0">
+            <a:scrgbClr r="0" g="0" b="0"/>
+          </a:effectRef>
+          <a:fontRef idx="minor"/>
+        </p:style>
+        <p:txBody>
+          <a:bodyPr wrap="square" lIns="90000" tIns="45000" rIns="90000" bIns="45000" anchor="t">
+            <a:spAutoFit/>
+          </a:bodyPr>
+          <a:lstStyle/>
+          <a:p>
+            <a:pPr>
+              <a:lnSpc>
+                <a:spcPct val="100000"/>
+              </a:lnSpc>
+              <a:buClr>
+                <a:srgbClr val="000000"/>
+              </a:buClr>
+            </a:pPr>
+            <a:r>
+              <a:rPr lang="de-DE" dirty="0">
+                <a:latin typeface="Bahnschrift SemiLight" panose="020B0502040204020203" pitchFamily="34" charset="0"/>
+              </a:rPr>
+              <a:t>=&gt; Da die ursprüngliche Datenstruktur keine direkte Durchführung einer deskriptiven Analyse zuließ, wurden erste Analyse-Schritte in den Prozess der Datenbereinigung integriert.</a:t>
+            </a:r>
+            <a:endParaRPr lang="de-DE" sz="1800" b="0" strike="noStrike" spc="-1" dirty="0">
+              <a:latin typeface="Bahnschrift SemiLight" panose="020B0502040204020203" pitchFamily="34" charset="0"/>
+            </a:endParaRPr>
+          </a:p>
+        </p:txBody>
+      </p:sp>
+    </p:spTree>
+    <p:extLst>
+      <p:ext uri="{BB962C8B-B14F-4D97-AF65-F5344CB8AC3E}">
+        <p14:creationId xmlns:p14="http://schemas.microsoft.com/office/powerpoint/2010/main" val="954076536"/>
+      </p:ext>
+    </p:extLst>
+  </p:cSld>
+  <p:clrMapOvr>
+    <a:masterClrMapping/>
+  </p:clrMapOvr>
+</p:sld>
+</file>
+
+<file path=ppt/slides/slide9.xml><?xml version="1.0" encoding="utf-8"?>
 <p:sld xmlns:a="http://schemas.openxmlformats.org/drawingml/2006/main" xmlns:r="http://schemas.openxmlformats.org/officeDocument/2006/relationships" xmlns:p="http://schemas.openxmlformats.org/presentationml/2006/main">
   <p:cSld>
     <p:spTree>
@@ -23123,478 +24273,6 @@
         <p14:creationId xmlns:p14="http://schemas.microsoft.com/office/powerpoint/2010/main" val="3830844993"/>
       </p:ext>
     </p:extLst>
-  </p:cSld>
-  <p:clrMapOvr>
-    <a:masterClrMapping/>
-  </p:clrMapOvr>
-</p:sld>
-</file>
-
-<file path=ppt/slides/slide9.xml><?xml version="1.0" encoding="utf-8"?>
-<p:sld xmlns:a="http://schemas.openxmlformats.org/drawingml/2006/main" xmlns:r="http://schemas.openxmlformats.org/officeDocument/2006/relationships" xmlns:p="http://schemas.openxmlformats.org/presentationml/2006/main">
-  <p:cSld>
-    <p:spTree>
-      <p:nvGrpSpPr>
-        <p:cNvPr id="1" name=""/>
-        <p:cNvGrpSpPr/>
-        <p:nvPr/>
-      </p:nvGrpSpPr>
-      <p:grpSpPr>
-        <a:xfrm>
-          <a:off x="0" y="0"/>
-          <a:ext cx="0" cy="0"/>
-          <a:chOff x="0" y="0"/>
-          <a:chExt cx="0" cy="0"/>
-        </a:xfrm>
-      </p:grpSpPr>
-      <p:sp>
-        <p:nvSpPr>
-          <p:cNvPr id="247" name="PlaceHolder 1"/>
-          <p:cNvSpPr>
-            <a:spLocks noGrp="1"/>
-          </p:cNvSpPr>
-          <p:nvPr>
-            <p:ph/>
-          </p:nvPr>
-        </p:nvSpPr>
-        <p:spPr>
-          <a:xfrm>
-            <a:off x="2063160" y="460440"/>
-            <a:ext cx="8064360" cy="644400"/>
-          </a:xfrm>
-          <a:prstGeom prst="rect">
-            <a:avLst/>
-          </a:prstGeom>
-          <a:noFill/>
-          <a:ln w="0">
-            <a:noFill/>
-          </a:ln>
-        </p:spPr>
-        <p:txBody>
-          <a:bodyPr lIns="90000" tIns="45000" rIns="90000" bIns="45000" anchor="ctr">
-            <a:normAutofit fontScale="80500" lnSpcReduction="20000"/>
-          </a:bodyPr>
-          <a:lstStyle/>
-          <a:p>
-            <a:pPr marL="204120">
-              <a:lnSpc>
-                <a:spcPct val="90000"/>
-              </a:lnSpc>
-              <a:spcBef>
-                <a:spcPts val="1001"/>
-              </a:spcBef>
-              <a:buNone/>
-              <a:tabLst>
-                <a:tab pos="0" algn="l"/>
-              </a:tabLst>
-            </a:pPr>
-            <a:r>
-              <a:rPr lang="de-DE" sz="5400" b="1" strike="noStrike" spc="-1" dirty="0">
-                <a:solidFill>
-                  <a:srgbClr val="FFFFFF"/>
-                </a:solidFill>
-                <a:latin typeface="CMU Serif"/>
-                <a:ea typeface="CMU Serif"/>
-              </a:rPr>
-              <a:t>Bereinigung der Daten 1</a:t>
-            </a:r>
-            <a:endParaRPr lang="de-DE" sz="5400" b="0" strike="noStrike" spc="-1" dirty="0">
-              <a:latin typeface="Arial"/>
-            </a:endParaRPr>
-          </a:p>
-        </p:txBody>
-      </p:sp>
-      <p:sp>
-        <p:nvSpPr>
-          <p:cNvPr id="248" name="Textfeld 2"/>
-          <p:cNvSpPr/>
-          <p:nvPr/>
-        </p:nvSpPr>
-        <p:spPr>
-          <a:xfrm>
-            <a:off x="585360" y="1788840"/>
-            <a:ext cx="9952200" cy="3930120"/>
-          </a:xfrm>
-          <a:prstGeom prst="rect">
-            <a:avLst/>
-          </a:prstGeom>
-          <a:noFill/>
-          <a:ln w="0">
-            <a:noFill/>
-          </a:ln>
-        </p:spPr>
-        <p:style>
-          <a:lnRef idx="0">
-            <a:scrgbClr r="0" g="0" b="0"/>
-          </a:lnRef>
-          <a:fillRef idx="0">
-            <a:scrgbClr r="0" g="0" b="0"/>
-          </a:fillRef>
-          <a:effectRef idx="0">
-            <a:scrgbClr r="0" g="0" b="0"/>
-          </a:effectRef>
-          <a:fontRef idx="minor"/>
-        </p:style>
-        <p:txBody>
-          <a:bodyPr lIns="90000" tIns="45000" rIns="90000" bIns="45000" anchor="t">
-            <a:spAutoFit/>
-          </a:bodyPr>
-          <a:lstStyle/>
-          <a:p>
-            <a:pPr>
-              <a:lnSpc>
-                <a:spcPct val="100000"/>
-              </a:lnSpc>
-              <a:buNone/>
-            </a:pPr>
-            <a:r>
-              <a:rPr lang="de-DE" sz="1800" b="1" strike="noStrike" spc="-1" dirty="0">
-                <a:solidFill>
-                  <a:srgbClr val="000000"/>
-                </a:solidFill>
-                <a:latin typeface="Bahnschrift SemiLight"/>
-                <a:ea typeface="Arial Unicode MS"/>
-              </a:rPr>
-              <a:t>Entfernung der Spalte „Unnamed..0“</a:t>
-            </a:r>
-            <a:endParaRPr lang="de-DE" sz="1800" b="0" strike="noStrike" spc="-1" dirty="0">
-              <a:latin typeface="Arial"/>
-            </a:endParaRPr>
-          </a:p>
-          <a:p>
-            <a:pPr marL="285840" indent="-285840">
-              <a:lnSpc>
-                <a:spcPct val="100000"/>
-              </a:lnSpc>
-              <a:buClr>
-                <a:srgbClr val="000000"/>
-              </a:buClr>
-              <a:buFont typeface="Arial"/>
-              <a:buChar char="•"/>
-            </a:pPr>
-            <a:r>
-              <a:rPr lang="de-DE" sz="1800" b="0" strike="noStrike" spc="-1" dirty="0">
-                <a:solidFill>
-                  <a:srgbClr val="000000"/>
-                </a:solidFill>
-                <a:latin typeface="Bahnschrift SemiLight"/>
-                <a:ea typeface="Arial Unicode MS"/>
-              </a:rPr>
-              <a:t>Spalte hat keine Relevanz, sie ist reine Nummerierung der Zeilen.</a:t>
-            </a:r>
-            <a:endParaRPr lang="de-DE" sz="1800" b="0" strike="noStrike" spc="-1" dirty="0">
-              <a:latin typeface="Arial"/>
-            </a:endParaRPr>
-          </a:p>
-          <a:p>
-            <a:pPr>
-              <a:lnSpc>
-                <a:spcPct val="100000"/>
-              </a:lnSpc>
-              <a:buNone/>
-            </a:pPr>
-            <a:endParaRPr lang="de-DE" sz="1800" b="0" strike="noStrike" spc="-1" dirty="0">
-              <a:latin typeface="Arial"/>
-            </a:endParaRPr>
-          </a:p>
-          <a:p>
-            <a:pPr>
-              <a:lnSpc>
-                <a:spcPct val="100000"/>
-              </a:lnSpc>
-              <a:buNone/>
-            </a:pPr>
-            <a:r>
-              <a:rPr lang="de-DE" sz="1800" b="1" strike="noStrike" spc="-1" dirty="0">
-                <a:solidFill>
-                  <a:srgbClr val="000000"/>
-                </a:solidFill>
-                <a:latin typeface="Bahnschrift SemiLight"/>
-                <a:ea typeface="Arial Unicode MS"/>
-              </a:rPr>
-              <a:t>Entfernung der Spalte „</a:t>
-            </a:r>
-            <a:r>
-              <a:rPr lang="de-DE" sz="1800" b="1" strike="noStrike" spc="-1" dirty="0" err="1">
-                <a:solidFill>
-                  <a:srgbClr val="000000"/>
-                </a:solidFill>
-                <a:latin typeface="Bahnschrift SemiLight"/>
-                <a:ea typeface="Arial Unicode MS"/>
-              </a:rPr>
-              <a:t>offer_description</a:t>
-            </a:r>
-            <a:r>
-              <a:rPr lang="de-DE" sz="1800" b="1" strike="noStrike" spc="-1" dirty="0">
-                <a:solidFill>
-                  <a:srgbClr val="000000"/>
-                </a:solidFill>
-                <a:latin typeface="Bahnschrift SemiLight"/>
-                <a:ea typeface="Arial Unicode MS"/>
-              </a:rPr>
-              <a:t>“</a:t>
-            </a:r>
-            <a:endParaRPr lang="de-DE" sz="1800" b="0" strike="noStrike" spc="-1" dirty="0">
-              <a:latin typeface="Arial"/>
-            </a:endParaRPr>
-          </a:p>
-          <a:p>
-            <a:pPr marL="285840" indent="-285840">
-              <a:lnSpc>
-                <a:spcPct val="100000"/>
-              </a:lnSpc>
-              <a:buClr>
-                <a:srgbClr val="000000"/>
-              </a:buClr>
-              <a:buFont typeface="Arial"/>
-              <a:buChar char="•"/>
-            </a:pPr>
-            <a:r>
-              <a:rPr lang="de-DE" sz="1800" b="0" strike="noStrike" spc="-1" dirty="0">
-                <a:solidFill>
-                  <a:srgbClr val="000000"/>
-                </a:solidFill>
-                <a:latin typeface="Bahnschrift SemiLight"/>
-                <a:ea typeface="Arial Unicode MS"/>
-              </a:rPr>
-              <a:t>Z.B.: wurde geschaut, ob in der Spalte </a:t>
-            </a:r>
-            <a:r>
-              <a:rPr lang="de-DE" sz="1800" b="0" strike="noStrike" spc="-1" dirty="0" err="1">
-                <a:solidFill>
-                  <a:srgbClr val="000000"/>
-                </a:solidFill>
-                <a:latin typeface="Bahnschrift SemiLight"/>
-                <a:ea typeface="Arial Unicode MS"/>
-              </a:rPr>
-              <a:t>offer_description</a:t>
-            </a:r>
-            <a:r>
-              <a:rPr lang="de-DE" sz="1800" b="0" strike="noStrike" spc="-1" dirty="0">
-                <a:solidFill>
-                  <a:srgbClr val="000000"/>
-                </a:solidFill>
-                <a:latin typeface="Bahnschrift SemiLight"/>
-                <a:ea typeface="Arial Unicode MS"/>
-              </a:rPr>
-              <a:t> Wort unfallfrei, </a:t>
-            </a:r>
-            <a:r>
-              <a:rPr lang="de-DE" sz="1800" b="0" strike="noStrike" spc="-1" dirty="0" err="1">
-                <a:solidFill>
-                  <a:srgbClr val="000000"/>
-                </a:solidFill>
-                <a:latin typeface="Bahnschrift SemiLight"/>
-                <a:ea typeface="Arial Unicode MS"/>
-              </a:rPr>
-              <a:t>sport</a:t>
-            </a:r>
-            <a:r>
-              <a:rPr lang="de-DE" sz="1800" b="0" strike="noStrike" spc="-1" dirty="0">
-                <a:solidFill>
-                  <a:srgbClr val="000000"/>
-                </a:solidFill>
-                <a:latin typeface="Bahnschrift SemiLight"/>
-                <a:ea typeface="Arial Unicode MS"/>
-              </a:rPr>
-              <a:t>, 4x4 usw. steht.</a:t>
-            </a:r>
-            <a:endParaRPr lang="de-DE" sz="1800" b="0" strike="noStrike" spc="-1" dirty="0">
-              <a:latin typeface="Arial"/>
-            </a:endParaRPr>
-          </a:p>
-          <a:p>
-            <a:pPr marL="285840" indent="-285840">
-              <a:lnSpc>
-                <a:spcPct val="100000"/>
-              </a:lnSpc>
-              <a:buClr>
-                <a:srgbClr val="000000"/>
-              </a:buClr>
-              <a:buFont typeface="Arial"/>
-              <a:buChar char="•"/>
-            </a:pPr>
-            <a:r>
-              <a:rPr lang="de-DE" sz="1800" b="0" strike="noStrike" spc="-1" dirty="0">
-                <a:solidFill>
-                  <a:srgbClr val="000000"/>
-                </a:solidFill>
-                <a:latin typeface="Bahnschrift SemiLight"/>
-                <a:ea typeface="Arial Unicode MS"/>
-              </a:rPr>
-              <a:t>Dies war auch der Fall bei </a:t>
-            </a:r>
-            <a:r>
-              <a:rPr lang="de-DE" sz="1800" b="0" strike="noStrike" spc="-1" dirty="0" err="1">
-                <a:solidFill>
-                  <a:srgbClr val="000000"/>
-                </a:solidFill>
-                <a:latin typeface="Bahnschrift SemiLight"/>
-                <a:ea typeface="Arial Unicode MS"/>
-              </a:rPr>
-              <a:t>sport</a:t>
-            </a:r>
-            <a:r>
-              <a:rPr lang="de-DE" sz="1800" b="0" strike="noStrike" spc="-1" dirty="0">
-                <a:solidFill>
-                  <a:srgbClr val="000000"/>
-                </a:solidFill>
-                <a:latin typeface="Bahnschrift SemiLight"/>
-                <a:ea typeface="Arial Unicode MS"/>
-              </a:rPr>
-              <a:t> bzw. 4x4 -&gt; neue Spalte erzeugt.</a:t>
-            </a:r>
-            <a:endParaRPr lang="de-DE" sz="1800" b="0" strike="noStrike" spc="-1" dirty="0">
-              <a:latin typeface="Arial"/>
-            </a:endParaRPr>
-          </a:p>
-          <a:p>
-            <a:pPr>
-              <a:lnSpc>
-                <a:spcPct val="100000"/>
-              </a:lnSpc>
-              <a:buNone/>
-            </a:pPr>
-            <a:endParaRPr lang="de-DE" sz="1800" b="0" strike="noStrike" spc="-1" dirty="0">
-              <a:latin typeface="Arial"/>
-            </a:endParaRPr>
-          </a:p>
-          <a:p>
-            <a:pPr>
-              <a:lnSpc>
-                <a:spcPct val="100000"/>
-              </a:lnSpc>
-              <a:buNone/>
-            </a:pPr>
-            <a:r>
-              <a:rPr lang="de-DE" sz="1800" b="1" strike="noStrike" spc="-1" dirty="0">
-                <a:solidFill>
-                  <a:srgbClr val="000000"/>
-                </a:solidFill>
-                <a:latin typeface="Bahnschrift SemiLight"/>
-                <a:ea typeface="Arial Unicode MS"/>
-              </a:rPr>
-              <a:t>Entfernung der Spalte „</a:t>
-            </a:r>
-            <a:r>
-              <a:rPr lang="de-DE" sz="1800" b="1" strike="noStrike" spc="-1" dirty="0" err="1">
-                <a:solidFill>
-                  <a:srgbClr val="000000"/>
-                </a:solidFill>
-                <a:latin typeface="Bahnschrift SemiLight"/>
-                <a:ea typeface="Arial Unicode MS"/>
-              </a:rPr>
-              <a:t>power_ps</a:t>
-            </a:r>
-            <a:r>
-              <a:rPr lang="de-DE" sz="1800" b="1" strike="noStrike" spc="-1" dirty="0">
-                <a:solidFill>
-                  <a:srgbClr val="000000"/>
-                </a:solidFill>
-                <a:latin typeface="Bahnschrift SemiLight"/>
-                <a:ea typeface="Arial Unicode MS"/>
-              </a:rPr>
-              <a:t>“</a:t>
-            </a:r>
-            <a:endParaRPr lang="de-DE" sz="1800" b="0" strike="noStrike" spc="-1" dirty="0">
-              <a:latin typeface="Arial"/>
-            </a:endParaRPr>
-          </a:p>
-          <a:p>
-            <a:pPr marL="285840" indent="-285840">
-              <a:lnSpc>
-                <a:spcPct val="100000"/>
-              </a:lnSpc>
-              <a:buClr>
-                <a:srgbClr val="000000"/>
-              </a:buClr>
-              <a:buFont typeface="Arial"/>
-              <a:buChar char="•"/>
-            </a:pPr>
-            <a:r>
-              <a:rPr lang="de-DE" sz="1800" b="0" strike="noStrike" spc="-1" dirty="0">
-                <a:solidFill>
-                  <a:srgbClr val="000000"/>
-                </a:solidFill>
-                <a:latin typeface="Bahnschrift SemiLight"/>
-                <a:ea typeface="Arial Unicode MS"/>
-              </a:rPr>
-              <a:t>Die Pferdestärke kann auch aus „</a:t>
-            </a:r>
-            <a:r>
-              <a:rPr lang="de-DE" sz="1800" b="0" strike="noStrike" spc="-1" dirty="0" err="1">
-                <a:solidFill>
-                  <a:srgbClr val="000000"/>
-                </a:solidFill>
-                <a:latin typeface="Bahnschrift SemiLight"/>
-                <a:ea typeface="Arial Unicode MS"/>
-              </a:rPr>
-              <a:t>power_kw</a:t>
-            </a:r>
-            <a:r>
-              <a:rPr lang="de-DE" sz="1800" b="0" strike="noStrike" spc="-1" dirty="0">
-                <a:solidFill>
-                  <a:srgbClr val="000000"/>
-                </a:solidFill>
-                <a:latin typeface="Bahnschrift SemiLight"/>
-                <a:ea typeface="Arial Unicode MS"/>
-              </a:rPr>
-              <a:t>“ durch Umwandlung gewonnen werden.</a:t>
-            </a:r>
-            <a:endParaRPr lang="de-DE" sz="1800" b="0" strike="noStrike" spc="-1" dirty="0">
-              <a:latin typeface="Arial"/>
-            </a:endParaRPr>
-          </a:p>
-          <a:p>
-            <a:pPr marL="285840" indent="-285840">
-              <a:lnSpc>
-                <a:spcPct val="100000"/>
-              </a:lnSpc>
-              <a:buClr>
-                <a:srgbClr val="000000"/>
-              </a:buClr>
-              <a:buFont typeface="Arial"/>
-              <a:buChar char="•"/>
-            </a:pPr>
-            <a:r>
-              <a:rPr lang="de-DE" sz="1800" b="0" strike="noStrike" spc="-1" dirty="0">
-                <a:solidFill>
-                  <a:srgbClr val="000000"/>
-                </a:solidFill>
-                <a:latin typeface="Bahnschrift SemiLight"/>
-                <a:ea typeface="Arial Unicode MS"/>
-              </a:rPr>
-              <a:t>Spalte ist daher überflüssig für die weitere Analyse.</a:t>
-            </a:r>
-            <a:endParaRPr lang="de-DE" sz="1800" b="0" strike="noStrike" spc="-1" dirty="0">
-              <a:latin typeface="Arial"/>
-            </a:endParaRPr>
-          </a:p>
-          <a:p>
-            <a:pPr>
-              <a:lnSpc>
-                <a:spcPct val="100000"/>
-              </a:lnSpc>
-              <a:buNone/>
-            </a:pPr>
-            <a:endParaRPr lang="de-DE" sz="1800" b="0" strike="noStrike" spc="-1" dirty="0">
-              <a:latin typeface="Arial"/>
-            </a:endParaRPr>
-          </a:p>
-          <a:p>
-            <a:pPr>
-              <a:lnSpc>
-                <a:spcPct val="100000"/>
-              </a:lnSpc>
-              <a:buNone/>
-            </a:pPr>
-            <a:endParaRPr lang="de-DE" sz="1800" b="0" strike="noStrike" spc="-1" dirty="0">
-              <a:latin typeface="Arial"/>
-            </a:endParaRPr>
-          </a:p>
-        </p:txBody>
-      </p:sp>
-    </p:spTree>
   </p:cSld>
   <p:clrMapOvr>
     <a:masterClrMapping/>

</xml_diff>